<commit_message>
Figure updates before submission
</commit_message>
<xml_diff>
--- a/figures/Experiment_flowchart.pptx
+++ b/figures/Experiment_flowchart.pptx
@@ -123,6 +123,1915 @@
 </p:presentation>
 </file>
 
+<file path=ppt/revisionInfo.xml><?xml version="1.0" encoding="utf-8"?>
+<p1510:revInfo xmlns:a="http://schemas.openxmlformats.org/drawingml/2006/main" xmlns:r="http://schemas.openxmlformats.org/officeDocument/2006/relationships" xmlns:p1510="http://schemas.microsoft.com/office/powerpoint/2015/10/main">
+  <p1510:revLst>
+    <p1510:client id="{688B7241-4242-4B42-B3A6-CEC9B70039E1}" v="6" dt="2024-07-05T22:36:31.056"/>
+  </p1510:revLst>
+</p1510:revInfo>
+</file>
+
+<file path=ppt/changesInfos/changesInfo1.xml><?xml version="1.0" encoding="utf-8"?>
+<pc:chgInfo xmlns:a="http://schemas.openxmlformats.org/drawingml/2006/main" xmlns:r="http://schemas.openxmlformats.org/officeDocument/2006/relationships" xmlns:ac="http://schemas.microsoft.com/office/drawing/2013/main/command" xmlns:pc="http://schemas.microsoft.com/office/powerpoint/2013/main/command">
+  <pc:docChgLst>
+    <pc:chgData name="Akdemir, Kerem Ziya" userId="a44fdb48-31b8-4682-ac1b-f99c482bb255" providerId="ADAL" clId="{688B7241-4242-4B42-B3A6-CEC9B70039E1}"/>
+    <pc:docChg chg="undo custSel modSld">
+      <pc:chgData name="Akdemir, Kerem Ziya" userId="a44fdb48-31b8-4682-ac1b-f99c482bb255" providerId="ADAL" clId="{688B7241-4242-4B42-B3A6-CEC9B70039E1}" dt="2024-07-05T22:38:57.045" v="63" actId="1076"/>
+      <pc:docMkLst>
+        <pc:docMk/>
+      </pc:docMkLst>
+      <pc:sldChg chg="addSp delSp modSp mod">
+        <pc:chgData name="Akdemir, Kerem Ziya" userId="a44fdb48-31b8-4682-ac1b-f99c482bb255" providerId="ADAL" clId="{688B7241-4242-4B42-B3A6-CEC9B70039E1}" dt="2024-07-05T22:38:57.045" v="63" actId="1076"/>
+        <pc:sldMkLst>
+          <pc:docMk/>
+          <pc:sldMk cId="1561297468" sldId="259"/>
+        </pc:sldMkLst>
+        <pc:spChg chg="mod">
+          <ac:chgData name="Akdemir, Kerem Ziya" userId="a44fdb48-31b8-4682-ac1b-f99c482bb255" providerId="ADAL" clId="{688B7241-4242-4B42-B3A6-CEC9B70039E1}" dt="2024-07-05T22:38:57.045" v="63" actId="1076"/>
+          <ac:spMkLst>
+            <pc:docMk/>
+            <pc:sldMk cId="1561297468" sldId="259"/>
+            <ac:spMk id="4" creationId="{2D9EE6B1-D51A-57ED-833B-FC6C7B8C997E}"/>
+          </ac:spMkLst>
+        </pc:spChg>
+        <pc:spChg chg="mod">
+          <ac:chgData name="Akdemir, Kerem Ziya" userId="a44fdb48-31b8-4682-ac1b-f99c482bb255" providerId="ADAL" clId="{688B7241-4242-4B42-B3A6-CEC9B70039E1}" dt="2024-07-05T22:38:57.045" v="63" actId="1076"/>
+          <ac:spMkLst>
+            <pc:docMk/>
+            <pc:sldMk cId="1561297468" sldId="259"/>
+            <ac:spMk id="6" creationId="{1A705DBF-5F38-18B2-1B3E-49F7AC60D2FF}"/>
+          </ac:spMkLst>
+        </pc:spChg>
+        <pc:spChg chg="mod">
+          <ac:chgData name="Akdemir, Kerem Ziya" userId="a44fdb48-31b8-4682-ac1b-f99c482bb255" providerId="ADAL" clId="{688B7241-4242-4B42-B3A6-CEC9B70039E1}" dt="2024-07-05T22:38:21.361" v="60" actId="1076"/>
+          <ac:spMkLst>
+            <pc:docMk/>
+            <pc:sldMk cId="1561297468" sldId="259"/>
+            <ac:spMk id="7" creationId="{B1865684-2850-DB1B-1F42-E29B55FA351C}"/>
+          </ac:spMkLst>
+        </pc:spChg>
+        <pc:spChg chg="mod">
+          <ac:chgData name="Akdemir, Kerem Ziya" userId="a44fdb48-31b8-4682-ac1b-f99c482bb255" providerId="ADAL" clId="{688B7241-4242-4B42-B3A6-CEC9B70039E1}" dt="2024-07-05T22:38:21.361" v="60" actId="1076"/>
+          <ac:spMkLst>
+            <pc:docMk/>
+            <pc:sldMk cId="1561297468" sldId="259"/>
+            <ac:spMk id="8" creationId="{D61F2927-CB24-44D6-E18F-4C00FBB3C6A0}"/>
+          </ac:spMkLst>
+        </pc:spChg>
+        <pc:spChg chg="mod">
+          <ac:chgData name="Akdemir, Kerem Ziya" userId="a44fdb48-31b8-4682-ac1b-f99c482bb255" providerId="ADAL" clId="{688B7241-4242-4B42-B3A6-CEC9B70039E1}" dt="2024-07-05T22:38:57.045" v="63" actId="1076"/>
+          <ac:spMkLst>
+            <pc:docMk/>
+            <pc:sldMk cId="1561297468" sldId="259"/>
+            <ac:spMk id="9" creationId="{4A378E97-06E4-3D67-215E-4048FACDB2CC}"/>
+          </ac:spMkLst>
+        </pc:spChg>
+        <pc:spChg chg="mod">
+          <ac:chgData name="Akdemir, Kerem Ziya" userId="a44fdb48-31b8-4682-ac1b-f99c482bb255" providerId="ADAL" clId="{688B7241-4242-4B42-B3A6-CEC9B70039E1}" dt="2024-07-05T22:38:57.045" v="63" actId="1076"/>
+          <ac:spMkLst>
+            <pc:docMk/>
+            <pc:sldMk cId="1561297468" sldId="259"/>
+            <ac:spMk id="10" creationId="{38961DE5-152A-9484-9B37-B1D169B4E376}"/>
+          </ac:spMkLst>
+        </pc:spChg>
+        <pc:spChg chg="mod">
+          <ac:chgData name="Akdemir, Kerem Ziya" userId="a44fdb48-31b8-4682-ac1b-f99c482bb255" providerId="ADAL" clId="{688B7241-4242-4B42-B3A6-CEC9B70039E1}" dt="2024-07-05T22:38:57.045" v="63" actId="1076"/>
+          <ac:spMkLst>
+            <pc:docMk/>
+            <pc:sldMk cId="1561297468" sldId="259"/>
+            <ac:spMk id="11" creationId="{B9E85443-251C-270B-BCAD-376E6F095E5C}"/>
+          </ac:spMkLst>
+        </pc:spChg>
+        <pc:spChg chg="mod">
+          <ac:chgData name="Akdemir, Kerem Ziya" userId="a44fdb48-31b8-4682-ac1b-f99c482bb255" providerId="ADAL" clId="{688B7241-4242-4B42-B3A6-CEC9B70039E1}" dt="2024-07-05T22:38:21.361" v="60" actId="1076"/>
+          <ac:spMkLst>
+            <pc:docMk/>
+            <pc:sldMk cId="1561297468" sldId="259"/>
+            <ac:spMk id="12" creationId="{97B7D36B-26BE-C5D4-651B-98EA9F4929D5}"/>
+          </ac:spMkLst>
+        </pc:spChg>
+        <pc:spChg chg="mod">
+          <ac:chgData name="Akdemir, Kerem Ziya" userId="a44fdb48-31b8-4682-ac1b-f99c482bb255" providerId="ADAL" clId="{688B7241-4242-4B42-B3A6-CEC9B70039E1}" dt="2024-07-05T22:38:57.045" v="63" actId="1076"/>
+          <ac:spMkLst>
+            <pc:docMk/>
+            <pc:sldMk cId="1561297468" sldId="259"/>
+            <ac:spMk id="13" creationId="{693212AD-1BAC-9EB2-2B97-ACA37906FD19}"/>
+          </ac:spMkLst>
+        </pc:spChg>
+        <pc:spChg chg="mod">
+          <ac:chgData name="Akdemir, Kerem Ziya" userId="a44fdb48-31b8-4682-ac1b-f99c482bb255" providerId="ADAL" clId="{688B7241-4242-4B42-B3A6-CEC9B70039E1}" dt="2024-07-05T22:38:57.045" v="63" actId="1076"/>
+          <ac:spMkLst>
+            <pc:docMk/>
+            <pc:sldMk cId="1561297468" sldId="259"/>
+            <ac:spMk id="14" creationId="{837E6934-9FC7-5A58-56F2-45C25B14B237}"/>
+          </ac:spMkLst>
+        </pc:spChg>
+        <pc:spChg chg="mod">
+          <ac:chgData name="Akdemir, Kerem Ziya" userId="a44fdb48-31b8-4682-ac1b-f99c482bb255" providerId="ADAL" clId="{688B7241-4242-4B42-B3A6-CEC9B70039E1}" dt="2024-07-05T22:38:21.361" v="60" actId="1076"/>
+          <ac:spMkLst>
+            <pc:docMk/>
+            <pc:sldMk cId="1561297468" sldId="259"/>
+            <ac:spMk id="15" creationId="{38B3AF3C-66B8-D5D0-74A9-231092A5D3AE}"/>
+          </ac:spMkLst>
+        </pc:spChg>
+        <pc:spChg chg="mod">
+          <ac:chgData name="Akdemir, Kerem Ziya" userId="a44fdb48-31b8-4682-ac1b-f99c482bb255" providerId="ADAL" clId="{688B7241-4242-4B42-B3A6-CEC9B70039E1}" dt="2024-07-05T22:38:21.361" v="60" actId="1076"/>
+          <ac:spMkLst>
+            <pc:docMk/>
+            <pc:sldMk cId="1561297468" sldId="259"/>
+            <ac:spMk id="16" creationId="{F97B0C34-85B2-7005-198E-7DB03107F8E4}"/>
+          </ac:spMkLst>
+        </pc:spChg>
+        <pc:spChg chg="mod">
+          <ac:chgData name="Akdemir, Kerem Ziya" userId="a44fdb48-31b8-4682-ac1b-f99c482bb255" providerId="ADAL" clId="{688B7241-4242-4B42-B3A6-CEC9B70039E1}" dt="2024-07-05T22:38:57.045" v="63" actId="1076"/>
+          <ac:spMkLst>
+            <pc:docMk/>
+            <pc:sldMk cId="1561297468" sldId="259"/>
+            <ac:spMk id="17" creationId="{642E3721-18CC-B261-4DD1-7C2358069585}"/>
+          </ac:spMkLst>
+        </pc:spChg>
+        <pc:spChg chg="mod">
+          <ac:chgData name="Akdemir, Kerem Ziya" userId="a44fdb48-31b8-4682-ac1b-f99c482bb255" providerId="ADAL" clId="{688B7241-4242-4B42-B3A6-CEC9B70039E1}" dt="2024-07-05T22:38:57.045" v="63" actId="1076"/>
+          <ac:spMkLst>
+            <pc:docMk/>
+            <pc:sldMk cId="1561297468" sldId="259"/>
+            <ac:spMk id="18" creationId="{0518F1C4-F941-B855-62B5-55339C0AB53B}"/>
+          </ac:spMkLst>
+        </pc:spChg>
+        <pc:spChg chg="mod">
+          <ac:chgData name="Akdemir, Kerem Ziya" userId="a44fdb48-31b8-4682-ac1b-f99c482bb255" providerId="ADAL" clId="{688B7241-4242-4B42-B3A6-CEC9B70039E1}" dt="2024-07-05T22:38:57.045" v="63" actId="1076"/>
+          <ac:spMkLst>
+            <pc:docMk/>
+            <pc:sldMk cId="1561297468" sldId="259"/>
+            <ac:spMk id="19" creationId="{6E70DAAE-3F14-93FB-590E-056D7138A4DB}"/>
+          </ac:spMkLst>
+        </pc:spChg>
+        <pc:spChg chg="mod">
+          <ac:chgData name="Akdemir, Kerem Ziya" userId="a44fdb48-31b8-4682-ac1b-f99c482bb255" providerId="ADAL" clId="{688B7241-4242-4B42-B3A6-CEC9B70039E1}" dt="2024-07-05T22:38:57.045" v="63" actId="1076"/>
+          <ac:spMkLst>
+            <pc:docMk/>
+            <pc:sldMk cId="1561297468" sldId="259"/>
+            <ac:spMk id="20" creationId="{34DFD223-5D13-99A4-39BC-7B0EDB50FE47}"/>
+          </ac:spMkLst>
+        </pc:spChg>
+        <pc:spChg chg="mod">
+          <ac:chgData name="Akdemir, Kerem Ziya" userId="a44fdb48-31b8-4682-ac1b-f99c482bb255" providerId="ADAL" clId="{688B7241-4242-4B42-B3A6-CEC9B70039E1}" dt="2024-07-05T22:38:57.045" v="63" actId="1076"/>
+          <ac:spMkLst>
+            <pc:docMk/>
+            <pc:sldMk cId="1561297468" sldId="259"/>
+            <ac:spMk id="21" creationId="{7104DDB1-B7FB-D0A1-A6AA-8686A2DC85B2}"/>
+          </ac:spMkLst>
+        </pc:spChg>
+        <pc:spChg chg="mod">
+          <ac:chgData name="Akdemir, Kerem Ziya" userId="a44fdb48-31b8-4682-ac1b-f99c482bb255" providerId="ADAL" clId="{688B7241-4242-4B42-B3A6-CEC9B70039E1}" dt="2024-07-05T22:38:21.361" v="60" actId="1076"/>
+          <ac:spMkLst>
+            <pc:docMk/>
+            <pc:sldMk cId="1561297468" sldId="259"/>
+            <ac:spMk id="22" creationId="{62C06EB8-032B-7865-43D2-F85AD0C6C84A}"/>
+          </ac:spMkLst>
+        </pc:spChg>
+        <pc:spChg chg="mod">
+          <ac:chgData name="Akdemir, Kerem Ziya" userId="a44fdb48-31b8-4682-ac1b-f99c482bb255" providerId="ADAL" clId="{688B7241-4242-4B42-B3A6-CEC9B70039E1}" dt="2024-07-05T22:38:57.045" v="63" actId="1076"/>
+          <ac:spMkLst>
+            <pc:docMk/>
+            <pc:sldMk cId="1561297468" sldId="259"/>
+            <ac:spMk id="23" creationId="{47492D91-CA77-9B96-372F-366E598F0F26}"/>
+          </ac:spMkLst>
+        </pc:spChg>
+        <pc:spChg chg="mod">
+          <ac:chgData name="Akdemir, Kerem Ziya" userId="a44fdb48-31b8-4682-ac1b-f99c482bb255" providerId="ADAL" clId="{688B7241-4242-4B42-B3A6-CEC9B70039E1}" dt="2024-07-05T22:38:21.361" v="60" actId="1076"/>
+          <ac:spMkLst>
+            <pc:docMk/>
+            <pc:sldMk cId="1561297468" sldId="259"/>
+            <ac:spMk id="24" creationId="{3FB5AA8E-C9FA-D4C1-D973-1F3E0AF47A93}"/>
+          </ac:spMkLst>
+        </pc:spChg>
+        <pc:spChg chg="mod">
+          <ac:chgData name="Akdemir, Kerem Ziya" userId="a44fdb48-31b8-4682-ac1b-f99c482bb255" providerId="ADAL" clId="{688B7241-4242-4B42-B3A6-CEC9B70039E1}" dt="2024-07-05T22:38:21.361" v="60" actId="1076"/>
+          <ac:spMkLst>
+            <pc:docMk/>
+            <pc:sldMk cId="1561297468" sldId="259"/>
+            <ac:spMk id="27" creationId="{A1FAEFA3-B008-D0E1-1C0A-300BCFF49A02}"/>
+          </ac:spMkLst>
+        </pc:spChg>
+        <pc:spChg chg="mod">
+          <ac:chgData name="Akdemir, Kerem Ziya" userId="a44fdb48-31b8-4682-ac1b-f99c482bb255" providerId="ADAL" clId="{688B7241-4242-4B42-B3A6-CEC9B70039E1}" dt="2024-07-05T22:38:21.361" v="60" actId="1076"/>
+          <ac:spMkLst>
+            <pc:docMk/>
+            <pc:sldMk cId="1561297468" sldId="259"/>
+            <ac:spMk id="28" creationId="{9BB2B22B-DC15-6175-3DB5-0FAD2188D39C}"/>
+          </ac:spMkLst>
+        </pc:spChg>
+        <pc:spChg chg="mod">
+          <ac:chgData name="Akdemir, Kerem Ziya" userId="a44fdb48-31b8-4682-ac1b-f99c482bb255" providerId="ADAL" clId="{688B7241-4242-4B42-B3A6-CEC9B70039E1}" dt="2024-07-05T22:38:21.361" v="60" actId="1076"/>
+          <ac:spMkLst>
+            <pc:docMk/>
+            <pc:sldMk cId="1561297468" sldId="259"/>
+            <ac:spMk id="30" creationId="{E4061EFA-CB61-7904-32F7-4BC6B8819760}"/>
+          </ac:spMkLst>
+        </pc:spChg>
+        <pc:spChg chg="mod">
+          <ac:chgData name="Akdemir, Kerem Ziya" userId="a44fdb48-31b8-4682-ac1b-f99c482bb255" providerId="ADAL" clId="{688B7241-4242-4B42-B3A6-CEC9B70039E1}" dt="2024-07-05T22:38:21.361" v="60" actId="1076"/>
+          <ac:spMkLst>
+            <pc:docMk/>
+            <pc:sldMk cId="1561297468" sldId="259"/>
+            <ac:spMk id="31" creationId="{3B8B4632-23FE-40AE-F4E0-6381189E9A9C}"/>
+          </ac:spMkLst>
+        </pc:spChg>
+        <pc:spChg chg="mod">
+          <ac:chgData name="Akdemir, Kerem Ziya" userId="a44fdb48-31b8-4682-ac1b-f99c482bb255" providerId="ADAL" clId="{688B7241-4242-4B42-B3A6-CEC9B70039E1}" dt="2024-07-05T22:38:21.361" v="60" actId="1076"/>
+          <ac:spMkLst>
+            <pc:docMk/>
+            <pc:sldMk cId="1561297468" sldId="259"/>
+            <ac:spMk id="33" creationId="{176ADB8B-DD81-B6A3-A4ED-B3797B069ED0}"/>
+          </ac:spMkLst>
+        </pc:spChg>
+        <pc:spChg chg="mod">
+          <ac:chgData name="Akdemir, Kerem Ziya" userId="a44fdb48-31b8-4682-ac1b-f99c482bb255" providerId="ADAL" clId="{688B7241-4242-4B42-B3A6-CEC9B70039E1}" dt="2024-07-05T22:37:51.061" v="57" actId="1076"/>
+          <ac:spMkLst>
+            <pc:docMk/>
+            <pc:sldMk cId="1561297468" sldId="259"/>
+            <ac:spMk id="69" creationId="{A548EA52-DCAF-B2EB-92A2-086E447D22A7}"/>
+          </ac:spMkLst>
+        </pc:spChg>
+        <pc:spChg chg="mod">
+          <ac:chgData name="Akdemir, Kerem Ziya" userId="a44fdb48-31b8-4682-ac1b-f99c482bb255" providerId="ADAL" clId="{688B7241-4242-4B42-B3A6-CEC9B70039E1}" dt="2024-07-05T22:38:57.045" v="63" actId="1076"/>
+          <ac:spMkLst>
+            <pc:docMk/>
+            <pc:sldMk cId="1561297468" sldId="259"/>
+            <ac:spMk id="73" creationId="{8E1E13C2-6C2E-4AB6-F139-1E62EF5D8187}"/>
+          </ac:spMkLst>
+        </pc:spChg>
+        <pc:spChg chg="mod">
+          <ac:chgData name="Akdemir, Kerem Ziya" userId="a44fdb48-31b8-4682-ac1b-f99c482bb255" providerId="ADAL" clId="{688B7241-4242-4B42-B3A6-CEC9B70039E1}" dt="2024-07-05T22:38:57.045" v="63" actId="1076"/>
+          <ac:spMkLst>
+            <pc:docMk/>
+            <pc:sldMk cId="1561297468" sldId="259"/>
+            <ac:spMk id="76" creationId="{E71DFCF3-95DD-5D6D-4E38-3422D0413728}"/>
+          </ac:spMkLst>
+        </pc:spChg>
+        <pc:spChg chg="mod">
+          <ac:chgData name="Akdemir, Kerem Ziya" userId="a44fdb48-31b8-4682-ac1b-f99c482bb255" providerId="ADAL" clId="{688B7241-4242-4B42-B3A6-CEC9B70039E1}" dt="2024-07-05T22:38:57.045" v="63" actId="1076"/>
+          <ac:spMkLst>
+            <pc:docMk/>
+            <pc:sldMk cId="1561297468" sldId="259"/>
+            <ac:spMk id="78" creationId="{B5C271C9-94BA-C457-3161-CAE74165143F}"/>
+          </ac:spMkLst>
+        </pc:spChg>
+        <pc:spChg chg="mod">
+          <ac:chgData name="Akdemir, Kerem Ziya" userId="a44fdb48-31b8-4682-ac1b-f99c482bb255" providerId="ADAL" clId="{688B7241-4242-4B42-B3A6-CEC9B70039E1}" dt="2024-07-05T22:38:57.045" v="63" actId="1076"/>
+          <ac:spMkLst>
+            <pc:docMk/>
+            <pc:sldMk cId="1561297468" sldId="259"/>
+            <ac:spMk id="79" creationId="{F572373A-5C59-83DC-9387-0D95AAC4B423}"/>
+          </ac:spMkLst>
+        </pc:spChg>
+        <pc:spChg chg="mod">
+          <ac:chgData name="Akdemir, Kerem Ziya" userId="a44fdb48-31b8-4682-ac1b-f99c482bb255" providerId="ADAL" clId="{688B7241-4242-4B42-B3A6-CEC9B70039E1}" dt="2024-07-05T22:38:57.045" v="63" actId="1076"/>
+          <ac:spMkLst>
+            <pc:docMk/>
+            <pc:sldMk cId="1561297468" sldId="259"/>
+            <ac:spMk id="80" creationId="{F43D10B7-0699-B651-CF99-3028EAA26AF5}"/>
+          </ac:spMkLst>
+        </pc:spChg>
+        <pc:spChg chg="mod">
+          <ac:chgData name="Akdemir, Kerem Ziya" userId="a44fdb48-31b8-4682-ac1b-f99c482bb255" providerId="ADAL" clId="{688B7241-4242-4B42-B3A6-CEC9B70039E1}" dt="2024-07-05T22:38:57.045" v="63" actId="1076"/>
+          <ac:spMkLst>
+            <pc:docMk/>
+            <pc:sldMk cId="1561297468" sldId="259"/>
+            <ac:spMk id="82" creationId="{47210CBC-0B92-9D63-0811-5141A039EF09}"/>
+          </ac:spMkLst>
+        </pc:spChg>
+        <pc:spChg chg="mod">
+          <ac:chgData name="Akdemir, Kerem Ziya" userId="a44fdb48-31b8-4682-ac1b-f99c482bb255" providerId="ADAL" clId="{688B7241-4242-4B42-B3A6-CEC9B70039E1}" dt="2024-07-05T22:38:57.045" v="63" actId="1076"/>
+          <ac:spMkLst>
+            <pc:docMk/>
+            <pc:sldMk cId="1561297468" sldId="259"/>
+            <ac:spMk id="83" creationId="{4200D97D-D9A6-F677-332A-369774B9F0D0}"/>
+          </ac:spMkLst>
+        </pc:spChg>
+        <pc:spChg chg="mod">
+          <ac:chgData name="Akdemir, Kerem Ziya" userId="a44fdb48-31b8-4682-ac1b-f99c482bb255" providerId="ADAL" clId="{688B7241-4242-4B42-B3A6-CEC9B70039E1}" dt="2024-07-05T22:38:57.045" v="63" actId="1076"/>
+          <ac:spMkLst>
+            <pc:docMk/>
+            <pc:sldMk cId="1561297468" sldId="259"/>
+            <ac:spMk id="84" creationId="{A4C9BED8-E822-D6CC-A791-96650F113945}"/>
+          </ac:spMkLst>
+        </pc:spChg>
+        <pc:spChg chg="mod">
+          <ac:chgData name="Akdemir, Kerem Ziya" userId="a44fdb48-31b8-4682-ac1b-f99c482bb255" providerId="ADAL" clId="{688B7241-4242-4B42-B3A6-CEC9B70039E1}" dt="2024-07-05T22:38:57.045" v="63" actId="1076"/>
+          <ac:spMkLst>
+            <pc:docMk/>
+            <pc:sldMk cId="1561297468" sldId="259"/>
+            <ac:spMk id="85" creationId="{EE1C6801-5C4B-B36D-156B-DBA827001234}"/>
+          </ac:spMkLst>
+        </pc:spChg>
+        <pc:spChg chg="mod">
+          <ac:chgData name="Akdemir, Kerem Ziya" userId="a44fdb48-31b8-4682-ac1b-f99c482bb255" providerId="ADAL" clId="{688B7241-4242-4B42-B3A6-CEC9B70039E1}" dt="2024-07-05T22:38:57.045" v="63" actId="1076"/>
+          <ac:spMkLst>
+            <pc:docMk/>
+            <pc:sldMk cId="1561297468" sldId="259"/>
+            <ac:spMk id="87" creationId="{21F2B7A5-8DED-B1B1-2B57-C872ECF7D696}"/>
+          </ac:spMkLst>
+        </pc:spChg>
+        <pc:spChg chg="mod">
+          <ac:chgData name="Akdemir, Kerem Ziya" userId="a44fdb48-31b8-4682-ac1b-f99c482bb255" providerId="ADAL" clId="{688B7241-4242-4B42-B3A6-CEC9B70039E1}" dt="2024-07-05T22:38:57.045" v="63" actId="1076"/>
+          <ac:spMkLst>
+            <pc:docMk/>
+            <pc:sldMk cId="1561297468" sldId="259"/>
+            <ac:spMk id="88" creationId="{74D540A1-11CB-E467-47A7-1FD7574535B9}"/>
+          </ac:spMkLst>
+        </pc:spChg>
+        <pc:spChg chg="mod">
+          <ac:chgData name="Akdemir, Kerem Ziya" userId="a44fdb48-31b8-4682-ac1b-f99c482bb255" providerId="ADAL" clId="{688B7241-4242-4B42-B3A6-CEC9B70039E1}" dt="2024-07-05T22:38:57.045" v="63" actId="1076"/>
+          <ac:spMkLst>
+            <pc:docMk/>
+            <pc:sldMk cId="1561297468" sldId="259"/>
+            <ac:spMk id="89" creationId="{B9B80AF9-ACED-C8D5-9113-C13B3882CE97}"/>
+          </ac:spMkLst>
+        </pc:spChg>
+        <pc:spChg chg="mod">
+          <ac:chgData name="Akdemir, Kerem Ziya" userId="a44fdb48-31b8-4682-ac1b-f99c482bb255" providerId="ADAL" clId="{688B7241-4242-4B42-B3A6-CEC9B70039E1}" dt="2024-07-05T22:38:57.045" v="63" actId="1076"/>
+          <ac:spMkLst>
+            <pc:docMk/>
+            <pc:sldMk cId="1561297468" sldId="259"/>
+            <ac:spMk id="90" creationId="{C94E0401-B0DB-3B6F-65D5-40CC8D5AAE73}"/>
+          </ac:spMkLst>
+        </pc:spChg>
+        <pc:spChg chg="mod">
+          <ac:chgData name="Akdemir, Kerem Ziya" userId="a44fdb48-31b8-4682-ac1b-f99c482bb255" providerId="ADAL" clId="{688B7241-4242-4B42-B3A6-CEC9B70039E1}" dt="2024-07-05T22:38:57.045" v="63" actId="1076"/>
+          <ac:spMkLst>
+            <pc:docMk/>
+            <pc:sldMk cId="1561297468" sldId="259"/>
+            <ac:spMk id="92" creationId="{8A1AD63A-4B77-0C34-1336-6FDB5DC7B3B4}"/>
+          </ac:spMkLst>
+        </pc:spChg>
+        <pc:spChg chg="mod">
+          <ac:chgData name="Akdemir, Kerem Ziya" userId="a44fdb48-31b8-4682-ac1b-f99c482bb255" providerId="ADAL" clId="{688B7241-4242-4B42-B3A6-CEC9B70039E1}" dt="2024-07-05T22:38:57.045" v="63" actId="1076"/>
+          <ac:spMkLst>
+            <pc:docMk/>
+            <pc:sldMk cId="1561297468" sldId="259"/>
+            <ac:spMk id="93" creationId="{D82D5F00-7EDE-CEE4-E3BF-3A80CEFDFACF}"/>
+          </ac:spMkLst>
+        </pc:spChg>
+        <pc:spChg chg="mod">
+          <ac:chgData name="Akdemir, Kerem Ziya" userId="a44fdb48-31b8-4682-ac1b-f99c482bb255" providerId="ADAL" clId="{688B7241-4242-4B42-B3A6-CEC9B70039E1}" dt="2024-07-05T22:38:57.045" v="63" actId="1076"/>
+          <ac:spMkLst>
+            <pc:docMk/>
+            <pc:sldMk cId="1561297468" sldId="259"/>
+            <ac:spMk id="95" creationId="{05F11AD4-C19B-B9DB-9777-88105AD5FB02}"/>
+          </ac:spMkLst>
+        </pc:spChg>
+        <pc:spChg chg="mod">
+          <ac:chgData name="Akdemir, Kerem Ziya" userId="a44fdb48-31b8-4682-ac1b-f99c482bb255" providerId="ADAL" clId="{688B7241-4242-4B42-B3A6-CEC9B70039E1}" dt="2024-07-05T22:37:51.061" v="57" actId="1076"/>
+          <ac:spMkLst>
+            <pc:docMk/>
+            <pc:sldMk cId="1561297468" sldId="259"/>
+            <ac:spMk id="115" creationId="{283D696C-B31F-78E5-4493-6EEB7D15CC37}"/>
+          </ac:spMkLst>
+        </pc:spChg>
+        <pc:spChg chg="mod">
+          <ac:chgData name="Akdemir, Kerem Ziya" userId="a44fdb48-31b8-4682-ac1b-f99c482bb255" providerId="ADAL" clId="{688B7241-4242-4B42-B3A6-CEC9B70039E1}" dt="2024-07-05T22:38:57.045" v="63" actId="1076"/>
+          <ac:spMkLst>
+            <pc:docMk/>
+            <pc:sldMk cId="1561297468" sldId="259"/>
+            <ac:spMk id="116" creationId="{AC12CC03-10F0-FD45-EEFA-C216982F378F}"/>
+          </ac:spMkLst>
+        </pc:spChg>
+        <pc:spChg chg="mod">
+          <ac:chgData name="Akdemir, Kerem Ziya" userId="a44fdb48-31b8-4682-ac1b-f99c482bb255" providerId="ADAL" clId="{688B7241-4242-4B42-B3A6-CEC9B70039E1}" dt="2024-07-05T22:38:57.045" v="63" actId="1076"/>
+          <ac:spMkLst>
+            <pc:docMk/>
+            <pc:sldMk cId="1561297468" sldId="259"/>
+            <ac:spMk id="117" creationId="{3AA70F9F-63E6-60DA-7D3A-906BB3A691BB}"/>
+          </ac:spMkLst>
+        </pc:spChg>
+        <pc:spChg chg="mod">
+          <ac:chgData name="Akdemir, Kerem Ziya" userId="a44fdb48-31b8-4682-ac1b-f99c482bb255" providerId="ADAL" clId="{688B7241-4242-4B42-B3A6-CEC9B70039E1}" dt="2024-07-05T22:38:57.045" v="63" actId="1076"/>
+          <ac:spMkLst>
+            <pc:docMk/>
+            <pc:sldMk cId="1561297468" sldId="259"/>
+            <ac:spMk id="118" creationId="{C5610F4F-518F-9253-AD90-AB86DECFD8B2}"/>
+          </ac:spMkLst>
+        </pc:spChg>
+        <pc:spChg chg="mod">
+          <ac:chgData name="Akdemir, Kerem Ziya" userId="a44fdb48-31b8-4682-ac1b-f99c482bb255" providerId="ADAL" clId="{688B7241-4242-4B42-B3A6-CEC9B70039E1}" dt="2024-07-05T22:38:57.045" v="63" actId="1076"/>
+          <ac:spMkLst>
+            <pc:docMk/>
+            <pc:sldMk cId="1561297468" sldId="259"/>
+            <ac:spMk id="119" creationId="{753A1C81-1D1B-A6CB-DA06-02C5BEDB9C23}"/>
+          </ac:spMkLst>
+        </pc:spChg>
+        <pc:spChg chg="mod">
+          <ac:chgData name="Akdemir, Kerem Ziya" userId="a44fdb48-31b8-4682-ac1b-f99c482bb255" providerId="ADAL" clId="{688B7241-4242-4B42-B3A6-CEC9B70039E1}" dt="2024-07-05T22:38:57.045" v="63" actId="1076"/>
+          <ac:spMkLst>
+            <pc:docMk/>
+            <pc:sldMk cId="1561297468" sldId="259"/>
+            <ac:spMk id="120" creationId="{344DC336-DCF0-0526-6C77-9B43954F6A03}"/>
+          </ac:spMkLst>
+        </pc:spChg>
+        <pc:spChg chg="mod">
+          <ac:chgData name="Akdemir, Kerem Ziya" userId="a44fdb48-31b8-4682-ac1b-f99c482bb255" providerId="ADAL" clId="{688B7241-4242-4B42-B3A6-CEC9B70039E1}" dt="2024-07-05T22:38:57.045" v="63" actId="1076"/>
+          <ac:spMkLst>
+            <pc:docMk/>
+            <pc:sldMk cId="1561297468" sldId="259"/>
+            <ac:spMk id="121" creationId="{7D0815CA-2ECD-4244-6B2A-0D8C5DC44E7F}"/>
+          </ac:spMkLst>
+        </pc:spChg>
+        <pc:spChg chg="mod">
+          <ac:chgData name="Akdemir, Kerem Ziya" userId="a44fdb48-31b8-4682-ac1b-f99c482bb255" providerId="ADAL" clId="{688B7241-4242-4B42-B3A6-CEC9B70039E1}" dt="2024-07-05T22:38:57.045" v="63" actId="1076"/>
+          <ac:spMkLst>
+            <pc:docMk/>
+            <pc:sldMk cId="1561297468" sldId="259"/>
+            <ac:spMk id="122" creationId="{2B8D8DFA-2C48-7DC5-94A9-44F028B859E1}"/>
+          </ac:spMkLst>
+        </pc:spChg>
+        <pc:spChg chg="mod">
+          <ac:chgData name="Akdemir, Kerem Ziya" userId="a44fdb48-31b8-4682-ac1b-f99c482bb255" providerId="ADAL" clId="{688B7241-4242-4B42-B3A6-CEC9B70039E1}" dt="2024-07-05T22:38:57.045" v="63" actId="1076"/>
+          <ac:spMkLst>
+            <pc:docMk/>
+            <pc:sldMk cId="1561297468" sldId="259"/>
+            <ac:spMk id="123" creationId="{802D5A99-C2DE-717C-0AC2-65B039F5D258}"/>
+          </ac:spMkLst>
+        </pc:spChg>
+        <pc:spChg chg="mod">
+          <ac:chgData name="Akdemir, Kerem Ziya" userId="a44fdb48-31b8-4682-ac1b-f99c482bb255" providerId="ADAL" clId="{688B7241-4242-4B42-B3A6-CEC9B70039E1}" dt="2024-07-05T22:38:57.045" v="63" actId="1076"/>
+          <ac:spMkLst>
+            <pc:docMk/>
+            <pc:sldMk cId="1561297468" sldId="259"/>
+            <ac:spMk id="124" creationId="{4D74E9E4-4D9C-CA29-770B-2B3CCCEEDBF3}"/>
+          </ac:spMkLst>
+        </pc:spChg>
+        <pc:spChg chg="mod">
+          <ac:chgData name="Akdemir, Kerem Ziya" userId="a44fdb48-31b8-4682-ac1b-f99c482bb255" providerId="ADAL" clId="{688B7241-4242-4B42-B3A6-CEC9B70039E1}" dt="2024-07-05T22:38:57.045" v="63" actId="1076"/>
+          <ac:spMkLst>
+            <pc:docMk/>
+            <pc:sldMk cId="1561297468" sldId="259"/>
+            <ac:spMk id="125" creationId="{B870FE1D-1451-5F80-9397-9D9B638EA197}"/>
+          </ac:spMkLst>
+        </pc:spChg>
+        <pc:spChg chg="mod">
+          <ac:chgData name="Akdemir, Kerem Ziya" userId="a44fdb48-31b8-4682-ac1b-f99c482bb255" providerId="ADAL" clId="{688B7241-4242-4B42-B3A6-CEC9B70039E1}" dt="2024-07-05T22:38:57.045" v="63" actId="1076"/>
+          <ac:spMkLst>
+            <pc:docMk/>
+            <pc:sldMk cId="1561297468" sldId="259"/>
+            <ac:spMk id="126" creationId="{0DF977DD-87BE-E277-689C-1BA86D3D2A85}"/>
+          </ac:spMkLst>
+        </pc:spChg>
+        <pc:spChg chg="mod">
+          <ac:chgData name="Akdemir, Kerem Ziya" userId="a44fdb48-31b8-4682-ac1b-f99c482bb255" providerId="ADAL" clId="{688B7241-4242-4B42-B3A6-CEC9B70039E1}" dt="2024-07-05T22:38:57.045" v="63" actId="1076"/>
+          <ac:spMkLst>
+            <pc:docMk/>
+            <pc:sldMk cId="1561297468" sldId="259"/>
+            <ac:spMk id="127" creationId="{36C6E98D-23EF-A30E-B9C7-8FCFAEE25D40}"/>
+          </ac:spMkLst>
+        </pc:spChg>
+        <pc:spChg chg="mod">
+          <ac:chgData name="Akdemir, Kerem Ziya" userId="a44fdb48-31b8-4682-ac1b-f99c482bb255" providerId="ADAL" clId="{688B7241-4242-4B42-B3A6-CEC9B70039E1}" dt="2024-07-05T22:37:51.061" v="57" actId="1076"/>
+          <ac:spMkLst>
+            <pc:docMk/>
+            <pc:sldMk cId="1561297468" sldId="259"/>
+            <ac:spMk id="168" creationId="{E507A68A-0934-AEC8-F501-7695CBC47A37}"/>
+          </ac:spMkLst>
+        </pc:spChg>
+        <pc:spChg chg="mod">
+          <ac:chgData name="Akdemir, Kerem Ziya" userId="a44fdb48-31b8-4682-ac1b-f99c482bb255" providerId="ADAL" clId="{688B7241-4242-4B42-B3A6-CEC9B70039E1}" dt="2024-07-05T22:37:51.061" v="57" actId="1076"/>
+          <ac:spMkLst>
+            <pc:docMk/>
+            <pc:sldMk cId="1561297468" sldId="259"/>
+            <ac:spMk id="169" creationId="{0FEF467F-C07A-0DC0-BAC2-46CE7E880FB2}"/>
+          </ac:spMkLst>
+        </pc:spChg>
+        <pc:spChg chg="del mod">
+          <ac:chgData name="Akdemir, Kerem Ziya" userId="a44fdb48-31b8-4682-ac1b-f99c482bb255" providerId="ADAL" clId="{688B7241-4242-4B42-B3A6-CEC9B70039E1}" dt="2024-07-05T22:36:25.879" v="53" actId="478"/>
+          <ac:spMkLst>
+            <pc:docMk/>
+            <pc:sldMk cId="1561297468" sldId="259"/>
+            <ac:spMk id="173" creationId="{A2449F04-0C72-AB9C-B08D-AD5256152A25}"/>
+          </ac:spMkLst>
+        </pc:spChg>
+        <pc:spChg chg="mod">
+          <ac:chgData name="Akdemir, Kerem Ziya" userId="a44fdb48-31b8-4682-ac1b-f99c482bb255" providerId="ADAL" clId="{688B7241-4242-4B42-B3A6-CEC9B70039E1}" dt="2024-07-05T22:37:51.061" v="57" actId="1076"/>
+          <ac:spMkLst>
+            <pc:docMk/>
+            <pc:sldMk cId="1561297468" sldId="259"/>
+            <ac:spMk id="174" creationId="{BA70FBCA-6B3B-575D-6663-463695E47EA8}"/>
+          </ac:spMkLst>
+        </pc:spChg>
+        <pc:spChg chg="del mod">
+          <ac:chgData name="Akdemir, Kerem Ziya" userId="a44fdb48-31b8-4682-ac1b-f99c482bb255" providerId="ADAL" clId="{688B7241-4242-4B42-B3A6-CEC9B70039E1}" dt="2024-07-05T22:36:25.879" v="53" actId="478"/>
+          <ac:spMkLst>
+            <pc:docMk/>
+            <pc:sldMk cId="1561297468" sldId="259"/>
+            <ac:spMk id="175" creationId="{4CC9177B-970B-54A0-390E-EAF09E73384E}"/>
+          </ac:spMkLst>
+        </pc:spChg>
+        <pc:spChg chg="mod">
+          <ac:chgData name="Akdemir, Kerem Ziya" userId="a44fdb48-31b8-4682-ac1b-f99c482bb255" providerId="ADAL" clId="{688B7241-4242-4B42-B3A6-CEC9B70039E1}" dt="2024-07-05T22:37:51.061" v="57" actId="1076"/>
+          <ac:spMkLst>
+            <pc:docMk/>
+            <pc:sldMk cId="1561297468" sldId="259"/>
+            <ac:spMk id="176" creationId="{A10A5615-01C8-4A79-B1A9-D65748D2CB66}"/>
+          </ac:spMkLst>
+        </pc:spChg>
+        <pc:spChg chg="mod">
+          <ac:chgData name="Akdemir, Kerem Ziya" userId="a44fdb48-31b8-4682-ac1b-f99c482bb255" providerId="ADAL" clId="{688B7241-4242-4B42-B3A6-CEC9B70039E1}" dt="2024-07-05T22:37:51.061" v="57" actId="1076"/>
+          <ac:spMkLst>
+            <pc:docMk/>
+            <pc:sldMk cId="1561297468" sldId="259"/>
+            <ac:spMk id="177" creationId="{94FA3CC2-9EB1-0B90-6A3E-8D1B3940F825}"/>
+          </ac:spMkLst>
+        </pc:spChg>
+        <pc:spChg chg="mod">
+          <ac:chgData name="Akdemir, Kerem Ziya" userId="a44fdb48-31b8-4682-ac1b-f99c482bb255" providerId="ADAL" clId="{688B7241-4242-4B42-B3A6-CEC9B70039E1}" dt="2024-07-05T22:37:51.061" v="57" actId="1076"/>
+          <ac:spMkLst>
+            <pc:docMk/>
+            <pc:sldMk cId="1561297468" sldId="259"/>
+            <ac:spMk id="178" creationId="{F0E6D624-D835-2EB2-3420-7C4F807F486E}"/>
+          </ac:spMkLst>
+        </pc:spChg>
+        <pc:spChg chg="mod">
+          <ac:chgData name="Akdemir, Kerem Ziya" userId="a44fdb48-31b8-4682-ac1b-f99c482bb255" providerId="ADAL" clId="{688B7241-4242-4B42-B3A6-CEC9B70039E1}" dt="2024-07-05T22:38:57.045" v="63" actId="1076"/>
+          <ac:spMkLst>
+            <pc:docMk/>
+            <pc:sldMk cId="1561297468" sldId="259"/>
+            <ac:spMk id="187" creationId="{866BD045-0D71-D3A4-075C-20B230B1C250}"/>
+          </ac:spMkLst>
+        </pc:spChg>
+        <pc:spChg chg="mod">
+          <ac:chgData name="Akdemir, Kerem Ziya" userId="a44fdb48-31b8-4682-ac1b-f99c482bb255" providerId="ADAL" clId="{688B7241-4242-4B42-B3A6-CEC9B70039E1}" dt="2024-07-05T22:38:57.045" v="63" actId="1076"/>
+          <ac:spMkLst>
+            <pc:docMk/>
+            <pc:sldMk cId="1561297468" sldId="259"/>
+            <ac:spMk id="193" creationId="{39AE2F9D-80A6-6851-190B-FE76EEAD34C3}"/>
+          </ac:spMkLst>
+        </pc:spChg>
+        <pc:spChg chg="mod">
+          <ac:chgData name="Akdemir, Kerem Ziya" userId="a44fdb48-31b8-4682-ac1b-f99c482bb255" providerId="ADAL" clId="{688B7241-4242-4B42-B3A6-CEC9B70039E1}" dt="2024-07-05T22:38:57.045" v="63" actId="1076"/>
+          <ac:spMkLst>
+            <pc:docMk/>
+            <pc:sldMk cId="1561297468" sldId="259"/>
+            <ac:spMk id="211" creationId="{79310BCE-21CC-CE26-417B-8E748C64788B}"/>
+          </ac:spMkLst>
+        </pc:spChg>
+        <pc:spChg chg="mod">
+          <ac:chgData name="Akdemir, Kerem Ziya" userId="a44fdb48-31b8-4682-ac1b-f99c482bb255" providerId="ADAL" clId="{688B7241-4242-4B42-B3A6-CEC9B70039E1}" dt="2024-07-05T22:38:57.045" v="63" actId="1076"/>
+          <ac:spMkLst>
+            <pc:docMk/>
+            <pc:sldMk cId="1561297468" sldId="259"/>
+            <ac:spMk id="215" creationId="{A69E60D2-9C65-9A85-CC38-335C3C86CADE}"/>
+          </ac:spMkLst>
+        </pc:spChg>
+        <pc:spChg chg="mod">
+          <ac:chgData name="Akdemir, Kerem Ziya" userId="a44fdb48-31b8-4682-ac1b-f99c482bb255" providerId="ADAL" clId="{688B7241-4242-4B42-B3A6-CEC9B70039E1}" dt="2024-07-05T22:38:57.045" v="63" actId="1076"/>
+          <ac:spMkLst>
+            <pc:docMk/>
+            <pc:sldMk cId="1561297468" sldId="259"/>
+            <ac:spMk id="234" creationId="{03AA7256-4E8D-2127-0318-6EC4B10467A4}"/>
+          </ac:spMkLst>
+        </pc:spChg>
+        <pc:spChg chg="mod">
+          <ac:chgData name="Akdemir, Kerem Ziya" userId="a44fdb48-31b8-4682-ac1b-f99c482bb255" providerId="ADAL" clId="{688B7241-4242-4B42-B3A6-CEC9B70039E1}" dt="2024-07-05T22:13:41.244" v="9" actId="20577"/>
+          <ac:spMkLst>
+            <pc:docMk/>
+            <pc:sldMk cId="1561297468" sldId="259"/>
+            <ac:spMk id="238" creationId="{2171A0DD-0E2D-9DD2-43C8-B9E404D77F7E}"/>
+          </ac:spMkLst>
+        </pc:spChg>
+        <pc:spChg chg="mod">
+          <ac:chgData name="Akdemir, Kerem Ziya" userId="a44fdb48-31b8-4682-ac1b-f99c482bb255" providerId="ADAL" clId="{688B7241-4242-4B42-B3A6-CEC9B70039E1}" dt="2024-07-05T22:38:57.045" v="63" actId="1076"/>
+          <ac:spMkLst>
+            <pc:docMk/>
+            <pc:sldMk cId="1561297468" sldId="259"/>
+            <ac:spMk id="252" creationId="{87A4BB87-ECC1-681D-8DB6-98DC9DF304AA}"/>
+          </ac:spMkLst>
+        </pc:spChg>
+        <pc:spChg chg="mod">
+          <ac:chgData name="Akdemir, Kerem Ziya" userId="a44fdb48-31b8-4682-ac1b-f99c482bb255" providerId="ADAL" clId="{688B7241-4242-4B42-B3A6-CEC9B70039E1}" dt="2024-07-05T22:37:51.061" v="57" actId="1076"/>
+          <ac:spMkLst>
+            <pc:docMk/>
+            <pc:sldMk cId="1561297468" sldId="259"/>
+            <ac:spMk id="1025" creationId="{69C1CAEE-EE66-4376-B835-D40D5BEBA48C}"/>
+          </ac:spMkLst>
+        </pc:spChg>
+        <pc:spChg chg="mod">
+          <ac:chgData name="Akdemir, Kerem Ziya" userId="a44fdb48-31b8-4682-ac1b-f99c482bb255" providerId="ADAL" clId="{688B7241-4242-4B42-B3A6-CEC9B70039E1}" dt="2024-07-05T22:38:57.045" v="63" actId="1076"/>
+          <ac:spMkLst>
+            <pc:docMk/>
+            <pc:sldMk cId="1561297468" sldId="259"/>
+            <ac:spMk id="1028" creationId="{740E7B30-6E6E-871A-24D2-00F6B466E0F7}"/>
+          </ac:spMkLst>
+        </pc:spChg>
+        <pc:spChg chg="mod">
+          <ac:chgData name="Akdemir, Kerem Ziya" userId="a44fdb48-31b8-4682-ac1b-f99c482bb255" providerId="ADAL" clId="{688B7241-4242-4B42-B3A6-CEC9B70039E1}" dt="2024-07-05T22:37:51.061" v="57" actId="1076"/>
+          <ac:spMkLst>
+            <pc:docMk/>
+            <pc:sldMk cId="1561297468" sldId="259"/>
+            <ac:spMk id="1029" creationId="{EF2D51DE-535C-7FAA-7046-72301236C07D}"/>
+          </ac:spMkLst>
+        </pc:spChg>
+        <pc:spChg chg="mod">
+          <ac:chgData name="Akdemir, Kerem Ziya" userId="a44fdb48-31b8-4682-ac1b-f99c482bb255" providerId="ADAL" clId="{688B7241-4242-4B42-B3A6-CEC9B70039E1}" dt="2024-07-05T22:38:57.045" v="63" actId="1076"/>
+          <ac:spMkLst>
+            <pc:docMk/>
+            <pc:sldMk cId="1561297468" sldId="259"/>
+            <ac:spMk id="1030" creationId="{5C993D5A-3408-3878-526E-C51CD6304BD6}"/>
+          </ac:spMkLst>
+        </pc:spChg>
+        <pc:spChg chg="mod">
+          <ac:chgData name="Akdemir, Kerem Ziya" userId="a44fdb48-31b8-4682-ac1b-f99c482bb255" providerId="ADAL" clId="{688B7241-4242-4B42-B3A6-CEC9B70039E1}" dt="2024-07-05T22:38:57.045" v="63" actId="1076"/>
+          <ac:spMkLst>
+            <pc:docMk/>
+            <pc:sldMk cId="1561297468" sldId="259"/>
+            <ac:spMk id="1031" creationId="{C99E0CB9-7447-47CD-F2FA-32370F91FA3F}"/>
+          </ac:spMkLst>
+        </pc:spChg>
+        <pc:spChg chg="mod">
+          <ac:chgData name="Akdemir, Kerem Ziya" userId="a44fdb48-31b8-4682-ac1b-f99c482bb255" providerId="ADAL" clId="{688B7241-4242-4B42-B3A6-CEC9B70039E1}" dt="2024-07-05T22:38:57.045" v="63" actId="1076"/>
+          <ac:spMkLst>
+            <pc:docMk/>
+            <pc:sldMk cId="1561297468" sldId="259"/>
+            <ac:spMk id="1034" creationId="{DDCC987A-CCD3-E325-F137-A9919F83BD2B}"/>
+          </ac:spMkLst>
+        </pc:spChg>
+        <pc:spChg chg="mod">
+          <ac:chgData name="Akdemir, Kerem Ziya" userId="a44fdb48-31b8-4682-ac1b-f99c482bb255" providerId="ADAL" clId="{688B7241-4242-4B42-B3A6-CEC9B70039E1}" dt="2024-07-05T22:37:51.061" v="57" actId="1076"/>
+          <ac:spMkLst>
+            <pc:docMk/>
+            <pc:sldMk cId="1561297468" sldId="259"/>
+            <ac:spMk id="1035" creationId="{1D658734-AEE9-10C4-8448-E010227D5C56}"/>
+          </ac:spMkLst>
+        </pc:spChg>
+        <pc:spChg chg="mod">
+          <ac:chgData name="Akdemir, Kerem Ziya" userId="a44fdb48-31b8-4682-ac1b-f99c482bb255" providerId="ADAL" clId="{688B7241-4242-4B42-B3A6-CEC9B70039E1}" dt="2024-07-05T22:37:51.061" v="57" actId="1076"/>
+          <ac:spMkLst>
+            <pc:docMk/>
+            <pc:sldMk cId="1561297468" sldId="259"/>
+            <ac:spMk id="1036" creationId="{A9BC6E5B-6A8D-5F9C-20BC-7DD54165773C}"/>
+          </ac:spMkLst>
+        </pc:spChg>
+        <pc:spChg chg="mod">
+          <ac:chgData name="Akdemir, Kerem Ziya" userId="a44fdb48-31b8-4682-ac1b-f99c482bb255" providerId="ADAL" clId="{688B7241-4242-4B42-B3A6-CEC9B70039E1}" dt="2024-07-05T22:37:51.061" v="57" actId="1076"/>
+          <ac:spMkLst>
+            <pc:docMk/>
+            <pc:sldMk cId="1561297468" sldId="259"/>
+            <ac:spMk id="1037" creationId="{496DCF52-D364-BBAE-2597-49CDED33693D}"/>
+          </ac:spMkLst>
+        </pc:spChg>
+        <pc:spChg chg="mod">
+          <ac:chgData name="Akdemir, Kerem Ziya" userId="a44fdb48-31b8-4682-ac1b-f99c482bb255" providerId="ADAL" clId="{688B7241-4242-4B42-B3A6-CEC9B70039E1}" dt="2024-07-05T22:38:57.045" v="63" actId="1076"/>
+          <ac:spMkLst>
+            <pc:docMk/>
+            <pc:sldMk cId="1561297468" sldId="259"/>
+            <ac:spMk id="1043" creationId="{1A1F34E8-FC5B-2292-CBF2-88D81D070540}"/>
+          </ac:spMkLst>
+        </pc:spChg>
+        <pc:spChg chg="add mod">
+          <ac:chgData name="Akdemir, Kerem Ziya" userId="a44fdb48-31b8-4682-ac1b-f99c482bb255" providerId="ADAL" clId="{688B7241-4242-4B42-B3A6-CEC9B70039E1}" dt="2024-07-05T22:37:51.061" v="57" actId="1076"/>
+          <ac:spMkLst>
+            <pc:docMk/>
+            <pc:sldMk cId="1561297468" sldId="259"/>
+            <ac:spMk id="1044" creationId="{08299810-C03B-4556-2F80-E5FA67534F79}"/>
+          </ac:spMkLst>
+        </pc:spChg>
+        <pc:spChg chg="mod">
+          <ac:chgData name="Akdemir, Kerem Ziya" userId="a44fdb48-31b8-4682-ac1b-f99c482bb255" providerId="ADAL" clId="{688B7241-4242-4B42-B3A6-CEC9B70039E1}" dt="2024-07-05T22:38:57.045" v="63" actId="1076"/>
+          <ac:spMkLst>
+            <pc:docMk/>
+            <pc:sldMk cId="1561297468" sldId="259"/>
+            <ac:spMk id="1045" creationId="{9F53811C-0760-FE53-669C-DC452A03CE3C}"/>
+          </ac:spMkLst>
+        </pc:spChg>
+        <pc:spChg chg="mod">
+          <ac:chgData name="Akdemir, Kerem Ziya" userId="a44fdb48-31b8-4682-ac1b-f99c482bb255" providerId="ADAL" clId="{688B7241-4242-4B42-B3A6-CEC9B70039E1}" dt="2024-07-05T22:38:57.045" v="63" actId="1076"/>
+          <ac:spMkLst>
+            <pc:docMk/>
+            <pc:sldMk cId="1561297468" sldId="259"/>
+            <ac:spMk id="1047" creationId="{39CD0443-280A-9C9E-F2EA-7DF797569130}"/>
+          </ac:spMkLst>
+        </pc:spChg>
+        <pc:spChg chg="add mod">
+          <ac:chgData name="Akdemir, Kerem Ziya" userId="a44fdb48-31b8-4682-ac1b-f99c482bb255" providerId="ADAL" clId="{688B7241-4242-4B42-B3A6-CEC9B70039E1}" dt="2024-07-05T22:37:51.061" v="57" actId="1076"/>
+          <ac:spMkLst>
+            <pc:docMk/>
+            <pc:sldMk cId="1561297468" sldId="259"/>
+            <ac:spMk id="1056" creationId="{9ED0D0B2-8208-6134-28A8-BC7EACCFA50F}"/>
+          </ac:spMkLst>
+        </pc:spChg>
+        <pc:spChg chg="mod">
+          <ac:chgData name="Akdemir, Kerem Ziya" userId="a44fdb48-31b8-4682-ac1b-f99c482bb255" providerId="ADAL" clId="{688B7241-4242-4B42-B3A6-CEC9B70039E1}" dt="2024-07-05T22:37:51.061" v="57" actId="1076"/>
+          <ac:spMkLst>
+            <pc:docMk/>
+            <pc:sldMk cId="1561297468" sldId="259"/>
+            <ac:spMk id="1060" creationId="{5F79A0F7-5A29-1E65-7654-C14AAF983CEC}"/>
+          </ac:spMkLst>
+        </pc:spChg>
+        <pc:spChg chg="mod">
+          <ac:chgData name="Akdemir, Kerem Ziya" userId="a44fdb48-31b8-4682-ac1b-f99c482bb255" providerId="ADAL" clId="{688B7241-4242-4B42-B3A6-CEC9B70039E1}" dt="2024-07-05T22:37:51.061" v="57" actId="1076"/>
+          <ac:spMkLst>
+            <pc:docMk/>
+            <pc:sldMk cId="1561297468" sldId="259"/>
+            <ac:spMk id="1061" creationId="{39050ACC-B89F-91BD-0516-0E045F142D1E}"/>
+          </ac:spMkLst>
+        </pc:spChg>
+        <pc:spChg chg="mod">
+          <ac:chgData name="Akdemir, Kerem Ziya" userId="a44fdb48-31b8-4682-ac1b-f99c482bb255" providerId="ADAL" clId="{688B7241-4242-4B42-B3A6-CEC9B70039E1}" dt="2024-07-05T22:38:57.045" v="63" actId="1076"/>
+          <ac:spMkLst>
+            <pc:docMk/>
+            <pc:sldMk cId="1561297468" sldId="259"/>
+            <ac:spMk id="1062" creationId="{6FEA9E74-6A1F-318E-8BC6-66F44ACAE956}"/>
+          </ac:spMkLst>
+        </pc:spChg>
+        <pc:spChg chg="mod">
+          <ac:chgData name="Akdemir, Kerem Ziya" userId="a44fdb48-31b8-4682-ac1b-f99c482bb255" providerId="ADAL" clId="{688B7241-4242-4B42-B3A6-CEC9B70039E1}" dt="2024-07-05T22:38:57.045" v="63" actId="1076"/>
+          <ac:spMkLst>
+            <pc:docMk/>
+            <pc:sldMk cId="1561297468" sldId="259"/>
+            <ac:spMk id="1069" creationId="{4E2679A8-855E-7623-EF6A-A98DDFDE3607}"/>
+          </ac:spMkLst>
+        </pc:spChg>
+        <pc:spChg chg="mod">
+          <ac:chgData name="Akdemir, Kerem Ziya" userId="a44fdb48-31b8-4682-ac1b-f99c482bb255" providerId="ADAL" clId="{688B7241-4242-4B42-B3A6-CEC9B70039E1}" dt="2024-07-05T22:38:57.045" v="63" actId="1076"/>
+          <ac:spMkLst>
+            <pc:docMk/>
+            <pc:sldMk cId="1561297468" sldId="259"/>
+            <ac:spMk id="1070" creationId="{CA0C86D5-D47D-C19F-1ED0-0BCB0B5DD2A0}"/>
+          </ac:spMkLst>
+        </pc:spChg>
+        <pc:spChg chg="mod">
+          <ac:chgData name="Akdemir, Kerem Ziya" userId="a44fdb48-31b8-4682-ac1b-f99c482bb255" providerId="ADAL" clId="{688B7241-4242-4B42-B3A6-CEC9B70039E1}" dt="2024-07-05T22:38:57.045" v="63" actId="1076"/>
+          <ac:spMkLst>
+            <pc:docMk/>
+            <pc:sldMk cId="1561297468" sldId="259"/>
+            <ac:spMk id="1072" creationId="{459836FD-AE04-01CD-4A97-7565126B1A89}"/>
+          </ac:spMkLst>
+        </pc:spChg>
+        <pc:spChg chg="mod">
+          <ac:chgData name="Akdemir, Kerem Ziya" userId="a44fdb48-31b8-4682-ac1b-f99c482bb255" providerId="ADAL" clId="{688B7241-4242-4B42-B3A6-CEC9B70039E1}" dt="2024-07-05T22:38:57.045" v="63" actId="1076"/>
+          <ac:spMkLst>
+            <pc:docMk/>
+            <pc:sldMk cId="1561297468" sldId="259"/>
+            <ac:spMk id="1123" creationId="{42A24FBB-1F90-5CA0-5FA4-CD7238DCCC18}"/>
+          </ac:spMkLst>
+        </pc:spChg>
+        <pc:grpChg chg="mod">
+          <ac:chgData name="Akdemir, Kerem Ziya" userId="a44fdb48-31b8-4682-ac1b-f99c482bb255" providerId="ADAL" clId="{688B7241-4242-4B42-B3A6-CEC9B70039E1}" dt="2024-07-05T22:38:57.045" v="63" actId="1076"/>
+          <ac:grpSpMkLst>
+            <pc:docMk/>
+            <pc:sldMk cId="1561297468" sldId="259"/>
+            <ac:grpSpMk id="2" creationId="{A31235FE-1054-508F-F126-6679D7FC9B75}"/>
+          </ac:grpSpMkLst>
+        </pc:grpChg>
+        <pc:grpChg chg="mod">
+          <ac:chgData name="Akdemir, Kerem Ziya" userId="a44fdb48-31b8-4682-ac1b-f99c482bb255" providerId="ADAL" clId="{688B7241-4242-4B42-B3A6-CEC9B70039E1}" dt="2024-07-05T22:38:57.045" v="63" actId="1076"/>
+          <ac:grpSpMkLst>
+            <pc:docMk/>
+            <pc:sldMk cId="1561297468" sldId="259"/>
+            <ac:grpSpMk id="34" creationId="{33316222-7F4E-AE27-A32E-A791EBE9B4FC}"/>
+          </ac:grpSpMkLst>
+        </pc:grpChg>
+        <pc:grpChg chg="mod">
+          <ac:chgData name="Akdemir, Kerem Ziya" userId="a44fdb48-31b8-4682-ac1b-f99c482bb255" providerId="ADAL" clId="{688B7241-4242-4B42-B3A6-CEC9B70039E1}" dt="2024-07-05T22:38:57.045" v="63" actId="1076"/>
+          <ac:grpSpMkLst>
+            <pc:docMk/>
+            <pc:sldMk cId="1561297468" sldId="259"/>
+            <ac:grpSpMk id="37" creationId="{CBA3D65C-E3C2-9A56-85A9-66F34E648FA0}"/>
+          </ac:grpSpMkLst>
+        </pc:grpChg>
+        <pc:grpChg chg="mod">
+          <ac:chgData name="Akdemir, Kerem Ziya" userId="a44fdb48-31b8-4682-ac1b-f99c482bb255" providerId="ADAL" clId="{688B7241-4242-4B42-B3A6-CEC9B70039E1}" dt="2024-07-05T22:38:57.045" v="63" actId="1076"/>
+          <ac:grpSpMkLst>
+            <pc:docMk/>
+            <pc:sldMk cId="1561297468" sldId="259"/>
+            <ac:grpSpMk id="40" creationId="{D8922D49-3703-A323-3830-BD5664C630D2}"/>
+          </ac:grpSpMkLst>
+        </pc:grpChg>
+        <pc:grpChg chg="mod">
+          <ac:chgData name="Akdemir, Kerem Ziya" userId="a44fdb48-31b8-4682-ac1b-f99c482bb255" providerId="ADAL" clId="{688B7241-4242-4B42-B3A6-CEC9B70039E1}" dt="2024-07-05T22:38:57.045" v="63" actId="1076"/>
+          <ac:grpSpMkLst>
+            <pc:docMk/>
+            <pc:sldMk cId="1561297468" sldId="259"/>
+            <ac:grpSpMk id="43" creationId="{101B3618-DCAE-7D48-1CF9-98BF52227FC8}"/>
+          </ac:grpSpMkLst>
+        </pc:grpChg>
+        <pc:grpChg chg="mod">
+          <ac:chgData name="Akdemir, Kerem Ziya" userId="a44fdb48-31b8-4682-ac1b-f99c482bb255" providerId="ADAL" clId="{688B7241-4242-4B42-B3A6-CEC9B70039E1}" dt="2024-07-05T22:38:57.045" v="63" actId="1076"/>
+          <ac:grpSpMkLst>
+            <pc:docMk/>
+            <pc:sldMk cId="1561297468" sldId="259"/>
+            <ac:grpSpMk id="48" creationId="{D2F59392-5F18-3CCD-F410-FB5BC6B3B9B4}"/>
+          </ac:grpSpMkLst>
+        </pc:grpChg>
+        <pc:grpChg chg="mod">
+          <ac:chgData name="Akdemir, Kerem Ziya" userId="a44fdb48-31b8-4682-ac1b-f99c482bb255" providerId="ADAL" clId="{688B7241-4242-4B42-B3A6-CEC9B70039E1}" dt="2024-07-05T22:38:57.045" v="63" actId="1076"/>
+          <ac:grpSpMkLst>
+            <pc:docMk/>
+            <pc:sldMk cId="1561297468" sldId="259"/>
+            <ac:grpSpMk id="51" creationId="{84734114-E705-2622-1ED0-BAC8B3DD31B4}"/>
+          </ac:grpSpMkLst>
+        </pc:grpChg>
+        <pc:grpChg chg="mod">
+          <ac:chgData name="Akdemir, Kerem Ziya" userId="a44fdb48-31b8-4682-ac1b-f99c482bb255" providerId="ADAL" clId="{688B7241-4242-4B42-B3A6-CEC9B70039E1}" dt="2024-07-05T22:38:57.045" v="63" actId="1076"/>
+          <ac:grpSpMkLst>
+            <pc:docMk/>
+            <pc:sldMk cId="1561297468" sldId="259"/>
+            <ac:grpSpMk id="1089" creationId="{A12DBFF5-D481-1B29-20D4-E4B9A05FDCB8}"/>
+          </ac:grpSpMkLst>
+        </pc:grpChg>
+        <pc:grpChg chg="mod">
+          <ac:chgData name="Akdemir, Kerem Ziya" userId="a44fdb48-31b8-4682-ac1b-f99c482bb255" providerId="ADAL" clId="{688B7241-4242-4B42-B3A6-CEC9B70039E1}" dt="2024-07-05T22:38:57.045" v="63" actId="1076"/>
+          <ac:grpSpMkLst>
+            <pc:docMk/>
+            <pc:sldMk cId="1561297468" sldId="259"/>
+            <ac:grpSpMk id="1090" creationId="{582D3EFA-687B-D60B-B489-4FEB8B6BF073}"/>
+          </ac:grpSpMkLst>
+        </pc:grpChg>
+        <pc:cxnChg chg="mod">
+          <ac:chgData name="Akdemir, Kerem Ziya" userId="a44fdb48-31b8-4682-ac1b-f99c482bb255" providerId="ADAL" clId="{688B7241-4242-4B42-B3A6-CEC9B70039E1}" dt="2024-07-05T22:38:57.045" v="63" actId="1076"/>
+          <ac:cxnSpMkLst>
+            <pc:docMk/>
+            <pc:sldMk cId="1561297468" sldId="259"/>
+            <ac:cxnSpMk id="25" creationId="{D6956E7D-8BF4-58EE-725D-D1AAFC72E085}"/>
+          </ac:cxnSpMkLst>
+        </pc:cxnChg>
+        <pc:cxnChg chg="mod">
+          <ac:chgData name="Akdemir, Kerem Ziya" userId="a44fdb48-31b8-4682-ac1b-f99c482bb255" providerId="ADAL" clId="{688B7241-4242-4B42-B3A6-CEC9B70039E1}" dt="2024-07-05T22:38:57.045" v="63" actId="1076"/>
+          <ac:cxnSpMkLst>
+            <pc:docMk/>
+            <pc:sldMk cId="1561297468" sldId="259"/>
+            <ac:cxnSpMk id="26" creationId="{E781A6E2-F040-F1FF-56A0-FAA3052757ED}"/>
+          </ac:cxnSpMkLst>
+        </pc:cxnChg>
+        <pc:cxnChg chg="mod">
+          <ac:chgData name="Akdemir, Kerem Ziya" userId="a44fdb48-31b8-4682-ac1b-f99c482bb255" providerId="ADAL" clId="{688B7241-4242-4B42-B3A6-CEC9B70039E1}" dt="2024-07-05T22:38:57.045" v="63" actId="1076"/>
+          <ac:cxnSpMkLst>
+            <pc:docMk/>
+            <pc:sldMk cId="1561297468" sldId="259"/>
+            <ac:cxnSpMk id="29" creationId="{7B052865-15E2-DAF7-6EB7-A966AF1D0E1E}"/>
+          </ac:cxnSpMkLst>
+        </pc:cxnChg>
+        <pc:cxnChg chg="mod">
+          <ac:chgData name="Akdemir, Kerem Ziya" userId="a44fdb48-31b8-4682-ac1b-f99c482bb255" providerId="ADAL" clId="{688B7241-4242-4B42-B3A6-CEC9B70039E1}" dt="2024-07-05T22:38:57.045" v="63" actId="1076"/>
+          <ac:cxnSpMkLst>
+            <pc:docMk/>
+            <pc:sldMk cId="1561297468" sldId="259"/>
+            <ac:cxnSpMk id="32" creationId="{9112CCB3-BD8A-B844-DA2C-3C2EA91C8927}"/>
+          </ac:cxnSpMkLst>
+        </pc:cxnChg>
+        <pc:cxnChg chg="mod">
+          <ac:chgData name="Akdemir, Kerem Ziya" userId="a44fdb48-31b8-4682-ac1b-f99c482bb255" providerId="ADAL" clId="{688B7241-4242-4B42-B3A6-CEC9B70039E1}" dt="2024-07-05T22:38:21.361" v="60" actId="1076"/>
+          <ac:cxnSpMkLst>
+            <pc:docMk/>
+            <pc:sldMk cId="1561297468" sldId="259"/>
+            <ac:cxnSpMk id="44" creationId="{A36D7F45-50DC-8274-9B56-673500172CE2}"/>
+          </ac:cxnSpMkLst>
+        </pc:cxnChg>
+        <pc:cxnChg chg="mod">
+          <ac:chgData name="Akdemir, Kerem Ziya" userId="a44fdb48-31b8-4682-ac1b-f99c482bb255" providerId="ADAL" clId="{688B7241-4242-4B42-B3A6-CEC9B70039E1}" dt="2024-07-05T22:38:57.045" v="63" actId="1076"/>
+          <ac:cxnSpMkLst>
+            <pc:docMk/>
+            <pc:sldMk cId="1561297468" sldId="259"/>
+            <ac:cxnSpMk id="46" creationId="{1B72D196-5944-7169-0F7F-512E82E364C2}"/>
+          </ac:cxnSpMkLst>
+        </pc:cxnChg>
+        <pc:cxnChg chg="mod">
+          <ac:chgData name="Akdemir, Kerem Ziya" userId="a44fdb48-31b8-4682-ac1b-f99c482bb255" providerId="ADAL" clId="{688B7241-4242-4B42-B3A6-CEC9B70039E1}" dt="2024-07-05T22:38:57.045" v="63" actId="1076"/>
+          <ac:cxnSpMkLst>
+            <pc:docMk/>
+            <pc:sldMk cId="1561297468" sldId="259"/>
+            <ac:cxnSpMk id="53" creationId="{D34341A8-6A31-BEFD-E6D3-42142F16C288}"/>
+          </ac:cxnSpMkLst>
+        </pc:cxnChg>
+        <pc:cxnChg chg="mod">
+          <ac:chgData name="Akdemir, Kerem Ziya" userId="a44fdb48-31b8-4682-ac1b-f99c482bb255" providerId="ADAL" clId="{688B7241-4242-4B42-B3A6-CEC9B70039E1}" dt="2024-07-05T22:38:21.361" v="60" actId="1076"/>
+          <ac:cxnSpMkLst>
+            <pc:docMk/>
+            <pc:sldMk cId="1561297468" sldId="259"/>
+            <ac:cxnSpMk id="55" creationId="{9EAAD62B-3BE8-4A2A-181A-5BA11C5519C0}"/>
+          </ac:cxnSpMkLst>
+        </pc:cxnChg>
+        <pc:cxnChg chg="mod">
+          <ac:chgData name="Akdemir, Kerem Ziya" userId="a44fdb48-31b8-4682-ac1b-f99c482bb255" providerId="ADAL" clId="{688B7241-4242-4B42-B3A6-CEC9B70039E1}" dt="2024-07-05T22:38:21.361" v="60" actId="1076"/>
+          <ac:cxnSpMkLst>
+            <pc:docMk/>
+            <pc:sldMk cId="1561297468" sldId="259"/>
+            <ac:cxnSpMk id="56" creationId="{134CD4F3-DCCE-CE8B-4F21-BFB375BD50AD}"/>
+          </ac:cxnSpMkLst>
+        </pc:cxnChg>
+        <pc:cxnChg chg="mod">
+          <ac:chgData name="Akdemir, Kerem Ziya" userId="a44fdb48-31b8-4682-ac1b-f99c482bb255" providerId="ADAL" clId="{688B7241-4242-4B42-B3A6-CEC9B70039E1}" dt="2024-07-05T22:38:21.361" v="60" actId="1076"/>
+          <ac:cxnSpMkLst>
+            <pc:docMk/>
+            <pc:sldMk cId="1561297468" sldId="259"/>
+            <ac:cxnSpMk id="57" creationId="{F154C181-9667-7255-40C9-AC6432B09B80}"/>
+          </ac:cxnSpMkLst>
+        </pc:cxnChg>
+        <pc:cxnChg chg="mod">
+          <ac:chgData name="Akdemir, Kerem Ziya" userId="a44fdb48-31b8-4682-ac1b-f99c482bb255" providerId="ADAL" clId="{688B7241-4242-4B42-B3A6-CEC9B70039E1}" dt="2024-07-05T22:38:21.361" v="60" actId="1076"/>
+          <ac:cxnSpMkLst>
+            <pc:docMk/>
+            <pc:sldMk cId="1561297468" sldId="259"/>
+            <ac:cxnSpMk id="58" creationId="{9FC587CC-252B-9380-3A8A-70BD7E35C82C}"/>
+          </ac:cxnSpMkLst>
+        </pc:cxnChg>
+        <pc:cxnChg chg="mod">
+          <ac:chgData name="Akdemir, Kerem Ziya" userId="a44fdb48-31b8-4682-ac1b-f99c482bb255" providerId="ADAL" clId="{688B7241-4242-4B42-B3A6-CEC9B70039E1}" dt="2024-07-05T22:38:21.361" v="60" actId="1076"/>
+          <ac:cxnSpMkLst>
+            <pc:docMk/>
+            <pc:sldMk cId="1561297468" sldId="259"/>
+            <ac:cxnSpMk id="59" creationId="{FB96E3AC-7E1E-00C1-A514-15C3E298B9F9}"/>
+          </ac:cxnSpMkLst>
+        </pc:cxnChg>
+        <pc:cxnChg chg="mod">
+          <ac:chgData name="Akdemir, Kerem Ziya" userId="a44fdb48-31b8-4682-ac1b-f99c482bb255" providerId="ADAL" clId="{688B7241-4242-4B42-B3A6-CEC9B70039E1}" dt="2024-07-05T22:38:57.045" v="63" actId="1076"/>
+          <ac:cxnSpMkLst>
+            <pc:docMk/>
+            <pc:sldMk cId="1561297468" sldId="259"/>
+            <ac:cxnSpMk id="60" creationId="{466684CE-6FC1-D6C2-2340-3635216D560F}"/>
+          </ac:cxnSpMkLst>
+        </pc:cxnChg>
+        <pc:cxnChg chg="mod">
+          <ac:chgData name="Akdemir, Kerem Ziya" userId="a44fdb48-31b8-4682-ac1b-f99c482bb255" providerId="ADAL" clId="{688B7241-4242-4B42-B3A6-CEC9B70039E1}" dt="2024-07-05T22:38:21.361" v="60" actId="1076"/>
+          <ac:cxnSpMkLst>
+            <pc:docMk/>
+            <pc:sldMk cId="1561297468" sldId="259"/>
+            <ac:cxnSpMk id="61" creationId="{1F597532-52C2-981D-3798-7B5AF0B95918}"/>
+          </ac:cxnSpMkLst>
+        </pc:cxnChg>
+        <pc:cxnChg chg="mod">
+          <ac:chgData name="Akdemir, Kerem Ziya" userId="a44fdb48-31b8-4682-ac1b-f99c482bb255" providerId="ADAL" clId="{688B7241-4242-4B42-B3A6-CEC9B70039E1}" dt="2024-07-05T22:38:21.361" v="60" actId="1076"/>
+          <ac:cxnSpMkLst>
+            <pc:docMk/>
+            <pc:sldMk cId="1561297468" sldId="259"/>
+            <ac:cxnSpMk id="62" creationId="{DBF2005B-A54C-8E8D-4AA4-8C0F54CDBA87}"/>
+          </ac:cxnSpMkLst>
+        </pc:cxnChg>
+        <pc:cxnChg chg="mod">
+          <ac:chgData name="Akdemir, Kerem Ziya" userId="a44fdb48-31b8-4682-ac1b-f99c482bb255" providerId="ADAL" clId="{688B7241-4242-4B42-B3A6-CEC9B70039E1}" dt="2024-07-05T22:38:21.361" v="60" actId="1076"/>
+          <ac:cxnSpMkLst>
+            <pc:docMk/>
+            <pc:sldMk cId="1561297468" sldId="259"/>
+            <ac:cxnSpMk id="63" creationId="{10A05B2D-88D4-8251-B9E9-F1034033C162}"/>
+          </ac:cxnSpMkLst>
+        </pc:cxnChg>
+        <pc:cxnChg chg="mod">
+          <ac:chgData name="Akdemir, Kerem Ziya" userId="a44fdb48-31b8-4682-ac1b-f99c482bb255" providerId="ADAL" clId="{688B7241-4242-4B42-B3A6-CEC9B70039E1}" dt="2024-07-05T22:38:21.361" v="60" actId="1076"/>
+          <ac:cxnSpMkLst>
+            <pc:docMk/>
+            <pc:sldMk cId="1561297468" sldId="259"/>
+            <ac:cxnSpMk id="64" creationId="{DF180139-2B33-342F-277A-281E7707EE76}"/>
+          </ac:cxnSpMkLst>
+        </pc:cxnChg>
+        <pc:cxnChg chg="mod">
+          <ac:chgData name="Akdemir, Kerem Ziya" userId="a44fdb48-31b8-4682-ac1b-f99c482bb255" providerId="ADAL" clId="{688B7241-4242-4B42-B3A6-CEC9B70039E1}" dt="2024-07-05T22:38:21.361" v="60" actId="1076"/>
+          <ac:cxnSpMkLst>
+            <pc:docMk/>
+            <pc:sldMk cId="1561297468" sldId="259"/>
+            <ac:cxnSpMk id="65" creationId="{741CF636-A5BC-3E85-E1CA-A84DF8F25C50}"/>
+          </ac:cxnSpMkLst>
+        </pc:cxnChg>
+        <pc:cxnChg chg="add del mod">
+          <ac:chgData name="Akdemir, Kerem Ziya" userId="a44fdb48-31b8-4682-ac1b-f99c482bb255" providerId="ADAL" clId="{688B7241-4242-4B42-B3A6-CEC9B70039E1}" dt="2024-07-05T22:29:29.727" v="21" actId="478"/>
+          <ac:cxnSpMkLst>
+            <pc:docMk/>
+            <pc:sldMk cId="1561297468" sldId="259"/>
+            <ac:cxnSpMk id="66" creationId="{886FBA58-CAFF-6D12-4A5B-1991E56F252E}"/>
+          </ac:cxnSpMkLst>
+        </pc:cxnChg>
+        <pc:cxnChg chg="mod">
+          <ac:chgData name="Akdemir, Kerem Ziya" userId="a44fdb48-31b8-4682-ac1b-f99c482bb255" providerId="ADAL" clId="{688B7241-4242-4B42-B3A6-CEC9B70039E1}" dt="2024-07-05T22:38:57.045" v="63" actId="1076"/>
+          <ac:cxnSpMkLst>
+            <pc:docMk/>
+            <pc:sldMk cId="1561297468" sldId="259"/>
+            <ac:cxnSpMk id="67" creationId="{711C9AC2-958F-4AD3-6A85-1EC9C436A537}"/>
+          </ac:cxnSpMkLst>
+        </pc:cxnChg>
+        <pc:cxnChg chg="mod">
+          <ac:chgData name="Akdemir, Kerem Ziya" userId="a44fdb48-31b8-4682-ac1b-f99c482bb255" providerId="ADAL" clId="{688B7241-4242-4B42-B3A6-CEC9B70039E1}" dt="2024-07-05T22:38:21.361" v="60" actId="1076"/>
+          <ac:cxnSpMkLst>
+            <pc:docMk/>
+            <pc:sldMk cId="1561297468" sldId="259"/>
+            <ac:cxnSpMk id="70" creationId="{E9948900-60B4-00B6-1462-5F27A6AE96C0}"/>
+          </ac:cxnSpMkLst>
+        </pc:cxnChg>
+        <pc:cxnChg chg="mod">
+          <ac:chgData name="Akdemir, Kerem Ziya" userId="a44fdb48-31b8-4682-ac1b-f99c482bb255" providerId="ADAL" clId="{688B7241-4242-4B42-B3A6-CEC9B70039E1}" dt="2024-07-05T22:38:57.045" v="63" actId="1076"/>
+          <ac:cxnSpMkLst>
+            <pc:docMk/>
+            <pc:sldMk cId="1561297468" sldId="259"/>
+            <ac:cxnSpMk id="71" creationId="{CF15A414-B676-F9D1-D506-91AF188D60E3}"/>
+          </ac:cxnSpMkLst>
+        </pc:cxnChg>
+        <pc:cxnChg chg="mod">
+          <ac:chgData name="Akdemir, Kerem Ziya" userId="a44fdb48-31b8-4682-ac1b-f99c482bb255" providerId="ADAL" clId="{688B7241-4242-4B42-B3A6-CEC9B70039E1}" dt="2024-07-05T22:38:57.045" v="63" actId="1076"/>
+          <ac:cxnSpMkLst>
+            <pc:docMk/>
+            <pc:sldMk cId="1561297468" sldId="259"/>
+            <ac:cxnSpMk id="72" creationId="{31FF70AE-52A7-47D9-2520-AC713EC57D05}"/>
+          </ac:cxnSpMkLst>
+        </pc:cxnChg>
+        <pc:cxnChg chg="mod">
+          <ac:chgData name="Akdemir, Kerem Ziya" userId="a44fdb48-31b8-4682-ac1b-f99c482bb255" providerId="ADAL" clId="{688B7241-4242-4B42-B3A6-CEC9B70039E1}" dt="2024-07-05T22:37:51.061" v="57" actId="1076"/>
+          <ac:cxnSpMkLst>
+            <pc:docMk/>
+            <pc:sldMk cId="1561297468" sldId="259"/>
+            <ac:cxnSpMk id="74" creationId="{D859EF2B-DDA7-91DE-F421-B557D227E3FE}"/>
+          </ac:cxnSpMkLst>
+        </pc:cxnChg>
+        <pc:cxnChg chg="mod">
+          <ac:chgData name="Akdemir, Kerem Ziya" userId="a44fdb48-31b8-4682-ac1b-f99c482bb255" providerId="ADAL" clId="{688B7241-4242-4B42-B3A6-CEC9B70039E1}" dt="2024-07-05T22:38:57.045" v="63" actId="1076"/>
+          <ac:cxnSpMkLst>
+            <pc:docMk/>
+            <pc:sldMk cId="1561297468" sldId="259"/>
+            <ac:cxnSpMk id="75" creationId="{078E333B-9DF5-64BF-6DF6-8FFDACB2A854}"/>
+          </ac:cxnSpMkLst>
+        </pc:cxnChg>
+        <pc:cxnChg chg="mod">
+          <ac:chgData name="Akdemir, Kerem Ziya" userId="a44fdb48-31b8-4682-ac1b-f99c482bb255" providerId="ADAL" clId="{688B7241-4242-4B42-B3A6-CEC9B70039E1}" dt="2024-07-05T22:38:57.045" v="63" actId="1076"/>
+          <ac:cxnSpMkLst>
+            <pc:docMk/>
+            <pc:sldMk cId="1561297468" sldId="259"/>
+            <ac:cxnSpMk id="77" creationId="{9193A009-E627-4C19-6754-B33A008F59BF}"/>
+          </ac:cxnSpMkLst>
+        </pc:cxnChg>
+        <pc:cxnChg chg="mod">
+          <ac:chgData name="Akdemir, Kerem Ziya" userId="a44fdb48-31b8-4682-ac1b-f99c482bb255" providerId="ADAL" clId="{688B7241-4242-4B42-B3A6-CEC9B70039E1}" dt="2024-07-05T22:38:57.045" v="63" actId="1076"/>
+          <ac:cxnSpMkLst>
+            <pc:docMk/>
+            <pc:sldMk cId="1561297468" sldId="259"/>
+            <ac:cxnSpMk id="81" creationId="{32386FB2-2537-1F07-1D3C-2CD808209131}"/>
+          </ac:cxnSpMkLst>
+        </pc:cxnChg>
+        <pc:cxnChg chg="mod">
+          <ac:chgData name="Akdemir, Kerem Ziya" userId="a44fdb48-31b8-4682-ac1b-f99c482bb255" providerId="ADAL" clId="{688B7241-4242-4B42-B3A6-CEC9B70039E1}" dt="2024-07-05T22:38:57.045" v="63" actId="1076"/>
+          <ac:cxnSpMkLst>
+            <pc:docMk/>
+            <pc:sldMk cId="1561297468" sldId="259"/>
+            <ac:cxnSpMk id="86" creationId="{C5E97F36-12E3-04F9-20D0-FC4887F79361}"/>
+          </ac:cxnSpMkLst>
+        </pc:cxnChg>
+        <pc:cxnChg chg="mod">
+          <ac:chgData name="Akdemir, Kerem Ziya" userId="a44fdb48-31b8-4682-ac1b-f99c482bb255" providerId="ADAL" clId="{688B7241-4242-4B42-B3A6-CEC9B70039E1}" dt="2024-07-05T22:38:57.045" v="63" actId="1076"/>
+          <ac:cxnSpMkLst>
+            <pc:docMk/>
+            <pc:sldMk cId="1561297468" sldId="259"/>
+            <ac:cxnSpMk id="91" creationId="{5625D677-A65F-9404-D0D5-7227442B2CC0}"/>
+          </ac:cxnSpMkLst>
+        </pc:cxnChg>
+        <pc:cxnChg chg="mod">
+          <ac:chgData name="Akdemir, Kerem Ziya" userId="a44fdb48-31b8-4682-ac1b-f99c482bb255" providerId="ADAL" clId="{688B7241-4242-4B42-B3A6-CEC9B70039E1}" dt="2024-07-05T22:38:57.045" v="63" actId="1076"/>
+          <ac:cxnSpMkLst>
+            <pc:docMk/>
+            <pc:sldMk cId="1561297468" sldId="259"/>
+            <ac:cxnSpMk id="94" creationId="{89C7C3A6-CBFB-9CDB-F8A6-FC509BD5A360}"/>
+          </ac:cxnSpMkLst>
+        </pc:cxnChg>
+        <pc:cxnChg chg="mod">
+          <ac:chgData name="Akdemir, Kerem Ziya" userId="a44fdb48-31b8-4682-ac1b-f99c482bb255" providerId="ADAL" clId="{688B7241-4242-4B42-B3A6-CEC9B70039E1}" dt="2024-07-05T22:38:57.045" v="63" actId="1076"/>
+          <ac:cxnSpMkLst>
+            <pc:docMk/>
+            <pc:sldMk cId="1561297468" sldId="259"/>
+            <ac:cxnSpMk id="96" creationId="{809C4440-61CE-D6CE-6E42-022267055D39}"/>
+          </ac:cxnSpMkLst>
+        </pc:cxnChg>
+        <pc:cxnChg chg="mod">
+          <ac:chgData name="Akdemir, Kerem Ziya" userId="a44fdb48-31b8-4682-ac1b-f99c482bb255" providerId="ADAL" clId="{688B7241-4242-4B42-B3A6-CEC9B70039E1}" dt="2024-07-05T22:38:57.045" v="63" actId="1076"/>
+          <ac:cxnSpMkLst>
+            <pc:docMk/>
+            <pc:sldMk cId="1561297468" sldId="259"/>
+            <ac:cxnSpMk id="97" creationId="{6980A19B-AE75-A5D6-F3AA-CBF2C92B053E}"/>
+          </ac:cxnSpMkLst>
+        </pc:cxnChg>
+        <pc:cxnChg chg="mod">
+          <ac:chgData name="Akdemir, Kerem Ziya" userId="a44fdb48-31b8-4682-ac1b-f99c482bb255" providerId="ADAL" clId="{688B7241-4242-4B42-B3A6-CEC9B70039E1}" dt="2024-07-05T22:38:57.045" v="63" actId="1076"/>
+          <ac:cxnSpMkLst>
+            <pc:docMk/>
+            <pc:sldMk cId="1561297468" sldId="259"/>
+            <ac:cxnSpMk id="98" creationId="{8659E690-CA1F-0DB9-1679-4C5750063852}"/>
+          </ac:cxnSpMkLst>
+        </pc:cxnChg>
+        <pc:cxnChg chg="mod">
+          <ac:chgData name="Akdemir, Kerem Ziya" userId="a44fdb48-31b8-4682-ac1b-f99c482bb255" providerId="ADAL" clId="{688B7241-4242-4B42-B3A6-CEC9B70039E1}" dt="2024-07-05T22:38:57.045" v="63" actId="1076"/>
+          <ac:cxnSpMkLst>
+            <pc:docMk/>
+            <pc:sldMk cId="1561297468" sldId="259"/>
+            <ac:cxnSpMk id="99" creationId="{240CBF1A-E314-83BD-619C-94F99790A5AE}"/>
+          </ac:cxnSpMkLst>
+        </pc:cxnChg>
+        <pc:cxnChg chg="mod">
+          <ac:chgData name="Akdemir, Kerem Ziya" userId="a44fdb48-31b8-4682-ac1b-f99c482bb255" providerId="ADAL" clId="{688B7241-4242-4B42-B3A6-CEC9B70039E1}" dt="2024-07-05T22:38:57.045" v="63" actId="1076"/>
+          <ac:cxnSpMkLst>
+            <pc:docMk/>
+            <pc:sldMk cId="1561297468" sldId="259"/>
+            <ac:cxnSpMk id="100" creationId="{7A97332E-9F73-1563-6BB3-BFCE33C32F48}"/>
+          </ac:cxnSpMkLst>
+        </pc:cxnChg>
+        <pc:cxnChg chg="mod">
+          <ac:chgData name="Akdemir, Kerem Ziya" userId="a44fdb48-31b8-4682-ac1b-f99c482bb255" providerId="ADAL" clId="{688B7241-4242-4B42-B3A6-CEC9B70039E1}" dt="2024-07-05T22:38:57.045" v="63" actId="1076"/>
+          <ac:cxnSpMkLst>
+            <pc:docMk/>
+            <pc:sldMk cId="1561297468" sldId="259"/>
+            <ac:cxnSpMk id="101" creationId="{B021B2C7-8B0E-93A2-AE3D-F96A0DA99009}"/>
+          </ac:cxnSpMkLst>
+        </pc:cxnChg>
+        <pc:cxnChg chg="mod">
+          <ac:chgData name="Akdemir, Kerem Ziya" userId="a44fdb48-31b8-4682-ac1b-f99c482bb255" providerId="ADAL" clId="{688B7241-4242-4B42-B3A6-CEC9B70039E1}" dt="2024-07-05T22:38:57.045" v="63" actId="1076"/>
+          <ac:cxnSpMkLst>
+            <pc:docMk/>
+            <pc:sldMk cId="1561297468" sldId="259"/>
+            <ac:cxnSpMk id="102" creationId="{D99D746C-8687-2B4A-9BDB-1C869BFB3CFA}"/>
+          </ac:cxnSpMkLst>
+        </pc:cxnChg>
+        <pc:cxnChg chg="mod">
+          <ac:chgData name="Akdemir, Kerem Ziya" userId="a44fdb48-31b8-4682-ac1b-f99c482bb255" providerId="ADAL" clId="{688B7241-4242-4B42-B3A6-CEC9B70039E1}" dt="2024-07-05T22:38:57.045" v="63" actId="1076"/>
+          <ac:cxnSpMkLst>
+            <pc:docMk/>
+            <pc:sldMk cId="1561297468" sldId="259"/>
+            <ac:cxnSpMk id="103" creationId="{3BA1B2A4-3C9D-2A5B-0540-67243BA91049}"/>
+          </ac:cxnSpMkLst>
+        </pc:cxnChg>
+        <pc:cxnChg chg="mod">
+          <ac:chgData name="Akdemir, Kerem Ziya" userId="a44fdb48-31b8-4682-ac1b-f99c482bb255" providerId="ADAL" clId="{688B7241-4242-4B42-B3A6-CEC9B70039E1}" dt="2024-07-05T22:38:57.045" v="63" actId="1076"/>
+          <ac:cxnSpMkLst>
+            <pc:docMk/>
+            <pc:sldMk cId="1561297468" sldId="259"/>
+            <ac:cxnSpMk id="104" creationId="{D0249C42-6F7E-725A-7D94-5E7D2D9B0428}"/>
+          </ac:cxnSpMkLst>
+        </pc:cxnChg>
+        <pc:cxnChg chg="mod">
+          <ac:chgData name="Akdemir, Kerem Ziya" userId="a44fdb48-31b8-4682-ac1b-f99c482bb255" providerId="ADAL" clId="{688B7241-4242-4B42-B3A6-CEC9B70039E1}" dt="2024-07-05T22:38:57.045" v="63" actId="1076"/>
+          <ac:cxnSpMkLst>
+            <pc:docMk/>
+            <pc:sldMk cId="1561297468" sldId="259"/>
+            <ac:cxnSpMk id="105" creationId="{EFA8DD34-D102-402E-1395-627390BB59D0}"/>
+          </ac:cxnSpMkLst>
+        </pc:cxnChg>
+        <pc:cxnChg chg="mod">
+          <ac:chgData name="Akdemir, Kerem Ziya" userId="a44fdb48-31b8-4682-ac1b-f99c482bb255" providerId="ADAL" clId="{688B7241-4242-4B42-B3A6-CEC9B70039E1}" dt="2024-07-05T22:38:57.045" v="63" actId="1076"/>
+          <ac:cxnSpMkLst>
+            <pc:docMk/>
+            <pc:sldMk cId="1561297468" sldId="259"/>
+            <ac:cxnSpMk id="106" creationId="{C9FD780E-CF4E-A0B8-94B9-BE128047824D}"/>
+          </ac:cxnSpMkLst>
+        </pc:cxnChg>
+        <pc:cxnChg chg="mod">
+          <ac:chgData name="Akdemir, Kerem Ziya" userId="a44fdb48-31b8-4682-ac1b-f99c482bb255" providerId="ADAL" clId="{688B7241-4242-4B42-B3A6-CEC9B70039E1}" dt="2024-07-05T22:38:57.045" v="63" actId="1076"/>
+          <ac:cxnSpMkLst>
+            <pc:docMk/>
+            <pc:sldMk cId="1561297468" sldId="259"/>
+            <ac:cxnSpMk id="107" creationId="{7FAA6556-C03C-338E-6E2B-FD25A47CC114}"/>
+          </ac:cxnSpMkLst>
+        </pc:cxnChg>
+        <pc:cxnChg chg="mod">
+          <ac:chgData name="Akdemir, Kerem Ziya" userId="a44fdb48-31b8-4682-ac1b-f99c482bb255" providerId="ADAL" clId="{688B7241-4242-4B42-B3A6-CEC9B70039E1}" dt="2024-07-05T22:38:57.045" v="63" actId="1076"/>
+          <ac:cxnSpMkLst>
+            <pc:docMk/>
+            <pc:sldMk cId="1561297468" sldId="259"/>
+            <ac:cxnSpMk id="108" creationId="{16DB8E04-D9B6-F959-E3AA-45905B237B78}"/>
+          </ac:cxnSpMkLst>
+        </pc:cxnChg>
+        <pc:cxnChg chg="mod">
+          <ac:chgData name="Akdemir, Kerem Ziya" userId="a44fdb48-31b8-4682-ac1b-f99c482bb255" providerId="ADAL" clId="{688B7241-4242-4B42-B3A6-CEC9B70039E1}" dt="2024-07-05T22:38:57.045" v="63" actId="1076"/>
+          <ac:cxnSpMkLst>
+            <pc:docMk/>
+            <pc:sldMk cId="1561297468" sldId="259"/>
+            <ac:cxnSpMk id="109" creationId="{74175DA4-C811-8DB8-CA99-7AE6D826B1FE}"/>
+          </ac:cxnSpMkLst>
+        </pc:cxnChg>
+        <pc:cxnChg chg="mod">
+          <ac:chgData name="Akdemir, Kerem Ziya" userId="a44fdb48-31b8-4682-ac1b-f99c482bb255" providerId="ADAL" clId="{688B7241-4242-4B42-B3A6-CEC9B70039E1}" dt="2024-07-05T22:38:57.045" v="63" actId="1076"/>
+          <ac:cxnSpMkLst>
+            <pc:docMk/>
+            <pc:sldMk cId="1561297468" sldId="259"/>
+            <ac:cxnSpMk id="110" creationId="{C82587EB-1F5C-648B-9033-FFD580B8BAF8}"/>
+          </ac:cxnSpMkLst>
+        </pc:cxnChg>
+        <pc:cxnChg chg="mod">
+          <ac:chgData name="Akdemir, Kerem Ziya" userId="a44fdb48-31b8-4682-ac1b-f99c482bb255" providerId="ADAL" clId="{688B7241-4242-4B42-B3A6-CEC9B70039E1}" dt="2024-07-05T22:38:57.045" v="63" actId="1076"/>
+          <ac:cxnSpMkLst>
+            <pc:docMk/>
+            <pc:sldMk cId="1561297468" sldId="259"/>
+            <ac:cxnSpMk id="111" creationId="{4699E34A-E7E8-934B-3168-20DE4653BF6A}"/>
+          </ac:cxnSpMkLst>
+        </pc:cxnChg>
+        <pc:cxnChg chg="mod">
+          <ac:chgData name="Akdemir, Kerem Ziya" userId="a44fdb48-31b8-4682-ac1b-f99c482bb255" providerId="ADAL" clId="{688B7241-4242-4B42-B3A6-CEC9B70039E1}" dt="2024-07-05T22:38:57.045" v="63" actId="1076"/>
+          <ac:cxnSpMkLst>
+            <pc:docMk/>
+            <pc:sldMk cId="1561297468" sldId="259"/>
+            <ac:cxnSpMk id="112" creationId="{3D1D18D7-4D6B-3C95-7B70-8D3C2695EDE9}"/>
+          </ac:cxnSpMkLst>
+        </pc:cxnChg>
+        <pc:cxnChg chg="mod">
+          <ac:chgData name="Akdemir, Kerem Ziya" userId="a44fdb48-31b8-4682-ac1b-f99c482bb255" providerId="ADAL" clId="{688B7241-4242-4B42-B3A6-CEC9B70039E1}" dt="2024-07-05T22:38:57.045" v="63" actId="1076"/>
+          <ac:cxnSpMkLst>
+            <pc:docMk/>
+            <pc:sldMk cId="1561297468" sldId="259"/>
+            <ac:cxnSpMk id="113" creationId="{0ADDC5B1-880D-E7C7-3037-635E655DAECB}"/>
+          </ac:cxnSpMkLst>
+        </pc:cxnChg>
+        <pc:cxnChg chg="mod">
+          <ac:chgData name="Akdemir, Kerem Ziya" userId="a44fdb48-31b8-4682-ac1b-f99c482bb255" providerId="ADAL" clId="{688B7241-4242-4B42-B3A6-CEC9B70039E1}" dt="2024-07-05T22:38:57.045" v="63" actId="1076"/>
+          <ac:cxnSpMkLst>
+            <pc:docMk/>
+            <pc:sldMk cId="1561297468" sldId="259"/>
+            <ac:cxnSpMk id="114" creationId="{86AA0306-BFC0-E4C5-3117-6DEAE8E3F37C}"/>
+          </ac:cxnSpMkLst>
+        </pc:cxnChg>
+        <pc:cxnChg chg="mod">
+          <ac:chgData name="Akdemir, Kerem Ziya" userId="a44fdb48-31b8-4682-ac1b-f99c482bb255" providerId="ADAL" clId="{688B7241-4242-4B42-B3A6-CEC9B70039E1}" dt="2024-07-05T22:38:57.045" v="63" actId="1076"/>
+          <ac:cxnSpMkLst>
+            <pc:docMk/>
+            <pc:sldMk cId="1561297468" sldId="259"/>
+            <ac:cxnSpMk id="128" creationId="{5BF0C9D0-8F63-3E8E-89A8-8B173717BA94}"/>
+          </ac:cxnSpMkLst>
+        </pc:cxnChg>
+        <pc:cxnChg chg="mod">
+          <ac:chgData name="Akdemir, Kerem Ziya" userId="a44fdb48-31b8-4682-ac1b-f99c482bb255" providerId="ADAL" clId="{688B7241-4242-4B42-B3A6-CEC9B70039E1}" dt="2024-07-05T22:38:57.045" v="63" actId="1076"/>
+          <ac:cxnSpMkLst>
+            <pc:docMk/>
+            <pc:sldMk cId="1561297468" sldId="259"/>
+            <ac:cxnSpMk id="129" creationId="{71EB78FE-15D6-D910-9B15-41F8EC305943}"/>
+          </ac:cxnSpMkLst>
+        </pc:cxnChg>
+        <pc:cxnChg chg="mod">
+          <ac:chgData name="Akdemir, Kerem Ziya" userId="a44fdb48-31b8-4682-ac1b-f99c482bb255" providerId="ADAL" clId="{688B7241-4242-4B42-B3A6-CEC9B70039E1}" dt="2024-07-05T22:38:57.045" v="63" actId="1076"/>
+          <ac:cxnSpMkLst>
+            <pc:docMk/>
+            <pc:sldMk cId="1561297468" sldId="259"/>
+            <ac:cxnSpMk id="130" creationId="{C98E6F57-8868-CEEC-2B9C-A9688FF28271}"/>
+          </ac:cxnSpMkLst>
+        </pc:cxnChg>
+        <pc:cxnChg chg="mod">
+          <ac:chgData name="Akdemir, Kerem Ziya" userId="a44fdb48-31b8-4682-ac1b-f99c482bb255" providerId="ADAL" clId="{688B7241-4242-4B42-B3A6-CEC9B70039E1}" dt="2024-07-05T22:38:57.045" v="63" actId="1076"/>
+          <ac:cxnSpMkLst>
+            <pc:docMk/>
+            <pc:sldMk cId="1561297468" sldId="259"/>
+            <ac:cxnSpMk id="131" creationId="{3910C6D1-FF18-B129-F9AC-230F6D58AF79}"/>
+          </ac:cxnSpMkLst>
+        </pc:cxnChg>
+        <pc:cxnChg chg="mod">
+          <ac:chgData name="Akdemir, Kerem Ziya" userId="a44fdb48-31b8-4682-ac1b-f99c482bb255" providerId="ADAL" clId="{688B7241-4242-4B42-B3A6-CEC9B70039E1}" dt="2024-07-05T22:38:57.045" v="63" actId="1076"/>
+          <ac:cxnSpMkLst>
+            <pc:docMk/>
+            <pc:sldMk cId="1561297468" sldId="259"/>
+            <ac:cxnSpMk id="132" creationId="{DF037964-8BE2-6055-7605-FBCC0ECA2F0E}"/>
+          </ac:cxnSpMkLst>
+        </pc:cxnChg>
+        <pc:cxnChg chg="mod">
+          <ac:chgData name="Akdemir, Kerem Ziya" userId="a44fdb48-31b8-4682-ac1b-f99c482bb255" providerId="ADAL" clId="{688B7241-4242-4B42-B3A6-CEC9B70039E1}" dt="2024-07-05T22:38:57.045" v="63" actId="1076"/>
+          <ac:cxnSpMkLst>
+            <pc:docMk/>
+            <pc:sldMk cId="1561297468" sldId="259"/>
+            <ac:cxnSpMk id="133" creationId="{D52D87DF-3F21-0DFE-C6D2-46C03E7E1509}"/>
+          </ac:cxnSpMkLst>
+        </pc:cxnChg>
+        <pc:cxnChg chg="mod">
+          <ac:chgData name="Akdemir, Kerem Ziya" userId="a44fdb48-31b8-4682-ac1b-f99c482bb255" providerId="ADAL" clId="{688B7241-4242-4B42-B3A6-CEC9B70039E1}" dt="2024-07-05T22:38:57.045" v="63" actId="1076"/>
+          <ac:cxnSpMkLst>
+            <pc:docMk/>
+            <pc:sldMk cId="1561297468" sldId="259"/>
+            <ac:cxnSpMk id="134" creationId="{E3D6726F-6A4B-BFCD-A710-05728377440C}"/>
+          </ac:cxnSpMkLst>
+        </pc:cxnChg>
+        <pc:cxnChg chg="mod">
+          <ac:chgData name="Akdemir, Kerem Ziya" userId="a44fdb48-31b8-4682-ac1b-f99c482bb255" providerId="ADAL" clId="{688B7241-4242-4B42-B3A6-CEC9B70039E1}" dt="2024-07-05T22:38:57.045" v="63" actId="1076"/>
+          <ac:cxnSpMkLst>
+            <pc:docMk/>
+            <pc:sldMk cId="1561297468" sldId="259"/>
+            <ac:cxnSpMk id="135" creationId="{C287B385-D5C2-0AE7-D977-B28F11A8C898}"/>
+          </ac:cxnSpMkLst>
+        </pc:cxnChg>
+        <pc:cxnChg chg="mod">
+          <ac:chgData name="Akdemir, Kerem Ziya" userId="a44fdb48-31b8-4682-ac1b-f99c482bb255" providerId="ADAL" clId="{688B7241-4242-4B42-B3A6-CEC9B70039E1}" dt="2024-07-05T22:38:57.045" v="63" actId="1076"/>
+          <ac:cxnSpMkLst>
+            <pc:docMk/>
+            <pc:sldMk cId="1561297468" sldId="259"/>
+            <ac:cxnSpMk id="136" creationId="{309508D8-5150-9D03-E993-E485F7E86F43}"/>
+          </ac:cxnSpMkLst>
+        </pc:cxnChg>
+        <pc:cxnChg chg="mod">
+          <ac:chgData name="Akdemir, Kerem Ziya" userId="a44fdb48-31b8-4682-ac1b-f99c482bb255" providerId="ADAL" clId="{688B7241-4242-4B42-B3A6-CEC9B70039E1}" dt="2024-07-05T22:38:57.045" v="63" actId="1076"/>
+          <ac:cxnSpMkLst>
+            <pc:docMk/>
+            <pc:sldMk cId="1561297468" sldId="259"/>
+            <ac:cxnSpMk id="137" creationId="{E50E7C57-22D7-E6DA-E1DE-F0E4A2C0ECD8}"/>
+          </ac:cxnSpMkLst>
+        </pc:cxnChg>
+        <pc:cxnChg chg="mod">
+          <ac:chgData name="Akdemir, Kerem Ziya" userId="a44fdb48-31b8-4682-ac1b-f99c482bb255" providerId="ADAL" clId="{688B7241-4242-4B42-B3A6-CEC9B70039E1}" dt="2024-07-05T22:38:57.045" v="63" actId="1076"/>
+          <ac:cxnSpMkLst>
+            <pc:docMk/>
+            <pc:sldMk cId="1561297468" sldId="259"/>
+            <ac:cxnSpMk id="138" creationId="{0FEFCD4B-6B8A-9062-9BC3-C63B19292385}"/>
+          </ac:cxnSpMkLst>
+        </pc:cxnChg>
+        <pc:cxnChg chg="mod">
+          <ac:chgData name="Akdemir, Kerem Ziya" userId="a44fdb48-31b8-4682-ac1b-f99c482bb255" providerId="ADAL" clId="{688B7241-4242-4B42-B3A6-CEC9B70039E1}" dt="2024-07-05T22:38:57.045" v="63" actId="1076"/>
+          <ac:cxnSpMkLst>
+            <pc:docMk/>
+            <pc:sldMk cId="1561297468" sldId="259"/>
+            <ac:cxnSpMk id="139" creationId="{5072D47E-AF27-A3BA-190B-D19B03A54E27}"/>
+          </ac:cxnSpMkLst>
+        </pc:cxnChg>
+        <pc:cxnChg chg="mod">
+          <ac:chgData name="Akdemir, Kerem Ziya" userId="a44fdb48-31b8-4682-ac1b-f99c482bb255" providerId="ADAL" clId="{688B7241-4242-4B42-B3A6-CEC9B70039E1}" dt="2024-07-05T22:38:57.045" v="63" actId="1076"/>
+          <ac:cxnSpMkLst>
+            <pc:docMk/>
+            <pc:sldMk cId="1561297468" sldId="259"/>
+            <ac:cxnSpMk id="140" creationId="{A1DF99B4-1458-42C8-0282-821615B8245F}"/>
+          </ac:cxnSpMkLst>
+        </pc:cxnChg>
+        <pc:cxnChg chg="mod">
+          <ac:chgData name="Akdemir, Kerem Ziya" userId="a44fdb48-31b8-4682-ac1b-f99c482bb255" providerId="ADAL" clId="{688B7241-4242-4B42-B3A6-CEC9B70039E1}" dt="2024-07-05T22:38:57.045" v="63" actId="1076"/>
+          <ac:cxnSpMkLst>
+            <pc:docMk/>
+            <pc:sldMk cId="1561297468" sldId="259"/>
+            <ac:cxnSpMk id="141" creationId="{34F68DA3-6A86-A04C-06CA-28A06EF276E3}"/>
+          </ac:cxnSpMkLst>
+        </pc:cxnChg>
+        <pc:cxnChg chg="add mod">
+          <ac:chgData name="Akdemir, Kerem Ziya" userId="a44fdb48-31b8-4682-ac1b-f99c482bb255" providerId="ADAL" clId="{688B7241-4242-4B42-B3A6-CEC9B70039E1}" dt="2024-07-05T22:38:21.361" v="60" actId="1076"/>
+          <ac:cxnSpMkLst>
+            <pc:docMk/>
+            <pc:sldMk cId="1561297468" sldId="259"/>
+            <ac:cxnSpMk id="145" creationId="{A2737B3F-A7A0-7A82-1745-B3AD88482859}"/>
+          </ac:cxnSpMkLst>
+        </pc:cxnChg>
+        <pc:cxnChg chg="add del mod">
+          <ac:chgData name="Akdemir, Kerem Ziya" userId="a44fdb48-31b8-4682-ac1b-f99c482bb255" providerId="ADAL" clId="{688B7241-4242-4B42-B3A6-CEC9B70039E1}" dt="2024-07-05T22:34:07.507" v="36" actId="478"/>
+          <ac:cxnSpMkLst>
+            <pc:docMk/>
+            <pc:sldMk cId="1561297468" sldId="259"/>
+            <ac:cxnSpMk id="150" creationId="{2D644076-E3E2-229B-CC5E-2C1C1AEF7CA1}"/>
+          </ac:cxnSpMkLst>
+        </pc:cxnChg>
+        <pc:cxnChg chg="mod">
+          <ac:chgData name="Akdemir, Kerem Ziya" userId="a44fdb48-31b8-4682-ac1b-f99c482bb255" providerId="ADAL" clId="{688B7241-4242-4B42-B3A6-CEC9B70039E1}" dt="2024-07-05T22:38:57.045" v="63" actId="1076"/>
+          <ac:cxnSpMkLst>
+            <pc:docMk/>
+            <pc:sldMk cId="1561297468" sldId="259"/>
+            <ac:cxnSpMk id="151" creationId="{109194CD-0F05-E3F1-E753-13825D33995B}"/>
+          </ac:cxnSpMkLst>
+        </pc:cxnChg>
+        <pc:cxnChg chg="mod">
+          <ac:chgData name="Akdemir, Kerem Ziya" userId="a44fdb48-31b8-4682-ac1b-f99c482bb255" providerId="ADAL" clId="{688B7241-4242-4B42-B3A6-CEC9B70039E1}" dt="2024-07-05T22:37:51.061" v="57" actId="1076"/>
+          <ac:cxnSpMkLst>
+            <pc:docMk/>
+            <pc:sldMk cId="1561297468" sldId="259"/>
+            <ac:cxnSpMk id="157" creationId="{854F6329-E421-652D-E707-5AA9E9951C04}"/>
+          </ac:cxnSpMkLst>
+        </pc:cxnChg>
+        <pc:cxnChg chg="add mod">
+          <ac:chgData name="Akdemir, Kerem Ziya" userId="a44fdb48-31b8-4682-ac1b-f99c482bb255" providerId="ADAL" clId="{688B7241-4242-4B42-B3A6-CEC9B70039E1}" dt="2024-07-05T22:38:57.045" v="63" actId="1076"/>
+          <ac:cxnSpMkLst>
+            <pc:docMk/>
+            <pc:sldMk cId="1561297468" sldId="259"/>
+            <ac:cxnSpMk id="158" creationId="{50DBBCC4-938D-7B69-6F81-5B1A1E79CE5E}"/>
+          </ac:cxnSpMkLst>
+        </pc:cxnChg>
+        <pc:cxnChg chg="mod">
+          <ac:chgData name="Akdemir, Kerem Ziya" userId="a44fdb48-31b8-4682-ac1b-f99c482bb255" providerId="ADAL" clId="{688B7241-4242-4B42-B3A6-CEC9B70039E1}" dt="2024-07-05T22:37:51.061" v="57" actId="1076"/>
+          <ac:cxnSpMkLst>
+            <pc:docMk/>
+            <pc:sldMk cId="1561297468" sldId="259"/>
+            <ac:cxnSpMk id="162" creationId="{E6A286D4-85F4-D2FE-88F9-B7AF4154146B}"/>
+          </ac:cxnSpMkLst>
+        </pc:cxnChg>
+        <pc:cxnChg chg="mod">
+          <ac:chgData name="Akdemir, Kerem Ziya" userId="a44fdb48-31b8-4682-ac1b-f99c482bb255" providerId="ADAL" clId="{688B7241-4242-4B42-B3A6-CEC9B70039E1}" dt="2024-07-05T22:38:57.045" v="63" actId="1076"/>
+          <ac:cxnSpMkLst>
+            <pc:docMk/>
+            <pc:sldMk cId="1561297468" sldId="259"/>
+            <ac:cxnSpMk id="163" creationId="{A3A6CF11-A128-B74E-852A-694F462CF0A7}"/>
+          </ac:cxnSpMkLst>
+        </pc:cxnChg>
+        <pc:cxnChg chg="mod">
+          <ac:chgData name="Akdemir, Kerem Ziya" userId="a44fdb48-31b8-4682-ac1b-f99c482bb255" providerId="ADAL" clId="{688B7241-4242-4B42-B3A6-CEC9B70039E1}" dt="2024-07-05T22:38:57.045" v="63" actId="1076"/>
+          <ac:cxnSpMkLst>
+            <pc:docMk/>
+            <pc:sldMk cId="1561297468" sldId="259"/>
+            <ac:cxnSpMk id="164" creationId="{977073BF-6BEF-91D1-C60B-7B3212D08977}"/>
+          </ac:cxnSpMkLst>
+        </pc:cxnChg>
+        <pc:cxnChg chg="mod">
+          <ac:chgData name="Akdemir, Kerem Ziya" userId="a44fdb48-31b8-4682-ac1b-f99c482bb255" providerId="ADAL" clId="{688B7241-4242-4B42-B3A6-CEC9B70039E1}" dt="2024-07-05T22:37:51.061" v="57" actId="1076"/>
+          <ac:cxnSpMkLst>
+            <pc:docMk/>
+            <pc:sldMk cId="1561297468" sldId="259"/>
+            <ac:cxnSpMk id="165" creationId="{ADBDC424-B601-3205-A2A2-F93022927DE4}"/>
+          </ac:cxnSpMkLst>
+        </pc:cxnChg>
+        <pc:cxnChg chg="mod">
+          <ac:chgData name="Akdemir, Kerem Ziya" userId="a44fdb48-31b8-4682-ac1b-f99c482bb255" providerId="ADAL" clId="{688B7241-4242-4B42-B3A6-CEC9B70039E1}" dt="2024-07-05T22:37:51.061" v="57" actId="1076"/>
+          <ac:cxnSpMkLst>
+            <pc:docMk/>
+            <pc:sldMk cId="1561297468" sldId="259"/>
+            <ac:cxnSpMk id="167" creationId="{D0329C81-A6FF-213C-030D-53AAC9FE5E70}"/>
+          </ac:cxnSpMkLst>
+        </pc:cxnChg>
+        <pc:cxnChg chg="add mod">
+          <ac:chgData name="Akdemir, Kerem Ziya" userId="a44fdb48-31b8-4682-ac1b-f99c482bb255" providerId="ADAL" clId="{688B7241-4242-4B42-B3A6-CEC9B70039E1}" dt="2024-07-05T22:38:57.045" v="63" actId="1076"/>
+          <ac:cxnSpMkLst>
+            <pc:docMk/>
+            <pc:sldMk cId="1561297468" sldId="259"/>
+            <ac:cxnSpMk id="170" creationId="{46F4A361-74D5-B6AE-A6E6-8BB21736DBEA}"/>
+          </ac:cxnSpMkLst>
+        </pc:cxnChg>
+        <pc:cxnChg chg="mod">
+          <ac:chgData name="Akdemir, Kerem Ziya" userId="a44fdb48-31b8-4682-ac1b-f99c482bb255" providerId="ADAL" clId="{688B7241-4242-4B42-B3A6-CEC9B70039E1}" dt="2024-07-05T22:38:57.045" v="63" actId="1076"/>
+          <ac:cxnSpMkLst>
+            <pc:docMk/>
+            <pc:sldMk cId="1561297468" sldId="259"/>
+            <ac:cxnSpMk id="172" creationId="{83B0F105-324C-76D9-3B7E-9B1C20007599}"/>
+          </ac:cxnSpMkLst>
+        </pc:cxnChg>
+        <pc:cxnChg chg="mod">
+          <ac:chgData name="Akdemir, Kerem Ziya" userId="a44fdb48-31b8-4682-ac1b-f99c482bb255" providerId="ADAL" clId="{688B7241-4242-4B42-B3A6-CEC9B70039E1}" dt="2024-07-05T22:37:51.061" v="57" actId="1076"/>
+          <ac:cxnSpMkLst>
+            <pc:docMk/>
+            <pc:sldMk cId="1561297468" sldId="259"/>
+            <ac:cxnSpMk id="179" creationId="{49429051-8D19-8ED8-8A56-C4A541928810}"/>
+          </ac:cxnSpMkLst>
+        </pc:cxnChg>
+        <pc:cxnChg chg="mod">
+          <ac:chgData name="Akdemir, Kerem Ziya" userId="a44fdb48-31b8-4682-ac1b-f99c482bb255" providerId="ADAL" clId="{688B7241-4242-4B42-B3A6-CEC9B70039E1}" dt="2024-07-05T22:37:51.061" v="57" actId="1076"/>
+          <ac:cxnSpMkLst>
+            <pc:docMk/>
+            <pc:sldMk cId="1561297468" sldId="259"/>
+            <ac:cxnSpMk id="180" creationId="{3634F14E-5778-9057-7354-93F04D66AE4C}"/>
+          </ac:cxnSpMkLst>
+        </pc:cxnChg>
+        <pc:cxnChg chg="mod">
+          <ac:chgData name="Akdemir, Kerem Ziya" userId="a44fdb48-31b8-4682-ac1b-f99c482bb255" providerId="ADAL" clId="{688B7241-4242-4B42-B3A6-CEC9B70039E1}" dt="2024-07-05T22:37:51.061" v="57" actId="1076"/>
+          <ac:cxnSpMkLst>
+            <pc:docMk/>
+            <pc:sldMk cId="1561297468" sldId="259"/>
+            <ac:cxnSpMk id="181" creationId="{C4397C91-572D-E572-0C42-DB540BDA2AB4}"/>
+          </ac:cxnSpMkLst>
+        </pc:cxnChg>
+        <pc:cxnChg chg="mod">
+          <ac:chgData name="Akdemir, Kerem Ziya" userId="a44fdb48-31b8-4682-ac1b-f99c482bb255" providerId="ADAL" clId="{688B7241-4242-4B42-B3A6-CEC9B70039E1}" dt="2024-07-05T22:37:51.061" v="57" actId="1076"/>
+          <ac:cxnSpMkLst>
+            <pc:docMk/>
+            <pc:sldMk cId="1561297468" sldId="259"/>
+            <ac:cxnSpMk id="182" creationId="{256E4401-0439-741A-9062-5CFAC96C3F9D}"/>
+          </ac:cxnSpMkLst>
+        </pc:cxnChg>
+        <pc:cxnChg chg="mod">
+          <ac:chgData name="Akdemir, Kerem Ziya" userId="a44fdb48-31b8-4682-ac1b-f99c482bb255" providerId="ADAL" clId="{688B7241-4242-4B42-B3A6-CEC9B70039E1}" dt="2024-07-05T22:37:51.061" v="57" actId="1076"/>
+          <ac:cxnSpMkLst>
+            <pc:docMk/>
+            <pc:sldMk cId="1561297468" sldId="259"/>
+            <ac:cxnSpMk id="183" creationId="{BD6EC09E-8E78-47A1-4E39-F6D4B2DCC7CA}"/>
+          </ac:cxnSpMkLst>
+        </pc:cxnChg>
+        <pc:cxnChg chg="mod">
+          <ac:chgData name="Akdemir, Kerem Ziya" userId="a44fdb48-31b8-4682-ac1b-f99c482bb255" providerId="ADAL" clId="{688B7241-4242-4B42-B3A6-CEC9B70039E1}" dt="2024-07-05T22:37:51.061" v="57" actId="1076"/>
+          <ac:cxnSpMkLst>
+            <pc:docMk/>
+            <pc:sldMk cId="1561297468" sldId="259"/>
+            <ac:cxnSpMk id="184" creationId="{069EF214-87CE-E32F-CB35-8B8480F4A209}"/>
+          </ac:cxnSpMkLst>
+        </pc:cxnChg>
+        <pc:cxnChg chg="mod">
+          <ac:chgData name="Akdemir, Kerem Ziya" userId="a44fdb48-31b8-4682-ac1b-f99c482bb255" providerId="ADAL" clId="{688B7241-4242-4B42-B3A6-CEC9B70039E1}" dt="2024-07-05T22:37:51.061" v="57" actId="1076"/>
+          <ac:cxnSpMkLst>
+            <pc:docMk/>
+            <pc:sldMk cId="1561297468" sldId="259"/>
+            <ac:cxnSpMk id="185" creationId="{B7A67A01-59A7-77EC-02A1-2EE8B1280FCD}"/>
+          </ac:cxnSpMkLst>
+        </pc:cxnChg>
+        <pc:cxnChg chg="mod">
+          <ac:chgData name="Akdemir, Kerem Ziya" userId="a44fdb48-31b8-4682-ac1b-f99c482bb255" providerId="ADAL" clId="{688B7241-4242-4B42-B3A6-CEC9B70039E1}" dt="2024-07-05T22:37:51.061" v="57" actId="1076"/>
+          <ac:cxnSpMkLst>
+            <pc:docMk/>
+            <pc:sldMk cId="1561297468" sldId="259"/>
+            <ac:cxnSpMk id="186" creationId="{CA2F7D4F-3959-1214-E2F3-DCB3A7B0EB3A}"/>
+          </ac:cxnSpMkLst>
+        </pc:cxnChg>
+        <pc:cxnChg chg="mod">
+          <ac:chgData name="Akdemir, Kerem Ziya" userId="a44fdb48-31b8-4682-ac1b-f99c482bb255" providerId="ADAL" clId="{688B7241-4242-4B42-B3A6-CEC9B70039E1}" dt="2024-07-05T22:37:51.061" v="57" actId="1076"/>
+          <ac:cxnSpMkLst>
+            <pc:docMk/>
+            <pc:sldMk cId="1561297468" sldId="259"/>
+            <ac:cxnSpMk id="188" creationId="{56AFA906-7A26-EE1F-06F7-B9BBA9688CA1}"/>
+          </ac:cxnSpMkLst>
+        </pc:cxnChg>
+        <pc:cxnChg chg="del mod">
+          <ac:chgData name="Akdemir, Kerem Ziya" userId="a44fdb48-31b8-4682-ac1b-f99c482bb255" providerId="ADAL" clId="{688B7241-4242-4B42-B3A6-CEC9B70039E1}" dt="2024-07-05T22:36:25.879" v="53" actId="478"/>
+          <ac:cxnSpMkLst>
+            <pc:docMk/>
+            <pc:sldMk cId="1561297468" sldId="259"/>
+            <ac:cxnSpMk id="190" creationId="{7278E078-082A-B647-0064-E086730E9710}"/>
+          </ac:cxnSpMkLst>
+        </pc:cxnChg>
+        <pc:cxnChg chg="mod">
+          <ac:chgData name="Akdemir, Kerem Ziya" userId="a44fdb48-31b8-4682-ac1b-f99c482bb255" providerId="ADAL" clId="{688B7241-4242-4B42-B3A6-CEC9B70039E1}" dt="2024-07-05T22:38:57.045" v="63" actId="1076"/>
+          <ac:cxnSpMkLst>
+            <pc:docMk/>
+            <pc:sldMk cId="1561297468" sldId="259"/>
+            <ac:cxnSpMk id="191" creationId="{B677AA42-91C1-59A5-96EA-76AD92D1DBFF}"/>
+          </ac:cxnSpMkLst>
+        </pc:cxnChg>
+        <pc:cxnChg chg="mod">
+          <ac:chgData name="Akdemir, Kerem Ziya" userId="a44fdb48-31b8-4682-ac1b-f99c482bb255" providerId="ADAL" clId="{688B7241-4242-4B42-B3A6-CEC9B70039E1}" dt="2024-07-05T22:37:51.061" v="57" actId="1076"/>
+          <ac:cxnSpMkLst>
+            <pc:docMk/>
+            <pc:sldMk cId="1561297468" sldId="259"/>
+            <ac:cxnSpMk id="192" creationId="{B2C2C1EE-8D0B-715F-7F50-5162F8D324AE}"/>
+          </ac:cxnSpMkLst>
+        </pc:cxnChg>
+        <pc:cxnChg chg="mod">
+          <ac:chgData name="Akdemir, Kerem Ziya" userId="a44fdb48-31b8-4682-ac1b-f99c482bb255" providerId="ADAL" clId="{688B7241-4242-4B42-B3A6-CEC9B70039E1}" dt="2024-07-05T22:38:21.361" v="60" actId="1076"/>
+          <ac:cxnSpMkLst>
+            <pc:docMk/>
+            <pc:sldMk cId="1561297468" sldId="259"/>
+            <ac:cxnSpMk id="200" creationId="{59AA8DB5-5520-F33E-8360-0D6E1E27AFA7}"/>
+          </ac:cxnSpMkLst>
+        </pc:cxnChg>
+        <pc:cxnChg chg="mod">
+          <ac:chgData name="Akdemir, Kerem Ziya" userId="a44fdb48-31b8-4682-ac1b-f99c482bb255" providerId="ADAL" clId="{688B7241-4242-4B42-B3A6-CEC9B70039E1}" dt="2024-07-05T22:37:51.061" v="57" actId="1076"/>
+          <ac:cxnSpMkLst>
+            <pc:docMk/>
+            <pc:sldMk cId="1561297468" sldId="259"/>
+            <ac:cxnSpMk id="201" creationId="{8819635E-D114-0E3A-E82B-31353D4359D9}"/>
+          </ac:cxnSpMkLst>
+        </pc:cxnChg>
+        <pc:cxnChg chg="mod">
+          <ac:chgData name="Akdemir, Kerem Ziya" userId="a44fdb48-31b8-4682-ac1b-f99c482bb255" providerId="ADAL" clId="{688B7241-4242-4B42-B3A6-CEC9B70039E1}" dt="2024-07-05T22:37:51.061" v="57" actId="1076"/>
+          <ac:cxnSpMkLst>
+            <pc:docMk/>
+            <pc:sldMk cId="1561297468" sldId="259"/>
+            <ac:cxnSpMk id="205" creationId="{D2B8E44C-E301-FBE3-0B6A-D7020FD8839A}"/>
+          </ac:cxnSpMkLst>
+        </pc:cxnChg>
+        <pc:cxnChg chg="mod">
+          <ac:chgData name="Akdemir, Kerem Ziya" userId="a44fdb48-31b8-4682-ac1b-f99c482bb255" providerId="ADAL" clId="{688B7241-4242-4B42-B3A6-CEC9B70039E1}" dt="2024-07-05T22:38:57.045" v="63" actId="1076"/>
+          <ac:cxnSpMkLst>
+            <pc:docMk/>
+            <pc:sldMk cId="1561297468" sldId="259"/>
+            <ac:cxnSpMk id="225" creationId="{DA5B5457-9C0B-BC26-6AE3-A66D34FF9AB0}"/>
+          </ac:cxnSpMkLst>
+        </pc:cxnChg>
+        <pc:cxnChg chg="mod">
+          <ac:chgData name="Akdemir, Kerem Ziya" userId="a44fdb48-31b8-4682-ac1b-f99c482bb255" providerId="ADAL" clId="{688B7241-4242-4B42-B3A6-CEC9B70039E1}" dt="2024-07-05T22:38:57.045" v="63" actId="1076"/>
+          <ac:cxnSpMkLst>
+            <pc:docMk/>
+            <pc:sldMk cId="1561297468" sldId="259"/>
+            <ac:cxnSpMk id="226" creationId="{CBE3E11B-9FC2-F4D7-B4A5-E9C31980A09B}"/>
+          </ac:cxnSpMkLst>
+        </pc:cxnChg>
+        <pc:cxnChg chg="mod">
+          <ac:chgData name="Akdemir, Kerem Ziya" userId="a44fdb48-31b8-4682-ac1b-f99c482bb255" providerId="ADAL" clId="{688B7241-4242-4B42-B3A6-CEC9B70039E1}" dt="2024-07-05T22:38:57.045" v="63" actId="1076"/>
+          <ac:cxnSpMkLst>
+            <pc:docMk/>
+            <pc:sldMk cId="1561297468" sldId="259"/>
+            <ac:cxnSpMk id="227" creationId="{27C0AE7D-57B4-7F4A-F26F-ADB0D75EC5D7}"/>
+          </ac:cxnSpMkLst>
+        </pc:cxnChg>
+        <pc:cxnChg chg="mod">
+          <ac:chgData name="Akdemir, Kerem Ziya" userId="a44fdb48-31b8-4682-ac1b-f99c482bb255" providerId="ADAL" clId="{688B7241-4242-4B42-B3A6-CEC9B70039E1}" dt="2024-07-05T22:38:57.045" v="63" actId="1076"/>
+          <ac:cxnSpMkLst>
+            <pc:docMk/>
+            <pc:sldMk cId="1561297468" sldId="259"/>
+            <ac:cxnSpMk id="236" creationId="{892D18AE-DCF1-5E8E-5A8F-D32DE2C20EAD}"/>
+          </ac:cxnSpMkLst>
+        </pc:cxnChg>
+        <pc:cxnChg chg="add del mod">
+          <ac:chgData name="Akdemir, Kerem Ziya" userId="a44fdb48-31b8-4682-ac1b-f99c482bb255" providerId="ADAL" clId="{688B7241-4242-4B42-B3A6-CEC9B70039E1}" dt="2024-07-05T22:36:11.254" v="51" actId="478"/>
+          <ac:cxnSpMkLst>
+            <pc:docMk/>
+            <pc:sldMk cId="1561297468" sldId="259"/>
+            <ac:cxnSpMk id="1024" creationId="{EF8AAA27-AFE4-0D63-99A3-87DC8040ED33}"/>
+          </ac:cxnSpMkLst>
+        </pc:cxnChg>
+        <pc:cxnChg chg="mod">
+          <ac:chgData name="Akdemir, Kerem Ziya" userId="a44fdb48-31b8-4682-ac1b-f99c482bb255" providerId="ADAL" clId="{688B7241-4242-4B42-B3A6-CEC9B70039E1}" dt="2024-07-05T22:38:57.045" v="63" actId="1076"/>
+          <ac:cxnSpMkLst>
+            <pc:docMk/>
+            <pc:sldMk cId="1561297468" sldId="259"/>
+            <ac:cxnSpMk id="1026" creationId="{5D56DF7B-7E9B-2637-A803-68794C5C056F}"/>
+          </ac:cxnSpMkLst>
+        </pc:cxnChg>
+        <pc:cxnChg chg="mod">
+          <ac:chgData name="Akdemir, Kerem Ziya" userId="a44fdb48-31b8-4682-ac1b-f99c482bb255" providerId="ADAL" clId="{688B7241-4242-4B42-B3A6-CEC9B70039E1}" dt="2024-07-05T22:37:51.061" v="57" actId="1076"/>
+          <ac:cxnSpMkLst>
+            <pc:docMk/>
+            <pc:sldMk cId="1561297468" sldId="259"/>
+            <ac:cxnSpMk id="1032" creationId="{32970624-4DDA-D838-D87F-D5EA77A90590}"/>
+          </ac:cxnSpMkLst>
+        </pc:cxnChg>
+        <pc:cxnChg chg="mod">
+          <ac:chgData name="Akdemir, Kerem Ziya" userId="a44fdb48-31b8-4682-ac1b-f99c482bb255" providerId="ADAL" clId="{688B7241-4242-4B42-B3A6-CEC9B70039E1}" dt="2024-07-05T22:38:57.045" v="63" actId="1076"/>
+          <ac:cxnSpMkLst>
+            <pc:docMk/>
+            <pc:sldMk cId="1561297468" sldId="259"/>
+            <ac:cxnSpMk id="1033" creationId="{36CC3BB6-A79F-816B-C85B-62ECC900DBB1}"/>
+          </ac:cxnSpMkLst>
+        </pc:cxnChg>
+        <pc:cxnChg chg="mod">
+          <ac:chgData name="Akdemir, Kerem Ziya" userId="a44fdb48-31b8-4682-ac1b-f99c482bb255" providerId="ADAL" clId="{688B7241-4242-4B42-B3A6-CEC9B70039E1}" dt="2024-07-05T22:37:51.061" v="57" actId="1076"/>
+          <ac:cxnSpMkLst>
+            <pc:docMk/>
+            <pc:sldMk cId="1561297468" sldId="259"/>
+            <ac:cxnSpMk id="1038" creationId="{BB0E8517-7F72-8AC2-F375-8DF99E3218BA}"/>
+          </ac:cxnSpMkLst>
+        </pc:cxnChg>
+        <pc:cxnChg chg="mod">
+          <ac:chgData name="Akdemir, Kerem Ziya" userId="a44fdb48-31b8-4682-ac1b-f99c482bb255" providerId="ADAL" clId="{688B7241-4242-4B42-B3A6-CEC9B70039E1}" dt="2024-07-05T22:37:51.061" v="57" actId="1076"/>
+          <ac:cxnSpMkLst>
+            <pc:docMk/>
+            <pc:sldMk cId="1561297468" sldId="259"/>
+            <ac:cxnSpMk id="1039" creationId="{647966BD-719C-CBB2-E269-E2AE49D38505}"/>
+          </ac:cxnSpMkLst>
+        </pc:cxnChg>
+        <pc:cxnChg chg="mod">
+          <ac:chgData name="Akdemir, Kerem Ziya" userId="a44fdb48-31b8-4682-ac1b-f99c482bb255" providerId="ADAL" clId="{688B7241-4242-4B42-B3A6-CEC9B70039E1}" dt="2024-07-05T22:37:51.061" v="57" actId="1076"/>
+          <ac:cxnSpMkLst>
+            <pc:docMk/>
+            <pc:sldMk cId="1561297468" sldId="259"/>
+            <ac:cxnSpMk id="1040" creationId="{B194B285-32F8-9376-1273-BA6A365DA1A6}"/>
+          </ac:cxnSpMkLst>
+        </pc:cxnChg>
+        <pc:cxnChg chg="mod">
+          <ac:chgData name="Akdemir, Kerem Ziya" userId="a44fdb48-31b8-4682-ac1b-f99c482bb255" providerId="ADAL" clId="{688B7241-4242-4B42-B3A6-CEC9B70039E1}" dt="2024-07-05T22:37:51.061" v="57" actId="1076"/>
+          <ac:cxnSpMkLst>
+            <pc:docMk/>
+            <pc:sldMk cId="1561297468" sldId="259"/>
+            <ac:cxnSpMk id="1041" creationId="{6B8F0EF4-8DA1-ADD8-17CD-CBBFDAA0A683}"/>
+          </ac:cxnSpMkLst>
+        </pc:cxnChg>
+        <pc:cxnChg chg="del mod">
+          <ac:chgData name="Akdemir, Kerem Ziya" userId="a44fdb48-31b8-4682-ac1b-f99c482bb255" providerId="ADAL" clId="{688B7241-4242-4B42-B3A6-CEC9B70039E1}" dt="2024-07-05T22:36:25.879" v="53" actId="478"/>
+          <ac:cxnSpMkLst>
+            <pc:docMk/>
+            <pc:sldMk cId="1561297468" sldId="259"/>
+            <ac:cxnSpMk id="1046" creationId="{D51A834F-8E5F-96B2-107D-838DAE25C188}"/>
+          </ac:cxnSpMkLst>
+        </pc:cxnChg>
+        <pc:cxnChg chg="mod">
+          <ac:chgData name="Akdemir, Kerem Ziya" userId="a44fdb48-31b8-4682-ac1b-f99c482bb255" providerId="ADAL" clId="{688B7241-4242-4B42-B3A6-CEC9B70039E1}" dt="2024-07-05T22:37:51.061" v="57" actId="1076"/>
+          <ac:cxnSpMkLst>
+            <pc:docMk/>
+            <pc:sldMk cId="1561297468" sldId="259"/>
+            <ac:cxnSpMk id="1048" creationId="{0259AB7F-A023-D32B-68EF-4A67B9328F16}"/>
+          </ac:cxnSpMkLst>
+        </pc:cxnChg>
+        <pc:cxnChg chg="mod">
+          <ac:chgData name="Akdemir, Kerem Ziya" userId="a44fdb48-31b8-4682-ac1b-f99c482bb255" providerId="ADAL" clId="{688B7241-4242-4B42-B3A6-CEC9B70039E1}" dt="2024-07-05T22:38:57.045" v="63" actId="1076"/>
+          <ac:cxnSpMkLst>
+            <pc:docMk/>
+            <pc:sldMk cId="1561297468" sldId="259"/>
+            <ac:cxnSpMk id="1049" creationId="{A4546719-2BDD-138A-261A-97EB2E95B804}"/>
+          </ac:cxnSpMkLst>
+        </pc:cxnChg>
+        <pc:cxnChg chg="mod">
+          <ac:chgData name="Akdemir, Kerem Ziya" userId="a44fdb48-31b8-4682-ac1b-f99c482bb255" providerId="ADAL" clId="{688B7241-4242-4B42-B3A6-CEC9B70039E1}" dt="2024-07-05T22:38:57.045" v="63" actId="1076"/>
+          <ac:cxnSpMkLst>
+            <pc:docMk/>
+            <pc:sldMk cId="1561297468" sldId="259"/>
+            <ac:cxnSpMk id="1050" creationId="{EF84878B-502F-76CB-0DDB-A623CDC87F5D}"/>
+          </ac:cxnSpMkLst>
+        </pc:cxnChg>
+        <pc:cxnChg chg="mod">
+          <ac:chgData name="Akdemir, Kerem Ziya" userId="a44fdb48-31b8-4682-ac1b-f99c482bb255" providerId="ADAL" clId="{688B7241-4242-4B42-B3A6-CEC9B70039E1}" dt="2024-07-05T22:38:57.045" v="63" actId="1076"/>
+          <ac:cxnSpMkLst>
+            <pc:docMk/>
+            <pc:sldMk cId="1561297468" sldId="259"/>
+            <ac:cxnSpMk id="1051" creationId="{9ED1AA50-722A-70F9-97F5-8FAB09E02ABA}"/>
+          </ac:cxnSpMkLst>
+        </pc:cxnChg>
+        <pc:cxnChg chg="mod">
+          <ac:chgData name="Akdemir, Kerem Ziya" userId="a44fdb48-31b8-4682-ac1b-f99c482bb255" providerId="ADAL" clId="{688B7241-4242-4B42-B3A6-CEC9B70039E1}" dt="2024-07-05T22:38:57.045" v="63" actId="1076"/>
+          <ac:cxnSpMkLst>
+            <pc:docMk/>
+            <pc:sldMk cId="1561297468" sldId="259"/>
+            <ac:cxnSpMk id="1052" creationId="{0D023158-B135-1824-2699-EB750660E0E2}"/>
+          </ac:cxnSpMkLst>
+        </pc:cxnChg>
+        <pc:cxnChg chg="mod">
+          <ac:chgData name="Akdemir, Kerem Ziya" userId="a44fdb48-31b8-4682-ac1b-f99c482bb255" providerId="ADAL" clId="{688B7241-4242-4B42-B3A6-CEC9B70039E1}" dt="2024-07-05T22:38:57.045" v="63" actId="1076"/>
+          <ac:cxnSpMkLst>
+            <pc:docMk/>
+            <pc:sldMk cId="1561297468" sldId="259"/>
+            <ac:cxnSpMk id="1053" creationId="{BABC373D-7F79-437E-EC24-65F74FF430A6}"/>
+          </ac:cxnSpMkLst>
+        </pc:cxnChg>
+        <pc:cxnChg chg="mod">
+          <ac:chgData name="Akdemir, Kerem Ziya" userId="a44fdb48-31b8-4682-ac1b-f99c482bb255" providerId="ADAL" clId="{688B7241-4242-4B42-B3A6-CEC9B70039E1}" dt="2024-07-05T22:38:57.045" v="63" actId="1076"/>
+          <ac:cxnSpMkLst>
+            <pc:docMk/>
+            <pc:sldMk cId="1561297468" sldId="259"/>
+            <ac:cxnSpMk id="1054" creationId="{E2705733-41C2-83F7-9ED8-589D80AA73DD}"/>
+          </ac:cxnSpMkLst>
+        </pc:cxnChg>
+        <pc:cxnChg chg="mod">
+          <ac:chgData name="Akdemir, Kerem Ziya" userId="a44fdb48-31b8-4682-ac1b-f99c482bb255" providerId="ADAL" clId="{688B7241-4242-4B42-B3A6-CEC9B70039E1}" dt="2024-07-05T22:38:57.045" v="63" actId="1076"/>
+          <ac:cxnSpMkLst>
+            <pc:docMk/>
+            <pc:sldMk cId="1561297468" sldId="259"/>
+            <ac:cxnSpMk id="1055" creationId="{6A50111D-E3D4-8A28-F459-5D6604688AFB}"/>
+          </ac:cxnSpMkLst>
+        </pc:cxnChg>
+        <pc:cxnChg chg="mod">
+          <ac:chgData name="Akdemir, Kerem Ziya" userId="a44fdb48-31b8-4682-ac1b-f99c482bb255" providerId="ADAL" clId="{688B7241-4242-4B42-B3A6-CEC9B70039E1}" dt="2024-07-05T22:38:57.045" v="63" actId="1076"/>
+          <ac:cxnSpMkLst>
+            <pc:docMk/>
+            <pc:sldMk cId="1561297468" sldId="259"/>
+            <ac:cxnSpMk id="1057" creationId="{7BB5589F-64D2-62F6-E827-1722FFA27EC8}"/>
+          </ac:cxnSpMkLst>
+        </pc:cxnChg>
+        <pc:cxnChg chg="mod">
+          <ac:chgData name="Akdemir, Kerem Ziya" userId="a44fdb48-31b8-4682-ac1b-f99c482bb255" providerId="ADAL" clId="{688B7241-4242-4B42-B3A6-CEC9B70039E1}" dt="2024-07-05T22:38:57.045" v="63" actId="1076"/>
+          <ac:cxnSpMkLst>
+            <pc:docMk/>
+            <pc:sldMk cId="1561297468" sldId="259"/>
+            <ac:cxnSpMk id="1058" creationId="{04A3B0EB-8F95-5ED2-8F8E-3FBC33C6E633}"/>
+          </ac:cxnSpMkLst>
+        </pc:cxnChg>
+        <pc:cxnChg chg="mod">
+          <ac:chgData name="Akdemir, Kerem Ziya" userId="a44fdb48-31b8-4682-ac1b-f99c482bb255" providerId="ADAL" clId="{688B7241-4242-4B42-B3A6-CEC9B70039E1}" dt="2024-07-05T22:38:57.045" v="63" actId="1076"/>
+          <ac:cxnSpMkLst>
+            <pc:docMk/>
+            <pc:sldMk cId="1561297468" sldId="259"/>
+            <ac:cxnSpMk id="1059" creationId="{4E702D89-E2B6-E4D7-7C74-C6BB8D7B4307}"/>
+          </ac:cxnSpMkLst>
+        </pc:cxnChg>
+        <pc:cxnChg chg="add mod">
+          <ac:chgData name="Akdemir, Kerem Ziya" userId="a44fdb48-31b8-4682-ac1b-f99c482bb255" providerId="ADAL" clId="{688B7241-4242-4B42-B3A6-CEC9B70039E1}" dt="2024-07-05T22:37:51.061" v="57" actId="1076"/>
+          <ac:cxnSpMkLst>
+            <pc:docMk/>
+            <pc:sldMk cId="1561297468" sldId="259"/>
+            <ac:cxnSpMk id="1063" creationId="{83C51250-2235-05FA-2579-BD614154C841}"/>
+          </ac:cxnSpMkLst>
+        </pc:cxnChg>
+        <pc:cxnChg chg="add mod">
+          <ac:chgData name="Akdemir, Kerem Ziya" userId="a44fdb48-31b8-4682-ac1b-f99c482bb255" providerId="ADAL" clId="{688B7241-4242-4B42-B3A6-CEC9B70039E1}" dt="2024-07-05T22:37:51.061" v="57" actId="1076"/>
+          <ac:cxnSpMkLst>
+            <pc:docMk/>
+            <pc:sldMk cId="1561297468" sldId="259"/>
+            <ac:cxnSpMk id="1064" creationId="{962F7D4D-8361-3D68-17D2-A281AE841858}"/>
+          </ac:cxnSpMkLst>
+        </pc:cxnChg>
+        <pc:cxnChg chg="add mod">
+          <ac:chgData name="Akdemir, Kerem Ziya" userId="a44fdb48-31b8-4682-ac1b-f99c482bb255" providerId="ADAL" clId="{688B7241-4242-4B42-B3A6-CEC9B70039E1}" dt="2024-07-05T22:37:51.061" v="57" actId="1076"/>
+          <ac:cxnSpMkLst>
+            <pc:docMk/>
+            <pc:sldMk cId="1561297468" sldId="259"/>
+            <ac:cxnSpMk id="1065" creationId="{ED02BFBD-0D27-E597-051C-D242BFC90243}"/>
+          </ac:cxnSpMkLst>
+        </pc:cxnChg>
+        <pc:cxnChg chg="mod">
+          <ac:chgData name="Akdemir, Kerem Ziya" userId="a44fdb48-31b8-4682-ac1b-f99c482bb255" providerId="ADAL" clId="{688B7241-4242-4B42-B3A6-CEC9B70039E1}" dt="2024-07-05T22:37:51.061" v="57" actId="1076"/>
+          <ac:cxnSpMkLst>
+            <pc:docMk/>
+            <pc:sldMk cId="1561297468" sldId="259"/>
+            <ac:cxnSpMk id="1067" creationId="{10BE777F-F697-1740-E2A6-9758419697ED}"/>
+          </ac:cxnSpMkLst>
+        </pc:cxnChg>
+        <pc:cxnChg chg="mod">
+          <ac:chgData name="Akdemir, Kerem Ziya" userId="a44fdb48-31b8-4682-ac1b-f99c482bb255" providerId="ADAL" clId="{688B7241-4242-4B42-B3A6-CEC9B70039E1}" dt="2024-07-05T22:38:57.045" v="63" actId="1076"/>
+          <ac:cxnSpMkLst>
+            <pc:docMk/>
+            <pc:sldMk cId="1561297468" sldId="259"/>
+            <ac:cxnSpMk id="1068" creationId="{AE9B7B96-0578-A421-BF9C-827F7DAA79C5}"/>
+          </ac:cxnSpMkLst>
+        </pc:cxnChg>
+        <pc:cxnChg chg="mod">
+          <ac:chgData name="Akdemir, Kerem Ziya" userId="a44fdb48-31b8-4682-ac1b-f99c482bb255" providerId="ADAL" clId="{688B7241-4242-4B42-B3A6-CEC9B70039E1}" dt="2024-07-05T22:37:51.061" v="57" actId="1076"/>
+          <ac:cxnSpMkLst>
+            <pc:docMk/>
+            <pc:sldMk cId="1561297468" sldId="259"/>
+            <ac:cxnSpMk id="1071" creationId="{C2CF655E-18D2-2765-B5A8-D43970FFDEDA}"/>
+          </ac:cxnSpMkLst>
+        </pc:cxnChg>
+        <pc:cxnChg chg="mod">
+          <ac:chgData name="Akdemir, Kerem Ziya" userId="a44fdb48-31b8-4682-ac1b-f99c482bb255" providerId="ADAL" clId="{688B7241-4242-4B42-B3A6-CEC9B70039E1}" dt="2024-07-05T22:38:57.045" v="63" actId="1076"/>
+          <ac:cxnSpMkLst>
+            <pc:docMk/>
+            <pc:sldMk cId="1561297468" sldId="259"/>
+            <ac:cxnSpMk id="1073" creationId="{DB64BFF8-5987-371B-E0B6-CD5E36A6B366}"/>
+          </ac:cxnSpMkLst>
+        </pc:cxnChg>
+        <pc:cxnChg chg="mod">
+          <ac:chgData name="Akdemir, Kerem Ziya" userId="a44fdb48-31b8-4682-ac1b-f99c482bb255" providerId="ADAL" clId="{688B7241-4242-4B42-B3A6-CEC9B70039E1}" dt="2024-07-05T22:38:57.045" v="63" actId="1076"/>
+          <ac:cxnSpMkLst>
+            <pc:docMk/>
+            <pc:sldMk cId="1561297468" sldId="259"/>
+            <ac:cxnSpMk id="1074" creationId="{6DA09E70-E3C1-752A-8B79-358DC94C90A2}"/>
+          </ac:cxnSpMkLst>
+        </pc:cxnChg>
+        <pc:cxnChg chg="mod">
+          <ac:chgData name="Akdemir, Kerem Ziya" userId="a44fdb48-31b8-4682-ac1b-f99c482bb255" providerId="ADAL" clId="{688B7241-4242-4B42-B3A6-CEC9B70039E1}" dt="2024-07-05T22:37:51.061" v="57" actId="1076"/>
+          <ac:cxnSpMkLst>
+            <pc:docMk/>
+            <pc:sldMk cId="1561297468" sldId="259"/>
+            <ac:cxnSpMk id="1075" creationId="{82A70BE9-32C8-23EF-8554-5086360440F2}"/>
+          </ac:cxnSpMkLst>
+        </pc:cxnChg>
+        <pc:cxnChg chg="mod">
+          <ac:chgData name="Akdemir, Kerem Ziya" userId="a44fdb48-31b8-4682-ac1b-f99c482bb255" providerId="ADAL" clId="{688B7241-4242-4B42-B3A6-CEC9B70039E1}" dt="2024-07-05T22:38:57.045" v="63" actId="1076"/>
+          <ac:cxnSpMkLst>
+            <pc:docMk/>
+            <pc:sldMk cId="1561297468" sldId="259"/>
+            <ac:cxnSpMk id="1076" creationId="{BDE989C1-D8C5-3F56-F698-0BF43D85920E}"/>
+          </ac:cxnSpMkLst>
+        </pc:cxnChg>
+        <pc:cxnChg chg="mod">
+          <ac:chgData name="Akdemir, Kerem Ziya" userId="a44fdb48-31b8-4682-ac1b-f99c482bb255" providerId="ADAL" clId="{688B7241-4242-4B42-B3A6-CEC9B70039E1}" dt="2024-07-05T22:38:57.045" v="63" actId="1076"/>
+          <ac:cxnSpMkLst>
+            <pc:docMk/>
+            <pc:sldMk cId="1561297468" sldId="259"/>
+            <ac:cxnSpMk id="1077" creationId="{C6EC479E-DED3-6A72-BE40-9DCE54C189A0}"/>
+          </ac:cxnSpMkLst>
+        </pc:cxnChg>
+        <pc:cxnChg chg="mod">
+          <ac:chgData name="Akdemir, Kerem Ziya" userId="a44fdb48-31b8-4682-ac1b-f99c482bb255" providerId="ADAL" clId="{688B7241-4242-4B42-B3A6-CEC9B70039E1}" dt="2024-07-05T22:37:51.061" v="57" actId="1076"/>
+          <ac:cxnSpMkLst>
+            <pc:docMk/>
+            <pc:sldMk cId="1561297468" sldId="259"/>
+            <ac:cxnSpMk id="1078" creationId="{915EC074-0397-4F25-EEBB-DE8EA92FA894}"/>
+          </ac:cxnSpMkLst>
+        </pc:cxnChg>
+        <pc:cxnChg chg="mod">
+          <ac:chgData name="Akdemir, Kerem Ziya" userId="a44fdb48-31b8-4682-ac1b-f99c482bb255" providerId="ADAL" clId="{688B7241-4242-4B42-B3A6-CEC9B70039E1}" dt="2024-07-05T22:38:57.045" v="63" actId="1076"/>
+          <ac:cxnSpMkLst>
+            <pc:docMk/>
+            <pc:sldMk cId="1561297468" sldId="259"/>
+            <ac:cxnSpMk id="1080" creationId="{2EBA6B1C-312E-ABF8-2DB5-CC67E9F781FF}"/>
+          </ac:cxnSpMkLst>
+        </pc:cxnChg>
+        <pc:cxnChg chg="mod">
+          <ac:chgData name="Akdemir, Kerem Ziya" userId="a44fdb48-31b8-4682-ac1b-f99c482bb255" providerId="ADAL" clId="{688B7241-4242-4B42-B3A6-CEC9B70039E1}" dt="2024-07-05T22:38:57.045" v="63" actId="1076"/>
+          <ac:cxnSpMkLst>
+            <pc:docMk/>
+            <pc:sldMk cId="1561297468" sldId="259"/>
+            <ac:cxnSpMk id="1081" creationId="{48B713CD-B39D-4FD7-EA43-94D3824DC7A4}"/>
+          </ac:cxnSpMkLst>
+        </pc:cxnChg>
+        <pc:cxnChg chg="mod">
+          <ac:chgData name="Akdemir, Kerem Ziya" userId="a44fdb48-31b8-4682-ac1b-f99c482bb255" providerId="ADAL" clId="{688B7241-4242-4B42-B3A6-CEC9B70039E1}" dt="2024-07-05T22:38:57.045" v="63" actId="1076"/>
+          <ac:cxnSpMkLst>
+            <pc:docMk/>
+            <pc:sldMk cId="1561297468" sldId="259"/>
+            <ac:cxnSpMk id="1083" creationId="{83CE1312-F35C-CD71-1549-C38F7701B28E}"/>
+          </ac:cxnSpMkLst>
+        </pc:cxnChg>
+        <pc:cxnChg chg="mod">
+          <ac:chgData name="Akdemir, Kerem Ziya" userId="a44fdb48-31b8-4682-ac1b-f99c482bb255" providerId="ADAL" clId="{688B7241-4242-4B42-B3A6-CEC9B70039E1}" dt="2024-07-05T22:38:57.045" v="63" actId="1076"/>
+          <ac:cxnSpMkLst>
+            <pc:docMk/>
+            <pc:sldMk cId="1561297468" sldId="259"/>
+            <ac:cxnSpMk id="1085" creationId="{168EBA4C-0D4B-6084-3BCB-632AB0F2B5AD}"/>
+          </ac:cxnSpMkLst>
+        </pc:cxnChg>
+        <pc:cxnChg chg="mod">
+          <ac:chgData name="Akdemir, Kerem Ziya" userId="a44fdb48-31b8-4682-ac1b-f99c482bb255" providerId="ADAL" clId="{688B7241-4242-4B42-B3A6-CEC9B70039E1}" dt="2024-07-05T22:38:57.045" v="63" actId="1076"/>
+          <ac:cxnSpMkLst>
+            <pc:docMk/>
+            <pc:sldMk cId="1561297468" sldId="259"/>
+            <ac:cxnSpMk id="1086" creationId="{8362F5E7-0403-E5B5-625E-C9E539002BC7}"/>
+          </ac:cxnSpMkLst>
+        </pc:cxnChg>
+        <pc:cxnChg chg="mod">
+          <ac:chgData name="Akdemir, Kerem Ziya" userId="a44fdb48-31b8-4682-ac1b-f99c482bb255" providerId="ADAL" clId="{688B7241-4242-4B42-B3A6-CEC9B70039E1}" dt="2024-07-05T22:38:57.045" v="63" actId="1076"/>
+          <ac:cxnSpMkLst>
+            <pc:docMk/>
+            <pc:sldMk cId="1561297468" sldId="259"/>
+            <ac:cxnSpMk id="1087" creationId="{A712C7BB-0E2B-C63D-0ABF-0A7C06E6E6AA}"/>
+          </ac:cxnSpMkLst>
+        </pc:cxnChg>
+        <pc:cxnChg chg="mod">
+          <ac:chgData name="Akdemir, Kerem Ziya" userId="a44fdb48-31b8-4682-ac1b-f99c482bb255" providerId="ADAL" clId="{688B7241-4242-4B42-B3A6-CEC9B70039E1}" dt="2024-07-05T22:38:57.045" v="63" actId="1076"/>
+          <ac:cxnSpMkLst>
+            <pc:docMk/>
+            <pc:sldMk cId="1561297468" sldId="259"/>
+            <ac:cxnSpMk id="1112" creationId="{E647C527-6E58-C0FD-7577-61128C2FC24C}"/>
+          </ac:cxnSpMkLst>
+        </pc:cxnChg>
+        <pc:cxnChg chg="mod">
+          <ac:chgData name="Akdemir, Kerem Ziya" userId="a44fdb48-31b8-4682-ac1b-f99c482bb255" providerId="ADAL" clId="{688B7241-4242-4B42-B3A6-CEC9B70039E1}" dt="2024-07-05T22:38:57.045" v="63" actId="1076"/>
+          <ac:cxnSpMkLst>
+            <pc:docMk/>
+            <pc:sldMk cId="1561297468" sldId="259"/>
+            <ac:cxnSpMk id="1124" creationId="{C3AF5EF1-F5A2-C026-97E2-28B90AB5BDFC}"/>
+          </ac:cxnSpMkLst>
+        </pc:cxnChg>
+        <pc:cxnChg chg="mod">
+          <ac:chgData name="Akdemir, Kerem Ziya" userId="a44fdb48-31b8-4682-ac1b-f99c482bb255" providerId="ADAL" clId="{688B7241-4242-4B42-B3A6-CEC9B70039E1}" dt="2024-07-05T22:38:57.045" v="63" actId="1076"/>
+          <ac:cxnSpMkLst>
+            <pc:docMk/>
+            <pc:sldMk cId="1561297468" sldId="259"/>
+            <ac:cxnSpMk id="1125" creationId="{2D5ADE4D-3F58-C5A9-FD9F-E9F06B71CB52}"/>
+          </ac:cxnSpMkLst>
+        </pc:cxnChg>
+      </pc:sldChg>
+    </pc:docChg>
+  </pc:docChgLst>
+</pc:chgInfo>
+</file>
+
 <file path=ppt/slideLayouts/slideLayout1.xml><?xml version="1.0" encoding="utf-8"?>
 <p:sldLayout xmlns:a="http://schemas.openxmlformats.org/drawingml/2006/main" xmlns:r="http://schemas.openxmlformats.org/officeDocument/2006/relationships" xmlns:p="http://schemas.openxmlformats.org/presentationml/2006/main" type="title" preserve="1">
   <p:cSld name="Title Slide">
@@ -254,7 +2163,7 @@
           <a:p>
             <a:fld id="{B105DF6E-246E-4586-A323-C052D406966C}" type="datetimeFigureOut">
               <a:rPr lang="en-US" smtClean="0"/>
-              <a:t>2/18/2024</a:t>
+              <a:t>7/5/2024</a:t>
             </a:fld>
             <a:endParaRPr lang="en-US"/>
           </a:p>
@@ -424,7 +2333,7 @@
           <a:p>
             <a:fld id="{B105DF6E-246E-4586-A323-C052D406966C}" type="datetimeFigureOut">
               <a:rPr lang="en-US" smtClean="0"/>
-              <a:t>2/18/2024</a:t>
+              <a:t>7/5/2024</a:t>
             </a:fld>
             <a:endParaRPr lang="en-US"/>
           </a:p>
@@ -604,7 +2513,7 @@
           <a:p>
             <a:fld id="{B105DF6E-246E-4586-A323-C052D406966C}" type="datetimeFigureOut">
               <a:rPr lang="en-US" smtClean="0"/>
-              <a:t>2/18/2024</a:t>
+              <a:t>7/5/2024</a:t>
             </a:fld>
             <a:endParaRPr lang="en-US"/>
           </a:p>
@@ -774,7 +2683,7 @@
           <a:p>
             <a:fld id="{B105DF6E-246E-4586-A323-C052D406966C}" type="datetimeFigureOut">
               <a:rPr lang="en-US" smtClean="0"/>
-              <a:t>2/18/2024</a:t>
+              <a:t>7/5/2024</a:t>
             </a:fld>
             <a:endParaRPr lang="en-US"/>
           </a:p>
@@ -1018,7 +2927,7 @@
           <a:p>
             <a:fld id="{B105DF6E-246E-4586-A323-C052D406966C}" type="datetimeFigureOut">
               <a:rPr lang="en-US" smtClean="0"/>
-              <a:t>2/18/2024</a:t>
+              <a:t>7/5/2024</a:t>
             </a:fld>
             <a:endParaRPr lang="en-US"/>
           </a:p>
@@ -1250,7 +3159,7 @@
           <a:p>
             <a:fld id="{B105DF6E-246E-4586-A323-C052D406966C}" type="datetimeFigureOut">
               <a:rPr lang="en-US" smtClean="0"/>
-              <a:t>2/18/2024</a:t>
+              <a:t>7/5/2024</a:t>
             </a:fld>
             <a:endParaRPr lang="en-US"/>
           </a:p>
@@ -1617,7 +3526,7 @@
           <a:p>
             <a:fld id="{B105DF6E-246E-4586-A323-C052D406966C}" type="datetimeFigureOut">
               <a:rPr lang="en-US" smtClean="0"/>
-              <a:t>2/18/2024</a:t>
+              <a:t>7/5/2024</a:t>
             </a:fld>
             <a:endParaRPr lang="en-US"/>
           </a:p>
@@ -1735,7 +3644,7 @@
           <a:p>
             <a:fld id="{B105DF6E-246E-4586-A323-C052D406966C}" type="datetimeFigureOut">
               <a:rPr lang="en-US" smtClean="0"/>
-              <a:t>2/18/2024</a:t>
+              <a:t>7/5/2024</a:t>
             </a:fld>
             <a:endParaRPr lang="en-US"/>
           </a:p>
@@ -1830,7 +3739,7 @@
           <a:p>
             <a:fld id="{B105DF6E-246E-4586-A323-C052D406966C}" type="datetimeFigureOut">
               <a:rPr lang="en-US" smtClean="0"/>
-              <a:t>2/18/2024</a:t>
+              <a:t>7/5/2024</a:t>
             </a:fld>
             <a:endParaRPr lang="en-US"/>
           </a:p>
@@ -2107,7 +4016,7 @@
           <a:p>
             <a:fld id="{B105DF6E-246E-4586-A323-C052D406966C}" type="datetimeFigureOut">
               <a:rPr lang="en-US" smtClean="0"/>
-              <a:t>2/18/2024</a:t>
+              <a:t>7/5/2024</a:t>
             </a:fld>
             <a:endParaRPr lang="en-US"/>
           </a:p>
@@ -2364,7 +4273,7 @@
           <a:p>
             <a:fld id="{B105DF6E-246E-4586-A323-C052D406966C}" type="datetimeFigureOut">
               <a:rPr lang="en-US" smtClean="0"/>
-              <a:t>2/18/2024</a:t>
+              <a:t>7/5/2024</a:t>
             </a:fld>
             <a:endParaRPr lang="en-US"/>
           </a:p>
@@ -2577,7 +4486,7 @@
           <a:p>
             <a:fld id="{B105DF6E-246E-4586-A323-C052D406966C}" type="datetimeFigureOut">
               <a:rPr lang="en-US" smtClean="0"/>
-              <a:t>2/18/2024</a:t>
+              <a:t>7/5/2024</a:t>
             </a:fld>
             <a:endParaRPr lang="en-US"/>
           </a:p>
@@ -2996,7 +4905,7 @@
         </p:nvSpPr>
         <p:spPr>
           <a:xfrm>
-            <a:off x="423948" y="9814261"/>
+            <a:off x="413736" y="9970042"/>
             <a:ext cx="1090376" cy="626156"/>
           </a:xfrm>
           <a:prstGeom prst="rect">
@@ -3056,7 +4965,7 @@
         </p:nvSpPr>
         <p:spPr>
           <a:xfrm>
-            <a:off x="3151685" y="10181320"/>
+            <a:off x="3141473" y="10337101"/>
             <a:ext cx="1612173" cy="507402"/>
           </a:xfrm>
           <a:prstGeom prst="rect">
@@ -3114,7 +5023,7 @@
         </p:nvSpPr>
         <p:spPr>
           <a:xfrm>
-            <a:off x="3155059" y="9541293"/>
+            <a:off x="3144847" y="9697074"/>
             <a:ext cx="3131005" cy="488960"/>
           </a:xfrm>
           <a:prstGeom prst="rect">
@@ -3172,7 +5081,7 @@
         </p:nvSpPr>
         <p:spPr>
           <a:xfrm>
-            <a:off x="6795037" y="9834844"/>
+            <a:off x="6784825" y="9990625"/>
             <a:ext cx="1716980" cy="594893"/>
           </a:xfrm>
           <a:prstGeom prst="rect">
@@ -3237,7 +5146,7 @@
         </p:nvSpPr>
         <p:spPr>
           <a:xfrm>
-            <a:off x="8953742" y="9843166"/>
+            <a:off x="8943530" y="9998947"/>
             <a:ext cx="913258" cy="580835"/>
           </a:xfrm>
           <a:prstGeom prst="rect">
@@ -3295,7 +5204,7 @@
         </p:nvSpPr>
         <p:spPr>
           <a:xfrm>
-            <a:off x="12200283" y="9786149"/>
+            <a:off x="12190071" y="9941930"/>
             <a:ext cx="2258610" cy="682385"/>
           </a:xfrm>
           <a:prstGeom prst="rect">
@@ -3355,7 +5264,7 @@
         </p:nvSpPr>
         <p:spPr>
           <a:xfrm>
-            <a:off x="8814524" y="10814225"/>
+            <a:off x="8804312" y="10970006"/>
             <a:ext cx="946430" cy="514599"/>
           </a:xfrm>
           <a:prstGeom prst="rect">
@@ -3413,7 +5322,7 @@
         </p:nvSpPr>
         <p:spPr>
           <a:xfrm>
-            <a:off x="10528241" y="9855039"/>
+            <a:off x="10518029" y="10010820"/>
             <a:ext cx="946430" cy="546244"/>
           </a:xfrm>
           <a:prstGeom prst="rect">
@@ -3471,7 +5380,7 @@
         </p:nvSpPr>
         <p:spPr>
           <a:xfrm>
-            <a:off x="1902970" y="9522778"/>
+            <a:off x="1892758" y="9678559"/>
             <a:ext cx="946430" cy="514599"/>
           </a:xfrm>
           <a:prstGeom prst="rect">
@@ -3536,7 +5445,7 @@
         </p:nvSpPr>
         <p:spPr>
           <a:xfrm>
-            <a:off x="1901171" y="10168728"/>
+            <a:off x="1890959" y="10324509"/>
             <a:ext cx="946430" cy="514599"/>
           </a:xfrm>
           <a:prstGeom prst="rect">
@@ -3594,7 +5503,7 @@
         </p:nvSpPr>
         <p:spPr>
           <a:xfrm>
-            <a:off x="7034684" y="10730330"/>
+            <a:off x="7024472" y="10886111"/>
             <a:ext cx="1237693" cy="682384"/>
           </a:xfrm>
           <a:prstGeom prst="rect">
@@ -3659,7 +5568,7 @@
         </p:nvSpPr>
         <p:spPr>
           <a:xfrm>
-            <a:off x="10240636" y="10718408"/>
+            <a:off x="10230424" y="10874189"/>
             <a:ext cx="1521645" cy="716458"/>
           </a:xfrm>
           <a:prstGeom prst="rect">
@@ -3727,7 +5636,7 @@
         </p:nvCxnSpPr>
         <p:spPr>
           <a:xfrm>
-            <a:off x="1514326" y="10127340"/>
+            <a:off x="1504114" y="10283121"/>
             <a:ext cx="386847" cy="298686"/>
           </a:xfrm>
           <a:prstGeom prst="straightConnector1">
@@ -3770,7 +5679,7 @@
         </p:nvCxnSpPr>
         <p:spPr>
           <a:xfrm flipV="1">
-            <a:off x="1514324" y="9780077"/>
+            <a:off x="1504112" y="9935858"/>
             <a:ext cx="388646" cy="347265"/>
           </a:xfrm>
           <a:prstGeom prst="straightConnector1">
@@ -3813,7 +5722,7 @@
         </p:nvCxnSpPr>
         <p:spPr>
           <a:xfrm>
-            <a:off x="2847604" y="10426025"/>
+            <a:off x="2837392" y="10581806"/>
             <a:ext cx="304081" cy="8996"/>
           </a:xfrm>
           <a:prstGeom prst="straightConnector1">
@@ -3856,7 +5765,7 @@
         </p:nvCxnSpPr>
         <p:spPr>
           <a:xfrm>
-            <a:off x="2849403" y="9780078"/>
+            <a:off x="2839191" y="9935859"/>
             <a:ext cx="305655" cy="5699"/>
           </a:xfrm>
           <a:prstGeom prst="straightConnector1">
@@ -3898,7 +5807,7 @@
         </p:nvCxnSpPr>
         <p:spPr>
           <a:xfrm flipV="1">
-            <a:off x="4763858" y="10127343"/>
+            <a:off x="4753646" y="10283124"/>
             <a:ext cx="1878467" cy="307681"/>
           </a:xfrm>
           <a:prstGeom prst="bentConnector3">
@@ -3940,7 +5849,7 @@
         </p:nvCxnSpPr>
         <p:spPr>
           <a:xfrm>
-            <a:off x="6286063" y="9785774"/>
+            <a:off x="6275851" y="9941555"/>
             <a:ext cx="347677" cy="342916"/>
           </a:xfrm>
           <a:prstGeom prst="bentConnector3">
@@ -3981,7 +5890,7 @@
         </p:nvCxnSpPr>
         <p:spPr>
           <a:xfrm>
-            <a:off x="6470598" y="10130747"/>
+            <a:off x="6460386" y="10286528"/>
             <a:ext cx="331671" cy="0"/>
           </a:xfrm>
           <a:prstGeom prst="straightConnector1">
@@ -4024,7 +5933,7 @@
         </p:nvCxnSpPr>
         <p:spPr>
           <a:xfrm flipV="1">
-            <a:off x="7653527" y="10429737"/>
+            <a:off x="7643315" y="10585518"/>
             <a:ext cx="0" cy="300595"/>
           </a:xfrm>
           <a:prstGeom prst="straightConnector1">
@@ -4067,7 +5976,7 @@
         </p:nvCxnSpPr>
         <p:spPr>
           <a:xfrm flipH="1">
-            <a:off x="8272374" y="11071522"/>
+            <a:off x="8262162" y="11227303"/>
             <a:ext cx="542150" cy="0"/>
           </a:xfrm>
           <a:prstGeom prst="straightConnector1">
@@ -4110,7 +6019,7 @@
         </p:nvCxnSpPr>
         <p:spPr>
           <a:xfrm>
-            <a:off x="8512017" y="10132291"/>
+            <a:off x="8501805" y="10288072"/>
             <a:ext cx="441726" cy="1293"/>
           </a:xfrm>
           <a:prstGeom prst="straightConnector1">
@@ -4153,7 +6062,7 @@
         </p:nvCxnSpPr>
         <p:spPr>
           <a:xfrm flipV="1">
-            <a:off x="9867001" y="10128161"/>
+            <a:off x="9856789" y="10283942"/>
             <a:ext cx="661240" cy="5420"/>
           </a:xfrm>
           <a:prstGeom prst="straightConnector1">
@@ -4196,7 +6105,7 @@
         </p:nvCxnSpPr>
         <p:spPr>
           <a:xfrm>
-            <a:off x="9760954" y="11071522"/>
+            <a:off x="9750742" y="11227303"/>
             <a:ext cx="479680" cy="5116"/>
           </a:xfrm>
           <a:prstGeom prst="straightConnector1">
@@ -4239,7 +6148,7 @@
         </p:nvCxnSpPr>
         <p:spPr>
           <a:xfrm flipV="1">
-            <a:off x="11001456" y="10401283"/>
+            <a:off x="10991244" y="10557064"/>
             <a:ext cx="0" cy="317126"/>
           </a:xfrm>
           <a:prstGeom prst="straightConnector1">
@@ -4282,7 +6191,7 @@
         </p:nvCxnSpPr>
         <p:spPr>
           <a:xfrm flipV="1">
-            <a:off x="11474671" y="10127339"/>
+            <a:off x="11464459" y="10283120"/>
             <a:ext cx="725612" cy="822"/>
           </a:xfrm>
           <a:prstGeom prst="straightConnector1">
@@ -4321,7 +6230,7 @@
         </p:nvSpPr>
         <p:spPr>
           <a:xfrm>
-            <a:off x="423342" y="13785831"/>
+            <a:off x="413130" y="13941612"/>
             <a:ext cx="1090376" cy="626156"/>
           </a:xfrm>
           <a:prstGeom prst="rect">
@@ -4381,7 +6290,7 @@
         </p:nvSpPr>
         <p:spPr>
           <a:xfrm>
-            <a:off x="3151079" y="14152889"/>
+            <a:off x="3140867" y="14308670"/>
             <a:ext cx="1612173" cy="507402"/>
           </a:xfrm>
           <a:prstGeom prst="rect">
@@ -4436,7 +6345,7 @@
         </p:nvSpPr>
         <p:spPr>
           <a:xfrm>
-            <a:off x="3154453" y="13512863"/>
+            <a:off x="3144241" y="13668644"/>
             <a:ext cx="3131005" cy="488960"/>
           </a:xfrm>
           <a:prstGeom prst="rect">
@@ -4494,7 +6403,7 @@
         </p:nvSpPr>
         <p:spPr>
           <a:xfrm>
-            <a:off x="6794431" y="13806414"/>
+            <a:off x="6784219" y="13962195"/>
             <a:ext cx="1716980" cy="594893"/>
           </a:xfrm>
           <a:prstGeom prst="rect">
@@ -4559,7 +6468,7 @@
         </p:nvSpPr>
         <p:spPr>
           <a:xfrm>
-            <a:off x="8953136" y="13814736"/>
+            <a:off x="8942924" y="13970517"/>
             <a:ext cx="913258" cy="580835"/>
           </a:xfrm>
           <a:prstGeom prst="rect">
@@ -4624,7 +6533,7 @@
         </p:nvSpPr>
         <p:spPr>
           <a:xfrm>
-            <a:off x="12199674" y="13754497"/>
+            <a:off x="12189462" y="13910278"/>
             <a:ext cx="2258611" cy="682385"/>
           </a:xfrm>
           <a:prstGeom prst="rect">
@@ -4682,7 +6591,7 @@
         </p:nvSpPr>
         <p:spPr>
           <a:xfrm>
-            <a:off x="8813195" y="14787671"/>
+            <a:off x="8802983" y="14943452"/>
             <a:ext cx="946430" cy="514599"/>
           </a:xfrm>
           <a:prstGeom prst="rect">
@@ -4740,7 +6649,7 @@
         </p:nvSpPr>
         <p:spPr>
           <a:xfrm>
-            <a:off x="10527635" y="13826608"/>
+            <a:off x="10517423" y="13982389"/>
             <a:ext cx="946430" cy="546244"/>
           </a:xfrm>
           <a:prstGeom prst="rect">
@@ -4798,7 +6707,7 @@
         </p:nvSpPr>
         <p:spPr>
           <a:xfrm>
-            <a:off x="1902364" y="13494348"/>
+            <a:off x="1892152" y="13650129"/>
             <a:ext cx="946430" cy="514599"/>
           </a:xfrm>
           <a:prstGeom prst="rect">
@@ -4863,7 +6772,7 @@
         </p:nvSpPr>
         <p:spPr>
           <a:xfrm>
-            <a:off x="1900565" y="14140298"/>
+            <a:off x="1890353" y="14296079"/>
             <a:ext cx="946430" cy="514599"/>
           </a:xfrm>
           <a:prstGeom prst="rect">
@@ -4918,7 +6827,7 @@
         </p:nvSpPr>
         <p:spPr>
           <a:xfrm>
-            <a:off x="7033355" y="14703775"/>
+            <a:off x="7023143" y="14859556"/>
             <a:ext cx="1237693" cy="682384"/>
           </a:xfrm>
           <a:prstGeom prst="rect">
@@ -4983,7 +6892,7 @@
         </p:nvSpPr>
         <p:spPr>
           <a:xfrm>
-            <a:off x="10239307" y="14691854"/>
+            <a:off x="10229095" y="14847635"/>
             <a:ext cx="1521645" cy="716458"/>
           </a:xfrm>
           <a:prstGeom prst="rect">
@@ -5051,7 +6960,7 @@
         </p:nvCxnSpPr>
         <p:spPr>
           <a:xfrm>
-            <a:off x="1513720" y="14098909"/>
+            <a:off x="1503508" y="14254690"/>
             <a:ext cx="386847" cy="298686"/>
           </a:xfrm>
           <a:prstGeom prst="straightConnector1">
@@ -5094,7 +7003,7 @@
         </p:nvCxnSpPr>
         <p:spPr>
           <a:xfrm flipV="1">
-            <a:off x="1513718" y="13751647"/>
+            <a:off x="1503506" y="13907428"/>
             <a:ext cx="388646" cy="347265"/>
           </a:xfrm>
           <a:prstGeom prst="straightConnector1">
@@ -5137,7 +7046,7 @@
         </p:nvCxnSpPr>
         <p:spPr>
           <a:xfrm>
-            <a:off x="2846998" y="14397594"/>
+            <a:off x="2836786" y="14553375"/>
             <a:ext cx="304081" cy="8996"/>
           </a:xfrm>
           <a:prstGeom prst="straightConnector1">
@@ -5180,7 +7089,7 @@
         </p:nvCxnSpPr>
         <p:spPr>
           <a:xfrm>
-            <a:off x="2848797" y="13751648"/>
+            <a:off x="2838585" y="13907429"/>
             <a:ext cx="305655" cy="5699"/>
           </a:xfrm>
           <a:prstGeom prst="straightConnector1">
@@ -5222,7 +7131,7 @@
         </p:nvCxnSpPr>
         <p:spPr>
           <a:xfrm flipV="1">
-            <a:off x="4763252" y="14098913"/>
+            <a:off x="4753040" y="14254694"/>
             <a:ext cx="1878467" cy="307681"/>
           </a:xfrm>
           <a:prstGeom prst="bentConnector3">
@@ -5264,7 +7173,7 @@
         </p:nvCxnSpPr>
         <p:spPr>
           <a:xfrm>
-            <a:off x="6285457" y="13757343"/>
+            <a:off x="6275245" y="13913124"/>
             <a:ext cx="347677" cy="342916"/>
           </a:xfrm>
           <a:prstGeom prst="bentConnector3">
@@ -5306,7 +7215,7 @@
         </p:nvCxnSpPr>
         <p:spPr>
           <a:xfrm flipV="1">
-            <a:off x="6469992" y="14103861"/>
+            <a:off x="6459780" y="14259642"/>
             <a:ext cx="324439" cy="1290"/>
           </a:xfrm>
           <a:prstGeom prst="straightConnector1">
@@ -5348,7 +7257,7 @@
         </p:nvCxnSpPr>
         <p:spPr>
           <a:xfrm flipV="1">
-            <a:off x="7652921" y="14401307"/>
+            <a:off x="7642709" y="14557088"/>
             <a:ext cx="0" cy="300595"/>
           </a:xfrm>
           <a:prstGeom prst="straightConnector1">
@@ -5389,7 +7298,7 @@
         </p:nvCxnSpPr>
         <p:spPr>
           <a:xfrm flipH="1">
-            <a:off x="8271768" y="15043091"/>
+            <a:off x="8261556" y="15198872"/>
             <a:ext cx="542150" cy="0"/>
           </a:xfrm>
           <a:prstGeom prst="straightConnector1">
@@ -5432,7 +7341,7 @@
         </p:nvCxnSpPr>
         <p:spPr>
           <a:xfrm>
-            <a:off x="8511411" y="14103860"/>
+            <a:off x="8501199" y="14259641"/>
             <a:ext cx="441726" cy="1293"/>
           </a:xfrm>
           <a:prstGeom prst="straightConnector1">
@@ -5475,7 +7384,7 @@
         </p:nvCxnSpPr>
         <p:spPr>
           <a:xfrm flipV="1">
-            <a:off x="9866395" y="14099731"/>
+            <a:off x="9856183" y="14255512"/>
             <a:ext cx="661240" cy="5420"/>
           </a:xfrm>
           <a:prstGeom prst="straightConnector1">
@@ -5516,7 +7425,7 @@
         </p:nvCxnSpPr>
         <p:spPr>
           <a:xfrm>
-            <a:off x="9760348" y="15043091"/>
+            <a:off x="9750136" y="15198872"/>
             <a:ext cx="479680" cy="5116"/>
           </a:xfrm>
           <a:prstGeom prst="straightConnector1">
@@ -5558,7 +7467,7 @@
         </p:nvCxnSpPr>
         <p:spPr>
           <a:xfrm flipV="1">
-            <a:off x="11000850" y="14372853"/>
+            <a:off x="10990638" y="14528634"/>
             <a:ext cx="0" cy="317126"/>
           </a:xfrm>
           <a:prstGeom prst="straightConnector1">
@@ -5601,7 +7510,7 @@
         </p:nvCxnSpPr>
         <p:spPr>
           <a:xfrm flipV="1">
-            <a:off x="11474065" y="14095690"/>
+            <a:off x="11463853" y="14251471"/>
             <a:ext cx="725606" cy="4043"/>
           </a:xfrm>
           <a:prstGeom prst="straightConnector1">
@@ -5644,7 +7553,7 @@
         </p:nvCxnSpPr>
         <p:spPr>
           <a:xfrm rot="5400000">
-            <a:off x="8822315" y="9299141"/>
+            <a:off x="8812103" y="9454922"/>
             <a:ext cx="3337880" cy="5676667"/>
           </a:xfrm>
           <a:prstGeom prst="bentConnector3">
@@ -5685,7 +7594,7 @@
         </p:nvSpPr>
         <p:spPr>
           <a:xfrm rot="5400000">
-            <a:off x="7063005" y="9172676"/>
+            <a:off x="7052793" y="9328457"/>
             <a:ext cx="932348" cy="13985008"/>
           </a:xfrm>
           <a:prstGeom prst="rightBrace">
@@ -5746,7 +7655,7 @@
         </p:nvGrpSpPr>
         <p:grpSpPr>
           <a:xfrm>
-            <a:off x="12556772" y="21708672"/>
+            <a:off x="12546560" y="21864453"/>
             <a:ext cx="1901512" cy="461665"/>
             <a:chOff x="650627" y="3085646"/>
             <a:chExt cx="1901512" cy="559310"/>
@@ -5864,7 +7773,7 @@
         </p:nvSpPr>
         <p:spPr>
           <a:xfrm>
-            <a:off x="12456366" y="18883895"/>
+            <a:off x="12446154" y="19039676"/>
             <a:ext cx="1979614" cy="3350214"/>
           </a:xfrm>
           <a:prstGeom prst="rect">
@@ -5916,7 +7825,7 @@
         </p:nvGrpSpPr>
         <p:grpSpPr>
           <a:xfrm>
-            <a:off x="12556772" y="21244048"/>
+            <a:off x="12546560" y="21399829"/>
             <a:ext cx="1901512" cy="461665"/>
             <a:chOff x="650627" y="3085646"/>
             <a:chExt cx="1901512" cy="559310"/>
@@ -6034,7 +7943,7 @@
         </p:nvGrpSpPr>
         <p:grpSpPr>
           <a:xfrm>
-            <a:off x="12549208" y="20791106"/>
+            <a:off x="12538996" y="20946887"/>
             <a:ext cx="1901512" cy="461665"/>
             <a:chOff x="650627" y="3085646"/>
             <a:chExt cx="1901512" cy="559310"/>
@@ -6152,7 +8061,7 @@
         </p:nvGrpSpPr>
         <p:grpSpPr>
           <a:xfrm>
-            <a:off x="12549208" y="20325851"/>
+            <a:off x="12538996" y="20481632"/>
             <a:ext cx="1901512" cy="461665"/>
             <a:chOff x="650627" y="3085646"/>
             <a:chExt cx="1901512" cy="559310"/>
@@ -6270,7 +8179,7 @@
         </p:nvGrpSpPr>
         <p:grpSpPr>
           <a:xfrm>
-            <a:off x="12551079" y="19864817"/>
+            <a:off x="12540867" y="20020598"/>
             <a:ext cx="1901512" cy="461665"/>
             <a:chOff x="650627" y="3085646"/>
             <a:chExt cx="1901512" cy="559310"/>
@@ -6388,7 +8297,7 @@
         </p:nvGrpSpPr>
         <p:grpSpPr>
           <a:xfrm>
-            <a:off x="12554450" y="19407654"/>
+            <a:off x="12544238" y="19563435"/>
             <a:ext cx="1901512" cy="461665"/>
             <a:chOff x="650627" y="3085646"/>
             <a:chExt cx="1901512" cy="559310"/>
@@ -6509,7 +8418,7 @@
         </p:nvGrpSpPr>
         <p:grpSpPr>
           <a:xfrm>
-            <a:off x="12560443" y="18946612"/>
+            <a:off x="12550231" y="19102393"/>
             <a:ext cx="1901512" cy="461664"/>
             <a:chOff x="650627" y="3085646"/>
             <a:chExt cx="1901512" cy="559310"/>
@@ -6627,7 +8536,7 @@
         </p:nvSpPr>
         <p:spPr>
           <a:xfrm>
-            <a:off x="423949" y="2059594"/>
+            <a:off x="423339" y="2148146"/>
             <a:ext cx="1090376" cy="626156"/>
           </a:xfrm>
           <a:prstGeom prst="rect">
@@ -6687,7 +8596,7 @@
         </p:nvSpPr>
         <p:spPr>
           <a:xfrm>
-            <a:off x="3151686" y="2426653"/>
+            <a:off x="3151076" y="2515205"/>
             <a:ext cx="1612173" cy="507402"/>
           </a:xfrm>
           <a:prstGeom prst="rect">
@@ -6745,7 +8654,7 @@
         </p:nvSpPr>
         <p:spPr>
           <a:xfrm>
-            <a:off x="3155060" y="1786626"/>
+            <a:off x="3154450" y="1875178"/>
             <a:ext cx="3131005" cy="488960"/>
           </a:xfrm>
           <a:prstGeom prst="rect">
@@ -6803,7 +8712,7 @@
         </p:nvSpPr>
         <p:spPr>
           <a:xfrm>
-            <a:off x="6795038" y="2080177"/>
+            <a:off x="6794428" y="2168729"/>
             <a:ext cx="1716980" cy="594893"/>
           </a:xfrm>
           <a:prstGeom prst="rect">
@@ -6868,7 +8777,7 @@
         </p:nvSpPr>
         <p:spPr>
           <a:xfrm>
-            <a:off x="8953744" y="2088499"/>
+            <a:off x="8953134" y="2177051"/>
             <a:ext cx="2838747" cy="580835"/>
           </a:xfrm>
           <a:prstGeom prst="rect">
@@ -6926,7 +8835,7 @@
         </p:nvSpPr>
         <p:spPr>
           <a:xfrm>
-            <a:off x="3151684" y="953939"/>
+            <a:off x="3151530" y="943862"/>
             <a:ext cx="2258610" cy="682385"/>
           </a:xfrm>
           <a:prstGeom prst="rect">
@@ -6986,7 +8895,7 @@
         </p:nvSpPr>
         <p:spPr>
           <a:xfrm>
-            <a:off x="8814525" y="3059558"/>
+            <a:off x="8813915" y="3148110"/>
             <a:ext cx="946430" cy="514599"/>
           </a:xfrm>
           <a:prstGeom prst="rect">
@@ -7044,7 +8953,7 @@
         </p:nvSpPr>
         <p:spPr>
           <a:xfrm>
-            <a:off x="1930002" y="1022008"/>
+            <a:off x="1929848" y="1011931"/>
             <a:ext cx="946430" cy="546244"/>
           </a:xfrm>
           <a:prstGeom prst="rect">
@@ -7102,7 +9011,7 @@
         </p:nvSpPr>
         <p:spPr>
           <a:xfrm>
-            <a:off x="1902971" y="1768111"/>
+            <a:off x="1902361" y="1856663"/>
             <a:ext cx="946430" cy="514599"/>
           </a:xfrm>
           <a:prstGeom prst="rect">
@@ -7167,7 +9076,7 @@
         </p:nvSpPr>
         <p:spPr>
           <a:xfrm>
-            <a:off x="1901172" y="2414061"/>
+            <a:off x="1900562" y="2502613"/>
             <a:ext cx="946430" cy="514599"/>
           </a:xfrm>
           <a:prstGeom prst="rect">
@@ -7225,7 +9134,7 @@
         </p:nvSpPr>
         <p:spPr>
           <a:xfrm>
-            <a:off x="7034685" y="2975663"/>
+            <a:off x="7034075" y="3064215"/>
             <a:ext cx="1237693" cy="682384"/>
           </a:xfrm>
           <a:prstGeom prst="rect">
@@ -7293,7 +9202,7 @@
         </p:nvCxnSpPr>
         <p:spPr>
           <a:xfrm>
-            <a:off x="1514327" y="2372673"/>
+            <a:off x="1513717" y="2461225"/>
             <a:ext cx="386847" cy="298686"/>
           </a:xfrm>
           <a:prstGeom prst="straightConnector1">
@@ -7336,7 +9245,7 @@
         </p:nvCxnSpPr>
         <p:spPr>
           <a:xfrm flipV="1">
-            <a:off x="1514325" y="2025410"/>
+            <a:off x="1513715" y="2113962"/>
             <a:ext cx="388646" cy="347265"/>
           </a:xfrm>
           <a:prstGeom prst="straightConnector1">
@@ -7379,7 +9288,7 @@
         </p:nvCxnSpPr>
         <p:spPr>
           <a:xfrm>
-            <a:off x="2847605" y="2671358"/>
+            <a:off x="2846995" y="2759910"/>
             <a:ext cx="304081" cy="8996"/>
           </a:xfrm>
           <a:prstGeom prst="straightConnector1">
@@ -7422,7 +9331,7 @@
         </p:nvCxnSpPr>
         <p:spPr>
           <a:xfrm>
-            <a:off x="2849404" y="2025411"/>
+            <a:off x="2848794" y="2113963"/>
             <a:ext cx="305655" cy="5699"/>
           </a:xfrm>
           <a:prstGeom prst="straightConnector1">
@@ -7464,7 +9373,7 @@
         </p:nvCxnSpPr>
         <p:spPr>
           <a:xfrm flipV="1">
-            <a:off x="4763859" y="2372676"/>
+            <a:off x="4763249" y="2461228"/>
             <a:ext cx="1878467" cy="307681"/>
           </a:xfrm>
           <a:prstGeom prst="bentConnector3">
@@ -7506,7 +9415,7 @@
         </p:nvCxnSpPr>
         <p:spPr>
           <a:xfrm>
-            <a:off x="6286064" y="2031107"/>
+            <a:off x="6285454" y="2119659"/>
             <a:ext cx="347677" cy="342916"/>
           </a:xfrm>
           <a:prstGeom prst="bentConnector3">
@@ -7547,7 +9456,7 @@
         </p:nvCxnSpPr>
         <p:spPr>
           <a:xfrm>
-            <a:off x="6470599" y="2376080"/>
+            <a:off x="6469989" y="2464632"/>
             <a:ext cx="331671" cy="0"/>
           </a:xfrm>
           <a:prstGeom prst="straightConnector1">
@@ -7590,7 +9499,7 @@
         </p:nvCxnSpPr>
         <p:spPr>
           <a:xfrm flipV="1">
-            <a:off x="7653528" y="2675070"/>
+            <a:off x="7652918" y="2763622"/>
             <a:ext cx="0" cy="300595"/>
           </a:xfrm>
           <a:prstGeom prst="straightConnector1">
@@ -7633,7 +9542,7 @@
         </p:nvCxnSpPr>
         <p:spPr>
           <a:xfrm flipH="1">
-            <a:off x="8272375" y="3316855"/>
+            <a:off x="8271765" y="3405407"/>
             <a:ext cx="542150" cy="0"/>
           </a:xfrm>
           <a:prstGeom prst="straightConnector1">
@@ -7676,7 +9585,7 @@
         </p:nvCxnSpPr>
         <p:spPr>
           <a:xfrm>
-            <a:off x="8512018" y="2377624"/>
+            <a:off x="8511408" y="2466176"/>
             <a:ext cx="441724" cy="1293"/>
           </a:xfrm>
           <a:prstGeom prst="straightConnector1">
@@ -7719,7 +9628,7 @@
         </p:nvCxnSpPr>
         <p:spPr>
           <a:xfrm>
-            <a:off x="2876432" y="1295130"/>
+            <a:off x="2876278" y="1285053"/>
             <a:ext cx="275252" cy="0"/>
           </a:xfrm>
           <a:prstGeom prst="straightConnector1">
@@ -7758,7 +9667,7 @@
         </p:nvSpPr>
         <p:spPr>
           <a:xfrm>
-            <a:off x="424405" y="5105462"/>
+            <a:off x="406882" y="5235814"/>
             <a:ext cx="1090376" cy="626156"/>
           </a:xfrm>
           <a:prstGeom prst="rect">
@@ -7818,7 +9727,7 @@
         </p:nvSpPr>
         <p:spPr>
           <a:xfrm>
-            <a:off x="3152142" y="5472521"/>
+            <a:off x="3134619" y="5602873"/>
             <a:ext cx="1612173" cy="507402"/>
           </a:xfrm>
           <a:prstGeom prst="rect">
@@ -7876,7 +9785,7 @@
         </p:nvSpPr>
         <p:spPr>
           <a:xfrm>
-            <a:off x="3155516" y="4832494"/>
+            <a:off x="3137993" y="4962846"/>
             <a:ext cx="3131005" cy="488960"/>
           </a:xfrm>
           <a:prstGeom prst="rect">
@@ -7922,10 +9831,10 @@
       </p:sp>
       <p:sp>
         <p:nvSpPr>
-          <p:cNvPr id="173" name="Rectangle 172">
-            <a:extLst>
-              <a:ext uri="{FF2B5EF4-FFF2-40B4-BE49-F238E27FC236}">
-                <a16:creationId xmlns:a16="http://schemas.microsoft.com/office/drawing/2014/main" id="{A2449F04-0C72-AB9C-B08D-AD5256152A25}"/>
+          <p:cNvPr id="174" name="Rectangle 173">
+            <a:extLst>
+              <a:ext uri="{FF2B5EF4-FFF2-40B4-BE49-F238E27FC236}">
+                <a16:creationId xmlns:a16="http://schemas.microsoft.com/office/drawing/2014/main" id="{BA70FBCA-6B3B-575D-6663-463695E47EA8}"/>
               </a:ext>
             </a:extLst>
           </p:cNvPr>
@@ -7934,67 +9843,7 @@
         </p:nvSpPr>
         <p:spPr>
           <a:xfrm>
-            <a:off x="3152140" y="3999807"/>
-            <a:ext cx="2258610" cy="682385"/>
-          </a:xfrm>
-          <a:prstGeom prst="rect">
-            <a:avLst/>
-          </a:prstGeom>
-          <a:solidFill>
-            <a:srgbClr val="FF4F4F"/>
-          </a:solidFill>
-        </p:spPr>
-        <p:style>
-          <a:lnRef idx="2">
-            <a:schemeClr val="accent2">
-              <a:shade val="15000"/>
-            </a:schemeClr>
-          </a:lnRef>
-          <a:fillRef idx="1">
-            <a:schemeClr val="accent2"/>
-          </a:fillRef>
-          <a:effectRef idx="0">
-            <a:schemeClr val="accent2"/>
-          </a:effectRef>
-          <a:fontRef idx="minor">
-            <a:schemeClr val="lt1"/>
-          </a:fontRef>
-        </p:style>
-        <p:txBody>
-          <a:bodyPr wrap="square" lIns="91440" tIns="45720" rIns="91440" rtlCol="0" anchor="ctr">
-            <a:noAutofit/>
-          </a:bodyPr>
-          <a:lstStyle/>
-          <a:p>
-            <a:pPr algn="ctr"/>
-            <a:r>
-              <a:rPr lang="en-US" sz="1900" dirty="0">
-                <a:solidFill>
-                  <a:schemeClr val="tx1"/>
-                </a:solidFill>
-                <a:latin typeface="Arial" panose="020B0604020202020204" pitchFamily="34" charset="0"/>
-                <a:cs typeface="Arial" panose="020B0604020202020204" pitchFamily="34" charset="0"/>
-              </a:rPr>
-              <a:t>2015 generator parameters &amp; sites</a:t>
-            </a:r>
-          </a:p>
-        </p:txBody>
-      </p:sp>
-      <p:sp>
-        <p:nvSpPr>
-          <p:cNvPr id="174" name="Rectangle 173">
-            <a:extLst>
-              <a:ext uri="{FF2B5EF4-FFF2-40B4-BE49-F238E27FC236}">
-                <a16:creationId xmlns:a16="http://schemas.microsoft.com/office/drawing/2014/main" id="{BA70FBCA-6B3B-575D-6663-463695E47EA8}"/>
-              </a:ext>
-            </a:extLst>
-          </p:cNvPr>
-          <p:cNvSpPr/>
-          <p:nvPr/>
-        </p:nvSpPr>
-        <p:spPr>
-          <a:xfrm>
-            <a:off x="8814981" y="6105426"/>
+            <a:off x="8797458" y="6235778"/>
             <a:ext cx="946430" cy="514599"/>
           </a:xfrm>
           <a:prstGeom prst="rect">
@@ -8040,10 +9889,10 @@
       </p:sp>
       <p:sp>
         <p:nvSpPr>
-          <p:cNvPr id="175" name="Rectangle 174">
-            <a:extLst>
-              <a:ext uri="{FF2B5EF4-FFF2-40B4-BE49-F238E27FC236}">
-                <a16:creationId xmlns:a16="http://schemas.microsoft.com/office/drawing/2014/main" id="{4CC9177B-970B-54A0-390E-EAF09E73384E}"/>
+          <p:cNvPr id="176" name="Rectangle 175">
+            <a:extLst>
+              <a:ext uri="{FF2B5EF4-FFF2-40B4-BE49-F238E27FC236}">
+                <a16:creationId xmlns:a16="http://schemas.microsoft.com/office/drawing/2014/main" id="{A10A5615-01C8-4A79-B1A9-D65748D2CB66}"/>
               </a:ext>
             </a:extLst>
           </p:cNvPr>
@@ -8052,65 +9901,7 @@
         </p:nvSpPr>
         <p:spPr>
           <a:xfrm>
-            <a:off x="1930458" y="4067876"/>
-            <a:ext cx="946430" cy="546244"/>
-          </a:xfrm>
-          <a:prstGeom prst="rect">
-            <a:avLst/>
-          </a:prstGeom>
-          <a:solidFill>
-            <a:srgbClr val="FF4F4F"/>
-          </a:solidFill>
-        </p:spPr>
-        <p:style>
-          <a:lnRef idx="2">
-            <a:schemeClr val="accent2">
-              <a:shade val="15000"/>
-            </a:schemeClr>
-          </a:lnRef>
-          <a:fillRef idx="1">
-            <a:schemeClr val="accent2"/>
-          </a:fillRef>
-          <a:effectRef idx="0">
-            <a:schemeClr val="accent2"/>
-          </a:effectRef>
-          <a:fontRef idx="minor">
-            <a:schemeClr val="lt1"/>
-          </a:fontRef>
-        </p:style>
-        <p:txBody>
-          <a:bodyPr rtlCol="0" anchor="ctr"/>
-          <a:lstStyle/>
-          <a:p>
-            <a:pPr algn="ctr"/>
-            <a:r>
-              <a:rPr lang="en-US" sz="1908" dirty="0">
-                <a:solidFill>
-                  <a:schemeClr val="tx1"/>
-                </a:solidFill>
-                <a:latin typeface="Arial" panose="020B0604020202020204" pitchFamily="34" charset="0"/>
-                <a:cs typeface="Arial" panose="020B0604020202020204" pitchFamily="34" charset="0"/>
-              </a:rPr>
-              <a:t>CERF</a:t>
-            </a:r>
-          </a:p>
-        </p:txBody>
-      </p:sp>
-      <p:sp>
-        <p:nvSpPr>
-          <p:cNvPr id="176" name="Rectangle 175">
-            <a:extLst>
-              <a:ext uri="{FF2B5EF4-FFF2-40B4-BE49-F238E27FC236}">
-                <a16:creationId xmlns:a16="http://schemas.microsoft.com/office/drawing/2014/main" id="{A10A5615-01C8-4A79-B1A9-D65748D2CB66}"/>
-              </a:ext>
-            </a:extLst>
-          </p:cNvPr>
-          <p:cNvSpPr/>
-          <p:nvPr/>
-        </p:nvSpPr>
-        <p:spPr>
-          <a:xfrm>
-            <a:off x="1903427" y="4813979"/>
+            <a:off x="1885904" y="4944331"/>
             <a:ext cx="946430" cy="514599"/>
           </a:xfrm>
           <a:prstGeom prst="rect">
@@ -8175,7 +9966,7 @@
         </p:nvSpPr>
         <p:spPr>
           <a:xfrm>
-            <a:off x="1901628" y="5459929"/>
+            <a:off x="1884105" y="5590281"/>
             <a:ext cx="946430" cy="514599"/>
           </a:xfrm>
           <a:prstGeom prst="rect">
@@ -8233,7 +10024,7 @@
         </p:nvSpPr>
         <p:spPr>
           <a:xfrm>
-            <a:off x="7035141" y="6021531"/>
+            <a:off x="7017618" y="6151883"/>
             <a:ext cx="1237693" cy="682384"/>
           </a:xfrm>
           <a:prstGeom prst="rect">
@@ -8301,7 +10092,7 @@
         </p:nvCxnSpPr>
         <p:spPr>
           <a:xfrm>
-            <a:off x="1514783" y="5418541"/>
+            <a:off x="1497260" y="5548893"/>
             <a:ext cx="386847" cy="298686"/>
           </a:xfrm>
           <a:prstGeom prst="straightConnector1">
@@ -8344,7 +10135,7 @@
         </p:nvCxnSpPr>
         <p:spPr>
           <a:xfrm flipV="1">
-            <a:off x="1514781" y="5071278"/>
+            <a:off x="1497258" y="5201630"/>
             <a:ext cx="388646" cy="347265"/>
           </a:xfrm>
           <a:prstGeom prst="straightConnector1">
@@ -8387,7 +10178,7 @@
         </p:nvCxnSpPr>
         <p:spPr>
           <a:xfrm>
-            <a:off x="2848061" y="5717226"/>
+            <a:off x="2830538" y="5847578"/>
             <a:ext cx="304081" cy="8996"/>
           </a:xfrm>
           <a:prstGeom prst="straightConnector1">
@@ -8430,7 +10221,7 @@
         </p:nvCxnSpPr>
         <p:spPr>
           <a:xfrm>
-            <a:off x="2849860" y="5071279"/>
+            <a:off x="2832337" y="5201631"/>
             <a:ext cx="305655" cy="5699"/>
           </a:xfrm>
           <a:prstGeom prst="straightConnector1">
@@ -8472,7 +10263,7 @@
         </p:nvCxnSpPr>
         <p:spPr>
           <a:xfrm flipV="1">
-            <a:off x="4764315" y="5418544"/>
+            <a:off x="4746792" y="5548896"/>
             <a:ext cx="1878467" cy="307681"/>
           </a:xfrm>
           <a:prstGeom prst="bentConnector3">
@@ -8514,7 +10305,7 @@
         </p:nvCxnSpPr>
         <p:spPr>
           <a:xfrm>
-            <a:off x="6286520" y="5076975"/>
+            <a:off x="6268997" y="5207327"/>
             <a:ext cx="347677" cy="342916"/>
           </a:xfrm>
           <a:prstGeom prst="bentConnector3">
@@ -8555,7 +10346,7 @@
         </p:nvCxnSpPr>
         <p:spPr>
           <a:xfrm>
-            <a:off x="6471055" y="5421948"/>
+            <a:off x="6453532" y="5552300"/>
             <a:ext cx="331671" cy="0"/>
           </a:xfrm>
           <a:prstGeom prst="straightConnector1">
@@ -8597,7 +10388,7 @@
         </p:nvCxnSpPr>
         <p:spPr>
           <a:xfrm flipV="1">
-            <a:off x="7653984" y="5720938"/>
+            <a:off x="7636461" y="5851290"/>
             <a:ext cx="0" cy="300595"/>
           </a:xfrm>
           <a:prstGeom prst="straightConnector1">
@@ -8640,51 +10431,8 @@
         </p:nvCxnSpPr>
         <p:spPr>
           <a:xfrm flipH="1">
-            <a:off x="8272831" y="6362723"/>
+            <a:off x="8255308" y="6493075"/>
             <a:ext cx="542150" cy="0"/>
-          </a:xfrm>
-          <a:prstGeom prst="straightConnector1">
-            <a:avLst/>
-          </a:prstGeom>
-          <a:ln w="28575">
-            <a:tailEnd type="triangle"/>
-          </a:ln>
-        </p:spPr>
-        <p:style>
-          <a:lnRef idx="1">
-            <a:schemeClr val="dk1"/>
-          </a:lnRef>
-          <a:fillRef idx="0">
-            <a:schemeClr val="dk1"/>
-          </a:fillRef>
-          <a:effectRef idx="0">
-            <a:schemeClr val="dk1"/>
-          </a:effectRef>
-          <a:fontRef idx="minor">
-            <a:schemeClr val="tx1"/>
-          </a:fontRef>
-        </p:style>
-      </p:cxnSp>
-      <p:cxnSp>
-        <p:nvCxnSpPr>
-          <p:cNvPr id="190" name="Straight Arrow Connector 189">
-            <a:extLst>
-              <a:ext uri="{FF2B5EF4-FFF2-40B4-BE49-F238E27FC236}">
-                <a16:creationId xmlns:a16="http://schemas.microsoft.com/office/drawing/2014/main" id="{7278E078-082A-B647-0064-E086730E9710}"/>
-              </a:ext>
-            </a:extLst>
-          </p:cNvPr>
-          <p:cNvCxnSpPr>
-            <a:cxnSpLocks/>
-            <a:stCxn id="175" idx="3"/>
-            <a:endCxn id="173" idx="1"/>
-          </p:cNvCxnSpPr>
-          <p:nvPr/>
-        </p:nvCxnSpPr>
-        <p:spPr>
-          <a:xfrm>
-            <a:off x="2876888" y="4340998"/>
-            <a:ext cx="275252" cy="0"/>
           </a:xfrm>
           <a:prstGeom prst="straightConnector1">
             <a:avLst/>
@@ -8722,7 +10470,7 @@
         </p:nvSpPr>
         <p:spPr>
           <a:xfrm>
-            <a:off x="1932829" y="6406691"/>
+            <a:off x="1915306" y="6537043"/>
             <a:ext cx="946430" cy="514599"/>
           </a:xfrm>
           <a:prstGeom prst="rect">
@@ -8768,48 +10516,6 @@
       </p:sp>
       <p:cxnSp>
         <p:nvCxnSpPr>
-          <p:cNvPr id="1046" name="Connector: Elbow 1045">
-            <a:extLst>
-              <a:ext uri="{FF2B5EF4-FFF2-40B4-BE49-F238E27FC236}">
-                <a16:creationId xmlns:a16="http://schemas.microsoft.com/office/drawing/2014/main" id="{D51A834F-8E5F-96B2-107D-838DAE25C188}"/>
-              </a:ext>
-            </a:extLst>
-          </p:cNvPr>
-          <p:cNvCxnSpPr>
-            <a:cxnSpLocks/>
-            <a:stCxn id="173" idx="3"/>
-          </p:cNvCxnSpPr>
-          <p:nvPr/>
-        </p:nvCxnSpPr>
-        <p:spPr>
-          <a:xfrm>
-            <a:off x="5410750" y="4340998"/>
-            <a:ext cx="1049606" cy="732354"/>
-          </a:xfrm>
-          <a:prstGeom prst="bentConnector3">
-            <a:avLst>
-              <a:gd name="adj1" fmla="val 99782"/>
-            </a:avLst>
-          </a:prstGeom>
-          <a:ln w="28575"/>
-        </p:spPr>
-        <p:style>
-          <a:lnRef idx="1">
-            <a:schemeClr val="dk1"/>
-          </a:lnRef>
-          <a:fillRef idx="0">
-            <a:schemeClr val="dk1"/>
-          </a:fillRef>
-          <a:effectRef idx="0">
-            <a:schemeClr val="dk1"/>
-          </a:effectRef>
-          <a:fontRef idx="minor">
-            <a:schemeClr val="tx1"/>
-          </a:fontRef>
-        </p:style>
-      </p:cxnSp>
-      <p:cxnSp>
-        <p:nvCxnSpPr>
           <p:cNvPr id="1071" name="Straight Connector 1070">
             <a:extLst>
               <a:ext uri="{FF2B5EF4-FFF2-40B4-BE49-F238E27FC236}">
@@ -8824,7 +10530,7 @@
         </p:nvCxnSpPr>
         <p:spPr>
           <a:xfrm>
-            <a:off x="6626396" y="5418542"/>
+            <a:off x="6608873" y="5548894"/>
             <a:ext cx="0" cy="756649"/>
           </a:xfrm>
           <a:prstGeom prst="line">
@@ -8867,7 +10573,7 @@
         </p:nvCxnSpPr>
         <p:spPr>
           <a:xfrm flipH="1" flipV="1">
-            <a:off x="2399859" y="6168628"/>
+            <a:off x="2382336" y="6298980"/>
             <a:ext cx="4241515" cy="8285"/>
           </a:xfrm>
           <a:prstGeom prst="line">
@@ -8911,7 +10617,7 @@
         </p:nvCxnSpPr>
         <p:spPr>
           <a:xfrm>
-            <a:off x="2406044" y="6152987"/>
+            <a:off x="2388521" y="6283339"/>
             <a:ext cx="0" cy="253702"/>
           </a:xfrm>
           <a:prstGeom prst="straightConnector1">
@@ -8953,7 +10659,7 @@
         </p:nvCxnSpPr>
         <p:spPr>
           <a:xfrm flipV="1">
-            <a:off x="6763111" y="5727933"/>
+            <a:off x="6745588" y="5858285"/>
             <a:ext cx="151632" cy="961687"/>
           </a:xfrm>
           <a:prstGeom prst="bentConnector2">
@@ -8989,18 +10695,17 @@
           </p:cNvPr>
           <p:cNvCxnSpPr>
             <a:cxnSpLocks/>
-            <a:stCxn id="22" idx="3"/>
           </p:cNvCxnSpPr>
           <p:nvPr/>
         </p:nvCxnSpPr>
         <p:spPr>
           <a:xfrm>
-            <a:off x="5410296" y="1295130"/>
-            <a:ext cx="1060303" cy="741170"/>
+            <a:off x="5410140" y="1284851"/>
+            <a:ext cx="1059239" cy="829111"/>
           </a:xfrm>
           <a:prstGeom prst="bentConnector3">
             <a:avLst>
-              <a:gd name="adj1" fmla="val 99109"/>
+              <a:gd name="adj1" fmla="val 99008"/>
             </a:avLst>
           </a:prstGeom>
           <a:ln w="28575"/>
@@ -9034,7 +10739,7 @@
         </p:nvSpPr>
         <p:spPr>
           <a:xfrm>
-            <a:off x="1910050" y="11148426"/>
+            <a:off x="1899838" y="11304207"/>
             <a:ext cx="946430" cy="514599"/>
           </a:xfrm>
           <a:prstGeom prst="rect">
@@ -9092,7 +10797,7 @@
         </p:nvSpPr>
         <p:spPr>
           <a:xfrm>
-            <a:off x="3172702" y="11173024"/>
+            <a:off x="3162490" y="11328805"/>
             <a:ext cx="3567255" cy="572421"/>
           </a:xfrm>
           <a:prstGeom prst="rect">
@@ -9157,7 +10862,7 @@
         </p:nvSpPr>
         <p:spPr>
           <a:xfrm>
-            <a:off x="3181408" y="11861001"/>
+            <a:off x="3171196" y="12016782"/>
             <a:ext cx="3571246" cy="572421"/>
           </a:xfrm>
           <a:prstGeom prst="rect">
@@ -9225,7 +10930,7 @@
         </p:nvCxnSpPr>
         <p:spPr>
           <a:xfrm>
-            <a:off x="6752654" y="12147212"/>
+            <a:off x="6742442" y="12302993"/>
             <a:ext cx="214770" cy="683521"/>
           </a:xfrm>
           <a:prstGeom prst="bentConnector2">
@@ -9265,7 +10970,7 @@
         </p:nvCxnSpPr>
         <p:spPr>
           <a:xfrm>
-            <a:off x="6739957" y="11459235"/>
+            <a:off x="6729745" y="11615016"/>
             <a:ext cx="227467" cy="690587"/>
           </a:xfrm>
           <a:prstGeom prst="bentConnector2">
@@ -9304,7 +11009,7 @@
         </p:nvCxnSpPr>
         <p:spPr>
           <a:xfrm>
-            <a:off x="6963139" y="13419879"/>
+            <a:off x="6952927" y="13575660"/>
             <a:ext cx="3908" cy="394857"/>
           </a:xfrm>
           <a:prstGeom prst="straightConnector1">
@@ -9345,7 +11050,7 @@
         </p:nvCxnSpPr>
         <p:spPr>
           <a:xfrm>
-            <a:off x="6560084" y="10127339"/>
+            <a:off x="6549872" y="10283120"/>
             <a:ext cx="0" cy="711172"/>
           </a:xfrm>
           <a:prstGeom prst="line">
@@ -9388,7 +11093,7 @@
         </p:nvCxnSpPr>
         <p:spPr>
           <a:xfrm flipH="1">
-            <a:off x="2374386" y="10838511"/>
+            <a:off x="2364174" y="10994292"/>
             <a:ext cx="4185698" cy="3282"/>
           </a:xfrm>
           <a:prstGeom prst="line">
@@ -9432,7 +11137,7 @@
         </p:nvCxnSpPr>
         <p:spPr>
           <a:xfrm>
-            <a:off x="2383265" y="10840153"/>
+            <a:off x="2373053" y="10995934"/>
             <a:ext cx="0" cy="308273"/>
           </a:xfrm>
           <a:prstGeom prst="straightConnector1">
@@ -9473,7 +11178,7 @@
         </p:nvCxnSpPr>
         <p:spPr>
           <a:xfrm>
-            <a:off x="2669596" y="10963131"/>
+            <a:off x="2659384" y="11118912"/>
             <a:ext cx="0" cy="185294"/>
           </a:xfrm>
           <a:prstGeom prst="straightConnector1">
@@ -9514,7 +11219,7 @@
         </p:nvCxnSpPr>
         <p:spPr>
           <a:xfrm flipH="1">
-            <a:off x="2652928" y="10961402"/>
+            <a:off x="2642716" y="11117183"/>
             <a:ext cx="4381033" cy="0"/>
           </a:xfrm>
           <a:prstGeom prst="line">
@@ -9557,7 +11262,7 @@
         </p:nvCxnSpPr>
         <p:spPr>
           <a:xfrm flipH="1" flipV="1">
-            <a:off x="2374198" y="13255978"/>
+            <a:off x="2363986" y="13411759"/>
             <a:ext cx="5279329" cy="2907"/>
           </a:xfrm>
           <a:prstGeom prst="line">
@@ -9601,7 +11306,7 @@
         </p:nvCxnSpPr>
         <p:spPr>
           <a:xfrm flipV="1">
-            <a:off x="2371009" y="11663025"/>
+            <a:off x="2360797" y="11818806"/>
             <a:ext cx="12256" cy="1605035"/>
           </a:xfrm>
           <a:prstGeom prst="straightConnector1">
@@ -9640,7 +11345,7 @@
         </p:nvSpPr>
         <p:spPr>
           <a:xfrm rot="5400000">
-            <a:off x="6785777" y="13137412"/>
+            <a:off x="6775565" y="13293193"/>
             <a:ext cx="351185" cy="244886"/>
           </a:xfrm>
           <a:prstGeom prst="arc">
@@ -9692,7 +11397,7 @@
         </p:nvSpPr>
         <p:spPr>
           <a:xfrm>
-            <a:off x="423339" y="16908125"/>
+            <a:off x="413127" y="17063906"/>
             <a:ext cx="1090376" cy="626156"/>
           </a:xfrm>
           <a:prstGeom prst="rect">
@@ -9752,7 +11457,7 @@
         </p:nvSpPr>
         <p:spPr>
           <a:xfrm>
-            <a:off x="3151076" y="17275184"/>
+            <a:off x="3140864" y="17430965"/>
             <a:ext cx="1612173" cy="507402"/>
           </a:xfrm>
           <a:prstGeom prst="rect">
@@ -9810,7 +11515,7 @@
         </p:nvSpPr>
         <p:spPr>
           <a:xfrm>
-            <a:off x="3154450" y="16635157"/>
+            <a:off x="3144238" y="16790938"/>
             <a:ext cx="3131005" cy="488960"/>
           </a:xfrm>
           <a:prstGeom prst="rect">
@@ -9868,7 +11573,7 @@
         </p:nvSpPr>
         <p:spPr>
           <a:xfrm>
-            <a:off x="6794428" y="16928708"/>
+            <a:off x="6784216" y="17084489"/>
             <a:ext cx="1716980" cy="594893"/>
           </a:xfrm>
           <a:prstGeom prst="rect">
@@ -9933,7 +11638,7 @@
         </p:nvSpPr>
         <p:spPr>
           <a:xfrm>
-            <a:off x="8953133" y="16937030"/>
+            <a:off x="8942921" y="17092811"/>
             <a:ext cx="913258" cy="580835"/>
           </a:xfrm>
           <a:prstGeom prst="rect">
@@ -9991,7 +11696,7 @@
         </p:nvSpPr>
         <p:spPr>
           <a:xfrm>
-            <a:off x="12199674" y="16880013"/>
+            <a:off x="12189462" y="17035794"/>
             <a:ext cx="2258610" cy="682385"/>
           </a:xfrm>
           <a:prstGeom prst="rect">
@@ -10051,7 +11756,7 @@
         </p:nvSpPr>
         <p:spPr>
           <a:xfrm>
-            <a:off x="8813915" y="17908089"/>
+            <a:off x="8803703" y="18063870"/>
             <a:ext cx="946430" cy="514599"/>
           </a:xfrm>
           <a:prstGeom prst="rect">
@@ -10109,7 +11814,7 @@
         </p:nvSpPr>
         <p:spPr>
           <a:xfrm>
-            <a:off x="10527632" y="16948903"/>
+            <a:off x="10517420" y="17104684"/>
             <a:ext cx="946430" cy="546244"/>
           </a:xfrm>
           <a:prstGeom prst="rect">
@@ -10167,7 +11872,7 @@
         </p:nvSpPr>
         <p:spPr>
           <a:xfrm>
-            <a:off x="1902361" y="16616642"/>
+            <a:off x="1892149" y="16772423"/>
             <a:ext cx="946430" cy="514599"/>
           </a:xfrm>
           <a:prstGeom prst="rect">
@@ -10232,7 +11937,7 @@
         </p:nvSpPr>
         <p:spPr>
           <a:xfrm>
-            <a:off x="1900562" y="17262592"/>
+            <a:off x="1890350" y="17418373"/>
             <a:ext cx="946430" cy="514599"/>
           </a:xfrm>
           <a:prstGeom prst="rect">
@@ -10290,7 +11995,7 @@
         </p:nvSpPr>
         <p:spPr>
           <a:xfrm>
-            <a:off x="7034075" y="17824194"/>
+            <a:off x="7023863" y="17979975"/>
             <a:ext cx="1237693" cy="682384"/>
           </a:xfrm>
           <a:prstGeom prst="rect">
@@ -10355,7 +12060,7 @@
         </p:nvSpPr>
         <p:spPr>
           <a:xfrm>
-            <a:off x="10240027" y="17812272"/>
+            <a:off x="10229815" y="17968053"/>
             <a:ext cx="1521645" cy="716458"/>
           </a:xfrm>
           <a:prstGeom prst="rect">
@@ -10423,7 +12128,7 @@
         </p:nvCxnSpPr>
         <p:spPr>
           <a:xfrm>
-            <a:off x="1513717" y="17221204"/>
+            <a:off x="1503505" y="17376985"/>
             <a:ext cx="386847" cy="298686"/>
           </a:xfrm>
           <a:prstGeom prst="straightConnector1">
@@ -10466,7 +12171,7 @@
         </p:nvCxnSpPr>
         <p:spPr>
           <a:xfrm flipV="1">
-            <a:off x="1513715" y="16873941"/>
+            <a:off x="1503503" y="17029722"/>
             <a:ext cx="388646" cy="347265"/>
           </a:xfrm>
           <a:prstGeom prst="straightConnector1">
@@ -10509,7 +12214,7 @@
         </p:nvCxnSpPr>
         <p:spPr>
           <a:xfrm>
-            <a:off x="2846995" y="17519889"/>
+            <a:off x="2836783" y="17675670"/>
             <a:ext cx="304081" cy="8996"/>
           </a:xfrm>
           <a:prstGeom prst="straightConnector1">
@@ -10552,7 +12257,7 @@
         </p:nvCxnSpPr>
         <p:spPr>
           <a:xfrm>
-            <a:off x="2848794" y="16873942"/>
+            <a:off x="2838582" y="17029723"/>
             <a:ext cx="305655" cy="5699"/>
           </a:xfrm>
           <a:prstGeom prst="straightConnector1">
@@ -10594,7 +12299,7 @@
         </p:nvCxnSpPr>
         <p:spPr>
           <a:xfrm flipV="1">
-            <a:off x="4763249" y="17221207"/>
+            <a:off x="4753037" y="17376988"/>
             <a:ext cx="1878467" cy="307681"/>
           </a:xfrm>
           <a:prstGeom prst="bentConnector3">
@@ -10636,7 +12341,7 @@
         </p:nvCxnSpPr>
         <p:spPr>
           <a:xfrm>
-            <a:off x="6285454" y="16879638"/>
+            <a:off x="6275242" y="17035419"/>
             <a:ext cx="347677" cy="342916"/>
           </a:xfrm>
           <a:prstGeom prst="bentConnector3">
@@ -10677,7 +12382,7 @@
         </p:nvCxnSpPr>
         <p:spPr>
           <a:xfrm>
-            <a:off x="6469989" y="17224611"/>
+            <a:off x="6459777" y="17380392"/>
             <a:ext cx="331671" cy="0"/>
           </a:xfrm>
           <a:prstGeom prst="straightConnector1">
@@ -10720,7 +12425,7 @@
         </p:nvCxnSpPr>
         <p:spPr>
           <a:xfrm flipV="1">
-            <a:off x="7652918" y="17523601"/>
+            <a:off x="7642706" y="17679382"/>
             <a:ext cx="0" cy="300595"/>
           </a:xfrm>
           <a:prstGeom prst="straightConnector1">
@@ -10763,7 +12468,7 @@
         </p:nvCxnSpPr>
         <p:spPr>
           <a:xfrm flipH="1">
-            <a:off x="8271765" y="18165386"/>
+            <a:off x="8261553" y="18321167"/>
             <a:ext cx="542150" cy="0"/>
           </a:xfrm>
           <a:prstGeom prst="straightConnector1">
@@ -10806,7 +12511,7 @@
         </p:nvCxnSpPr>
         <p:spPr>
           <a:xfrm>
-            <a:off x="8511408" y="17226155"/>
+            <a:off x="8501196" y="17381936"/>
             <a:ext cx="441726" cy="1293"/>
           </a:xfrm>
           <a:prstGeom prst="straightConnector1">
@@ -10849,7 +12554,7 @@
         </p:nvCxnSpPr>
         <p:spPr>
           <a:xfrm flipV="1">
-            <a:off x="9866392" y="17222025"/>
+            <a:off x="9856180" y="17377806"/>
             <a:ext cx="661240" cy="5420"/>
           </a:xfrm>
           <a:prstGeom prst="straightConnector1">
@@ -10892,7 +12597,7 @@
         </p:nvCxnSpPr>
         <p:spPr>
           <a:xfrm>
-            <a:off x="9760345" y="18165386"/>
+            <a:off x="9750133" y="18321167"/>
             <a:ext cx="479680" cy="5116"/>
           </a:xfrm>
           <a:prstGeom prst="straightConnector1">
@@ -10935,7 +12640,7 @@
         </p:nvCxnSpPr>
         <p:spPr>
           <a:xfrm flipV="1">
-            <a:off x="11000847" y="17495147"/>
+            <a:off x="10990635" y="17650928"/>
             <a:ext cx="0" cy="317126"/>
           </a:xfrm>
           <a:prstGeom prst="straightConnector1">
@@ -10978,7 +12683,7 @@
         </p:nvCxnSpPr>
         <p:spPr>
           <a:xfrm flipV="1">
-            <a:off x="11474062" y="17221203"/>
+            <a:off x="11463850" y="17376984"/>
             <a:ext cx="725612" cy="822"/>
           </a:xfrm>
           <a:prstGeom prst="straightConnector1">
@@ -11017,7 +12722,7 @@
         </p:nvSpPr>
         <p:spPr>
           <a:xfrm>
-            <a:off x="423339" y="20944447"/>
+            <a:off x="413127" y="21100228"/>
             <a:ext cx="1090376" cy="626156"/>
           </a:xfrm>
           <a:prstGeom prst="rect">
@@ -11077,7 +12782,7 @@
         </p:nvSpPr>
         <p:spPr>
           <a:xfrm>
-            <a:off x="3151076" y="21311505"/>
+            <a:off x="3140864" y="21467286"/>
             <a:ext cx="1612173" cy="507402"/>
           </a:xfrm>
           <a:prstGeom prst="rect">
@@ -11132,7 +12837,7 @@
         </p:nvSpPr>
         <p:spPr>
           <a:xfrm>
-            <a:off x="3154450" y="20671479"/>
+            <a:off x="3144238" y="20827260"/>
             <a:ext cx="3131005" cy="488960"/>
           </a:xfrm>
           <a:prstGeom prst="rect">
@@ -11190,7 +12895,7 @@
         </p:nvSpPr>
         <p:spPr>
           <a:xfrm>
-            <a:off x="6794428" y="20965030"/>
+            <a:off x="6784216" y="21120811"/>
             <a:ext cx="1716980" cy="594893"/>
           </a:xfrm>
           <a:prstGeom prst="rect">
@@ -11255,7 +12960,7 @@
         </p:nvSpPr>
         <p:spPr>
           <a:xfrm>
-            <a:off x="1902361" y="20652964"/>
+            <a:off x="1892149" y="20808745"/>
             <a:ext cx="946430" cy="514599"/>
           </a:xfrm>
           <a:prstGeom prst="rect">
@@ -11320,7 +13025,7 @@
         </p:nvSpPr>
         <p:spPr>
           <a:xfrm>
-            <a:off x="1900562" y="21298914"/>
+            <a:off x="1890350" y="21454695"/>
             <a:ext cx="946430" cy="514599"/>
           </a:xfrm>
           <a:prstGeom prst="rect">
@@ -11378,7 +13083,7 @@
         </p:nvCxnSpPr>
         <p:spPr>
           <a:xfrm>
-            <a:off x="1513717" y="21257525"/>
+            <a:off x="1503505" y="21413306"/>
             <a:ext cx="386847" cy="298686"/>
           </a:xfrm>
           <a:prstGeom prst="straightConnector1">
@@ -11421,7 +13126,7 @@
         </p:nvCxnSpPr>
         <p:spPr>
           <a:xfrm flipV="1">
-            <a:off x="1513715" y="20910263"/>
+            <a:off x="1503503" y="21066044"/>
             <a:ext cx="388646" cy="347265"/>
           </a:xfrm>
           <a:prstGeom prst="straightConnector1">
@@ -11464,7 +13169,7 @@
         </p:nvCxnSpPr>
         <p:spPr>
           <a:xfrm>
-            <a:off x="2846995" y="21556210"/>
+            <a:off x="2836783" y="21711991"/>
             <a:ext cx="304081" cy="8996"/>
           </a:xfrm>
           <a:prstGeom prst="straightConnector1">
@@ -11507,7 +13212,7 @@
         </p:nvCxnSpPr>
         <p:spPr>
           <a:xfrm>
-            <a:off x="2848794" y="20910264"/>
+            <a:off x="2838582" y="21066045"/>
             <a:ext cx="305655" cy="5699"/>
           </a:xfrm>
           <a:prstGeom prst="straightConnector1">
@@ -11549,7 +13254,7 @@
         </p:nvCxnSpPr>
         <p:spPr>
           <a:xfrm flipV="1">
-            <a:off x="4763249" y="21257529"/>
+            <a:off x="4753037" y="21413310"/>
             <a:ext cx="1878467" cy="307681"/>
           </a:xfrm>
           <a:prstGeom prst="bentConnector3">
@@ -11591,7 +13296,7 @@
         </p:nvCxnSpPr>
         <p:spPr>
           <a:xfrm>
-            <a:off x="6285454" y="20915959"/>
+            <a:off x="6275242" y="21071740"/>
             <a:ext cx="347677" cy="342916"/>
           </a:xfrm>
           <a:prstGeom prst="bentConnector3">
@@ -11632,7 +13337,7 @@
         </p:nvCxnSpPr>
         <p:spPr>
           <a:xfrm>
-            <a:off x="6469989" y="21263767"/>
+            <a:off x="6459777" y="21419548"/>
             <a:ext cx="342151" cy="0"/>
           </a:xfrm>
           <a:prstGeom prst="straightConnector1">
@@ -11675,7 +13380,7 @@
         </p:nvCxnSpPr>
         <p:spPr>
           <a:xfrm rot="5400000">
-            <a:off x="8789633" y="16425684"/>
+            <a:off x="8779421" y="16581465"/>
             <a:ext cx="3402632" cy="5676061"/>
           </a:xfrm>
           <a:prstGeom prst="bentConnector3">
@@ -11716,7 +13421,7 @@
         </p:nvSpPr>
         <p:spPr>
           <a:xfrm>
-            <a:off x="1909441" y="18242290"/>
+            <a:off x="1899229" y="18398071"/>
             <a:ext cx="946430" cy="514599"/>
           </a:xfrm>
           <a:prstGeom prst="rect">
@@ -11774,7 +13479,7 @@
         </p:nvSpPr>
         <p:spPr>
           <a:xfrm>
-            <a:off x="3172093" y="18266888"/>
+            <a:off x="3161881" y="18422669"/>
             <a:ext cx="3567255" cy="572421"/>
           </a:xfrm>
           <a:prstGeom prst="rect">
@@ -11839,7 +13544,7 @@
         </p:nvSpPr>
         <p:spPr>
           <a:xfrm>
-            <a:off x="3180799" y="18954865"/>
+            <a:off x="3170587" y="19110646"/>
             <a:ext cx="3571246" cy="572421"/>
           </a:xfrm>
           <a:prstGeom prst="rect">
@@ -11906,7 +13611,7 @@
         </p:nvCxnSpPr>
         <p:spPr>
           <a:xfrm>
-            <a:off x="6751074" y="19239011"/>
+            <a:off x="6740862" y="19394792"/>
             <a:ext cx="178008" cy="838414"/>
           </a:xfrm>
           <a:prstGeom prst="bentConnector2">
@@ -11946,7 +13651,7 @@
         </p:nvCxnSpPr>
         <p:spPr>
           <a:xfrm>
-            <a:off x="6739347" y="18553098"/>
+            <a:off x="6729135" y="18708879"/>
             <a:ext cx="187736" cy="680358"/>
           </a:xfrm>
           <a:prstGeom prst="bentConnector2">
@@ -11985,7 +13690,7 @@
         </p:nvCxnSpPr>
         <p:spPr>
           <a:xfrm flipH="1">
-            <a:off x="6921247" y="20610951"/>
+            <a:off x="6911035" y="20766732"/>
             <a:ext cx="5494" cy="354079"/>
           </a:xfrm>
           <a:prstGeom prst="straightConnector1">
@@ -12026,7 +13731,7 @@
         </p:nvCxnSpPr>
         <p:spPr>
           <a:xfrm>
-            <a:off x="6559475" y="17221203"/>
+            <a:off x="6549263" y="17376984"/>
             <a:ext cx="0" cy="711172"/>
           </a:xfrm>
           <a:prstGeom prst="line">
@@ -12069,7 +13774,7 @@
         </p:nvCxnSpPr>
         <p:spPr>
           <a:xfrm flipH="1">
-            <a:off x="2373777" y="17932375"/>
+            <a:off x="2363565" y="18088156"/>
             <a:ext cx="4185698" cy="3282"/>
           </a:xfrm>
           <a:prstGeom prst="line">
@@ -12113,7 +13818,7 @@
         </p:nvCxnSpPr>
         <p:spPr>
           <a:xfrm>
-            <a:off x="2382656" y="17934017"/>
+            <a:off x="2372444" y="18089798"/>
             <a:ext cx="0" cy="308273"/>
           </a:xfrm>
           <a:prstGeom prst="straightConnector1">
@@ -12154,7 +13859,7 @@
         </p:nvCxnSpPr>
         <p:spPr>
           <a:xfrm>
-            <a:off x="2668987" y="18056995"/>
+            <a:off x="2658775" y="18212776"/>
             <a:ext cx="0" cy="185294"/>
           </a:xfrm>
           <a:prstGeom prst="straightConnector1">
@@ -12195,7 +13900,7 @@
         </p:nvCxnSpPr>
         <p:spPr>
           <a:xfrm flipH="1">
-            <a:off x="2652319" y="18055266"/>
+            <a:off x="2642107" y="18211047"/>
             <a:ext cx="4381033" cy="0"/>
           </a:xfrm>
           <a:prstGeom prst="line">
@@ -12238,7 +13943,7 @@
         </p:nvCxnSpPr>
         <p:spPr>
           <a:xfrm flipH="1">
-            <a:off x="2371009" y="20435358"/>
+            <a:off x="2360797" y="20591139"/>
             <a:ext cx="5290788" cy="0"/>
           </a:xfrm>
           <a:prstGeom prst="line">
@@ -12282,7 +13987,7 @@
         </p:nvCxnSpPr>
         <p:spPr>
           <a:xfrm flipV="1">
-            <a:off x="2382656" y="18756889"/>
+            <a:off x="2372444" y="18912670"/>
             <a:ext cx="0" cy="1678469"/>
           </a:xfrm>
           <a:prstGeom prst="straightConnector1">
@@ -12321,7 +14026,7 @@
         </p:nvSpPr>
         <p:spPr>
           <a:xfrm rot="5400000">
-            <a:off x="6748160" y="20312916"/>
+            <a:off x="6737948" y="20468697"/>
             <a:ext cx="351185" cy="244886"/>
           </a:xfrm>
           <a:prstGeom prst="arc">
@@ -12373,7 +14078,7 @@
         </p:nvSpPr>
         <p:spPr>
           <a:xfrm>
-            <a:off x="8809843" y="20970604"/>
+            <a:off x="8799631" y="21126385"/>
             <a:ext cx="3214921" cy="572421"/>
           </a:xfrm>
           <a:prstGeom prst="rect">
@@ -12431,7 +14136,7 @@
         </p:nvSpPr>
         <p:spPr>
           <a:xfrm>
-            <a:off x="8816497" y="21661688"/>
+            <a:off x="8806285" y="21817469"/>
             <a:ext cx="3214921" cy="572421"/>
           </a:xfrm>
           <a:prstGeom prst="rect">
@@ -12499,7 +14204,7 @@
         </p:nvCxnSpPr>
         <p:spPr>
           <a:xfrm>
-            <a:off x="8511404" y="21253152"/>
+            <a:off x="8501192" y="21408933"/>
             <a:ext cx="298436" cy="3660"/>
           </a:xfrm>
           <a:prstGeom prst="straightConnector1">
@@ -12541,7 +14246,7 @@
         </p:nvCxnSpPr>
         <p:spPr>
           <a:xfrm>
-            <a:off x="8602666" y="21947896"/>
+            <a:off x="8592454" y="22103677"/>
             <a:ext cx="213831" cy="0"/>
           </a:xfrm>
           <a:prstGeom prst="straightConnector1">
@@ -12582,7 +14287,7 @@
         </p:nvCxnSpPr>
         <p:spPr>
           <a:xfrm>
-            <a:off x="8609807" y="21267594"/>
+            <a:off x="8599595" y="21423375"/>
             <a:ext cx="0" cy="695325"/>
           </a:xfrm>
           <a:prstGeom prst="line">
@@ -12619,7 +14324,7 @@
         </p:nvSpPr>
         <p:spPr>
           <a:xfrm>
-            <a:off x="423339" y="8681949"/>
+            <a:off x="413127" y="8837730"/>
             <a:ext cx="5547826" cy="584775"/>
           </a:xfrm>
           <a:prstGeom prst="rect">
@@ -12638,7 +14343,7 @@
                 <a:latin typeface="Arial" panose="020B0604020202020204" pitchFamily="34" charset="0"/>
                 <a:cs typeface="Arial" panose="020B0604020202020204" pitchFamily="34" charset="0"/>
               </a:rPr>
-              <a:t>2059 Simulations</a:t>
+              <a:t>Future Simulations</a:t>
             </a:r>
           </a:p>
         </p:txBody>
@@ -12659,7 +14364,7 @@
         </p:nvCxnSpPr>
         <p:spPr>
           <a:xfrm>
-            <a:off x="484980" y="9266723"/>
+            <a:off x="474768" y="9422504"/>
             <a:ext cx="14036703" cy="0"/>
           </a:xfrm>
           <a:prstGeom prst="line">
@@ -12719,7 +14424,7 @@
                 <a:latin typeface="Arial" panose="020B0604020202020204" pitchFamily="34" charset="0"/>
                 <a:cs typeface="Arial" panose="020B0604020202020204" pitchFamily="34" charset="0"/>
               </a:rPr>
-              <a:t>2019 Simulations</a:t>
+              <a:t>Historical Simulations</a:t>
             </a:r>
           </a:p>
         </p:txBody>
@@ -12781,7 +14486,7 @@
         </p:nvSpPr>
         <p:spPr>
           <a:xfrm>
-            <a:off x="3138865" y="3064229"/>
+            <a:off x="3138255" y="3152781"/>
             <a:ext cx="3400709" cy="572421"/>
           </a:xfrm>
           <a:prstGeom prst="rect">
@@ -12849,7 +14554,7 @@
         </p:nvCxnSpPr>
         <p:spPr>
           <a:xfrm flipV="1">
-            <a:off x="6539574" y="2679961"/>
+            <a:off x="6538964" y="2768513"/>
             <a:ext cx="361427" cy="670478"/>
           </a:xfrm>
           <a:prstGeom prst="bentConnector2">
@@ -12890,7 +14595,7 @@
         </p:nvCxnSpPr>
         <p:spPr>
           <a:xfrm>
-            <a:off x="7331804" y="20602575"/>
+            <a:off x="7321592" y="20758356"/>
             <a:ext cx="0" cy="362455"/>
           </a:xfrm>
           <a:prstGeom prst="straightConnector1">
@@ -12929,7 +14634,7 @@
         </p:nvSpPr>
         <p:spPr>
           <a:xfrm rot="5400000">
-            <a:off x="7151355" y="20312915"/>
+            <a:off x="7141143" y="20468696"/>
             <a:ext cx="351185" cy="244886"/>
           </a:xfrm>
           <a:prstGeom prst="arc">
@@ -12984,7 +14689,7 @@
         </p:nvCxnSpPr>
         <p:spPr>
           <a:xfrm flipH="1">
-            <a:off x="7320028" y="18506577"/>
+            <a:off x="7309816" y="18662358"/>
             <a:ext cx="2236" cy="1764792"/>
           </a:xfrm>
           <a:prstGeom prst="line">
@@ -13027,7 +14732,7 @@
         </p:nvCxnSpPr>
         <p:spPr>
           <a:xfrm>
-            <a:off x="7451755" y="15516970"/>
+            <a:off x="7441543" y="15672751"/>
             <a:ext cx="0" cy="317390"/>
           </a:xfrm>
           <a:prstGeom prst="straightConnector1">
@@ -13068,7 +14773,7 @@
         </p:nvCxnSpPr>
         <p:spPr>
           <a:xfrm flipH="1" flipV="1">
-            <a:off x="7439853" y="15516970"/>
+            <a:off x="7429641" y="15672751"/>
             <a:ext cx="5908829" cy="12307"/>
           </a:xfrm>
           <a:prstGeom prst="line">
@@ -13112,7 +14817,7 @@
         </p:nvCxnSpPr>
         <p:spPr>
           <a:xfrm>
-            <a:off x="13328980" y="14436882"/>
+            <a:off x="13318768" y="14592663"/>
             <a:ext cx="3" cy="1092395"/>
           </a:xfrm>
           <a:prstGeom prst="line">
@@ -13153,7 +14858,7 @@
         </p:nvSpPr>
         <p:spPr>
           <a:xfrm>
-            <a:off x="6798123" y="5126914"/>
+            <a:off x="6780600" y="5257266"/>
             <a:ext cx="1716980" cy="594893"/>
           </a:xfrm>
           <a:prstGeom prst="rect">
@@ -13218,7 +14923,7 @@
         </p:nvSpPr>
         <p:spPr>
           <a:xfrm>
-            <a:off x="8937694" y="4794854"/>
+            <a:off x="8920171" y="4925206"/>
             <a:ext cx="3214921" cy="572421"/>
           </a:xfrm>
           <a:prstGeom prst="rect">
@@ -13276,7 +14981,7 @@
         </p:nvSpPr>
         <p:spPr>
           <a:xfrm>
-            <a:off x="8937694" y="5452856"/>
+            <a:off x="8920171" y="5583208"/>
             <a:ext cx="3214921" cy="572421"/>
           </a:xfrm>
           <a:prstGeom prst="rect">
@@ -13344,7 +15049,7 @@
         </p:nvCxnSpPr>
         <p:spPr>
           <a:xfrm>
-            <a:off x="8639255" y="5077402"/>
+            <a:off x="8621732" y="5207754"/>
             <a:ext cx="298436" cy="3660"/>
           </a:xfrm>
           <a:prstGeom prst="straightConnector1">
@@ -13386,7 +15091,7 @@
         </p:nvCxnSpPr>
         <p:spPr>
           <a:xfrm>
-            <a:off x="8639255" y="5739064"/>
+            <a:off x="8621732" y="5869416"/>
             <a:ext cx="298438" cy="2"/>
           </a:xfrm>
           <a:prstGeom prst="straightConnector1">
@@ -13427,7 +15132,7 @@
         </p:nvCxnSpPr>
         <p:spPr>
           <a:xfrm flipH="1">
-            <a:off x="8639827" y="5066030"/>
+            <a:off x="8622304" y="5196382"/>
             <a:ext cx="3534" cy="685800"/>
           </a:xfrm>
           <a:prstGeom prst="line">
@@ -13467,7 +15172,7 @@
         </p:nvCxnSpPr>
         <p:spPr>
           <a:xfrm flipH="1" flipV="1">
-            <a:off x="8515103" y="5424361"/>
+            <a:off x="8497580" y="5554713"/>
             <a:ext cx="124152" cy="1885"/>
           </a:xfrm>
           <a:prstGeom prst="line">
@@ -13504,7 +15209,7 @@
         </p:nvSpPr>
         <p:spPr>
           <a:xfrm>
-            <a:off x="3195857" y="6403409"/>
+            <a:off x="3178334" y="6533761"/>
             <a:ext cx="3567255" cy="572421"/>
           </a:xfrm>
           <a:prstGeom prst="rect">
@@ -13569,7 +15274,7 @@
         </p:nvSpPr>
         <p:spPr>
           <a:xfrm>
-            <a:off x="3204563" y="7091386"/>
+            <a:off x="3187040" y="7221738"/>
             <a:ext cx="3571246" cy="572421"/>
           </a:xfrm>
           <a:prstGeom prst="rect">
@@ -13638,7 +15343,7 @@
         </p:nvCxnSpPr>
         <p:spPr>
           <a:xfrm rot="5400000">
-            <a:off x="4921329" y="4188632"/>
+            <a:off x="4903806" y="4318984"/>
             <a:ext cx="217374" cy="5247943"/>
           </a:xfrm>
           <a:prstGeom prst="bentConnector3">
@@ -13681,7 +15386,7 @@
         </p:nvCxnSpPr>
         <p:spPr>
           <a:xfrm>
-            <a:off x="6914743" y="6689619"/>
+            <a:off x="6897220" y="6819971"/>
             <a:ext cx="11998" cy="1404817"/>
           </a:xfrm>
           <a:prstGeom prst="line">
@@ -13725,7 +15430,7 @@
         </p:nvCxnSpPr>
         <p:spPr>
           <a:xfrm flipH="1" flipV="1">
-            <a:off x="6775810" y="7377596"/>
+            <a:off x="6758287" y="7507948"/>
             <a:ext cx="150931" cy="2544"/>
           </a:xfrm>
           <a:prstGeom prst="line">
@@ -13766,7 +15471,7 @@
         </p:nvSpPr>
         <p:spPr>
           <a:xfrm>
-            <a:off x="3204563" y="7787284"/>
+            <a:off x="3187040" y="7917636"/>
             <a:ext cx="3571246" cy="572421"/>
           </a:xfrm>
           <a:prstGeom prst="rect">
@@ -13833,7 +15538,7 @@
         </p:nvCxnSpPr>
         <p:spPr>
           <a:xfrm flipH="1" flipV="1">
-            <a:off x="6769383" y="8076811"/>
+            <a:off x="6751860" y="8207163"/>
             <a:ext cx="150931" cy="2544"/>
           </a:xfrm>
           <a:prstGeom prst="line">
@@ -13876,7 +15581,7 @@
         </p:nvCxnSpPr>
         <p:spPr>
           <a:xfrm>
-            <a:off x="3010766" y="8069034"/>
+            <a:off x="2993243" y="8199386"/>
             <a:ext cx="200503" cy="0"/>
           </a:xfrm>
           <a:prstGeom prst="straightConnector1">
@@ -13917,7 +15622,7 @@
         </p:nvCxnSpPr>
         <p:spPr>
           <a:xfrm>
-            <a:off x="2999112" y="7392027"/>
+            <a:off x="2981589" y="7522379"/>
             <a:ext cx="200503" cy="0"/>
           </a:xfrm>
           <a:prstGeom prst="straightConnector1">
@@ -13958,7 +15663,7 @@
         </p:nvCxnSpPr>
         <p:spPr>
           <a:xfrm>
-            <a:off x="2875080" y="6699734"/>
+            <a:off x="2857557" y="6830086"/>
             <a:ext cx="320777" cy="0"/>
           </a:xfrm>
           <a:prstGeom prst="straightConnector1">
@@ -13999,7 +15704,7 @@
         </p:nvCxnSpPr>
         <p:spPr>
           <a:xfrm>
-            <a:off x="3000879" y="6689619"/>
+            <a:off x="2983356" y="6819971"/>
             <a:ext cx="0" cy="1395455"/>
           </a:xfrm>
           <a:prstGeom prst="line">
@@ -14040,7 +15745,7 @@
         </p:nvSpPr>
         <p:spPr>
           <a:xfrm>
-            <a:off x="8937694" y="4136852"/>
+            <a:off x="8920171" y="4267204"/>
             <a:ext cx="3214921" cy="572421"/>
           </a:xfrm>
           <a:prstGeom prst="rect">
@@ -14100,7 +15805,7 @@
         </p:nvCxnSpPr>
         <p:spPr>
           <a:xfrm flipH="1">
-            <a:off x="8642166" y="4392683"/>
+            <a:off x="8624643" y="4523035"/>
             <a:ext cx="3534" cy="685800"/>
           </a:xfrm>
           <a:prstGeom prst="line">
@@ -14139,7 +15844,7 @@
         </p:nvCxnSpPr>
         <p:spPr>
           <a:xfrm>
-            <a:off x="8639255" y="4406478"/>
+            <a:off x="8621732" y="4536830"/>
             <a:ext cx="298436" cy="3660"/>
           </a:xfrm>
           <a:prstGeom prst="straightConnector1">
@@ -14178,7 +15883,7 @@
         </p:nvSpPr>
         <p:spPr>
           <a:xfrm>
-            <a:off x="3181408" y="12546579"/>
+            <a:off x="3171196" y="12702360"/>
             <a:ext cx="3571246" cy="572421"/>
           </a:xfrm>
           <a:prstGeom prst="rect">
@@ -14247,7 +15952,7 @@
         </p:nvCxnSpPr>
         <p:spPr>
           <a:xfrm>
-            <a:off x="6752654" y="12832790"/>
+            <a:off x="6742442" y="12988571"/>
             <a:ext cx="204033" cy="251601"/>
           </a:xfrm>
           <a:prstGeom prst="bentConnector3">
@@ -14286,7 +15991,7 @@
         </p:nvSpPr>
         <p:spPr>
           <a:xfrm>
-            <a:off x="3180799" y="19648491"/>
+            <a:off x="3170587" y="19804272"/>
             <a:ext cx="3571246" cy="572421"/>
           </a:xfrm>
           <a:prstGeom prst="rect">
@@ -14351,7 +16056,7 @@
         </p:nvGrpSpPr>
         <p:grpSpPr>
           <a:xfrm>
-            <a:off x="2855871" y="11434866"/>
+            <a:off x="2845659" y="11590647"/>
             <a:ext cx="339986" cy="1395455"/>
             <a:chOff x="2869991" y="11434866"/>
             <a:chExt cx="336189" cy="1395455"/>
@@ -14538,7 +16243,7 @@
         </p:nvGrpSpPr>
         <p:grpSpPr>
           <a:xfrm>
-            <a:off x="2855871" y="18525559"/>
+            <a:off x="2845659" y="18681340"/>
             <a:ext cx="339986" cy="1395455"/>
             <a:chOff x="2869991" y="11434866"/>
             <a:chExt cx="336189" cy="1395455"/>
@@ -14727,7 +16432,7 @@
         </p:nvCxnSpPr>
         <p:spPr>
           <a:xfrm>
-            <a:off x="6751481" y="19929275"/>
+            <a:off x="6741269" y="20085056"/>
             <a:ext cx="167025" cy="325193"/>
           </a:xfrm>
           <a:prstGeom prst="bentConnector5">
@@ -14768,7 +16473,7 @@
         </p:nvSpPr>
         <p:spPr>
           <a:xfrm>
-            <a:off x="8804685" y="20279520"/>
+            <a:off x="8794473" y="20435301"/>
             <a:ext cx="3214921" cy="572421"/>
           </a:xfrm>
           <a:prstGeom prst="rect">
@@ -14828,7 +16533,7 @@
         </p:nvCxnSpPr>
         <p:spPr>
           <a:xfrm>
-            <a:off x="8602666" y="20585359"/>
+            <a:off x="8592454" y="20741140"/>
             <a:ext cx="202019" cy="0"/>
           </a:xfrm>
           <a:prstGeom prst="straightConnector1">
@@ -14869,13 +16574,387 @@
         </p:nvCxnSpPr>
         <p:spPr>
           <a:xfrm flipV="1">
-            <a:off x="8609807" y="20577362"/>
+            <a:off x="8599595" y="20733143"/>
             <a:ext cx="0" cy="685800"/>
           </a:xfrm>
           <a:prstGeom prst="line">
             <a:avLst/>
           </a:prstGeom>
           <a:ln w="28575"/>
+        </p:spPr>
+        <p:style>
+          <a:lnRef idx="1">
+            <a:schemeClr val="dk1"/>
+          </a:lnRef>
+          <a:fillRef idx="0">
+            <a:schemeClr val="dk1"/>
+          </a:fillRef>
+          <a:effectRef idx="0">
+            <a:schemeClr val="dk1"/>
+          </a:effectRef>
+          <a:fontRef idx="minor">
+            <a:schemeClr val="tx1"/>
+          </a:fontRef>
+        </p:style>
+      </p:cxnSp>
+      <p:cxnSp>
+        <p:nvCxnSpPr>
+          <p:cNvPr id="145" name="Connector: Elbow 144">
+            <a:extLst>
+              <a:ext uri="{FF2B5EF4-FFF2-40B4-BE49-F238E27FC236}">
+                <a16:creationId xmlns:a16="http://schemas.microsoft.com/office/drawing/2014/main" id="{A2737B3F-A7A0-7A82-1745-B3AD88482859}"/>
+              </a:ext>
+            </a:extLst>
+          </p:cNvPr>
+          <p:cNvCxnSpPr>
+            <a:cxnSpLocks/>
+            <a:stCxn id="22" idx="2"/>
+            <a:endCxn id="28" idx="0"/>
+          </p:cNvCxnSpPr>
+          <p:nvPr/>
+        </p:nvCxnSpPr>
+        <p:spPr>
+          <a:xfrm rot="5400000">
+            <a:off x="3212998" y="788826"/>
+            <a:ext cx="230416" cy="1905259"/>
+          </a:xfrm>
+          <a:prstGeom prst="bentConnector3">
+            <a:avLst>
+              <a:gd name="adj1" fmla="val 50000"/>
+            </a:avLst>
+          </a:prstGeom>
+          <a:ln w="28575">
+            <a:tailEnd type="triangle"/>
+          </a:ln>
+        </p:spPr>
+        <p:style>
+          <a:lnRef idx="1">
+            <a:schemeClr val="dk1"/>
+          </a:lnRef>
+          <a:fillRef idx="0">
+            <a:schemeClr val="dk1"/>
+          </a:fillRef>
+          <a:effectRef idx="0">
+            <a:schemeClr val="dk1"/>
+          </a:effectRef>
+          <a:fontRef idx="minor">
+            <a:schemeClr val="tx1"/>
+          </a:fontRef>
+        </p:style>
+      </p:cxnSp>
+      <p:cxnSp>
+        <p:nvCxnSpPr>
+          <p:cNvPr id="158" name="Straight Arrow Connector 157">
+            <a:extLst>
+              <a:ext uri="{FF2B5EF4-FFF2-40B4-BE49-F238E27FC236}">
+                <a16:creationId xmlns:a16="http://schemas.microsoft.com/office/drawing/2014/main" id="{50DBBCC4-938D-7B69-6F81-5B1A1E79CE5E}"/>
+              </a:ext>
+            </a:extLst>
+          </p:cNvPr>
+          <p:cNvCxnSpPr>
+            <a:cxnSpLocks/>
+            <a:endCxn id="124" idx="0"/>
+          </p:cNvCxnSpPr>
+          <p:nvPr/>
+        </p:nvCxnSpPr>
+        <p:spPr>
+          <a:xfrm>
+            <a:off x="2363565" y="13418227"/>
+            <a:ext cx="1802" cy="231902"/>
+          </a:xfrm>
+          <a:prstGeom prst="straightConnector1">
+            <a:avLst/>
+          </a:prstGeom>
+          <a:ln w="28575">
+            <a:tailEnd type="triangle"/>
+          </a:ln>
+        </p:spPr>
+        <p:style>
+          <a:lnRef idx="1">
+            <a:schemeClr val="dk1"/>
+          </a:lnRef>
+          <a:fillRef idx="0">
+            <a:schemeClr val="dk1"/>
+          </a:fillRef>
+          <a:effectRef idx="0">
+            <a:schemeClr val="dk1"/>
+          </a:effectRef>
+          <a:fontRef idx="minor">
+            <a:schemeClr val="tx1"/>
+          </a:fontRef>
+        </p:style>
+      </p:cxnSp>
+      <p:cxnSp>
+        <p:nvCxnSpPr>
+          <p:cNvPr id="170" name="Straight Arrow Connector 169">
+            <a:extLst>
+              <a:ext uri="{FF2B5EF4-FFF2-40B4-BE49-F238E27FC236}">
+                <a16:creationId xmlns:a16="http://schemas.microsoft.com/office/drawing/2014/main" id="{46F4A361-74D5-B6AE-A6E6-8BB21736DBEA}"/>
+              </a:ext>
+            </a:extLst>
+          </p:cNvPr>
+          <p:cNvCxnSpPr>
+            <a:cxnSpLocks/>
+            <a:endCxn id="1043" idx="0"/>
+          </p:cNvCxnSpPr>
+          <p:nvPr/>
+        </p:nvCxnSpPr>
+        <p:spPr>
+          <a:xfrm flipH="1">
+            <a:off x="2365364" y="20591139"/>
+            <a:ext cx="7080" cy="217606"/>
+          </a:xfrm>
+          <a:prstGeom prst="straightConnector1">
+            <a:avLst/>
+          </a:prstGeom>
+          <a:ln w="28575">
+            <a:tailEnd type="triangle"/>
+          </a:ln>
+        </p:spPr>
+        <p:style>
+          <a:lnRef idx="1">
+            <a:schemeClr val="dk1"/>
+          </a:lnRef>
+          <a:fillRef idx="0">
+            <a:schemeClr val="dk1"/>
+          </a:fillRef>
+          <a:effectRef idx="0">
+            <a:schemeClr val="dk1"/>
+          </a:effectRef>
+          <a:fontRef idx="minor">
+            <a:schemeClr val="tx1"/>
+          </a:fontRef>
+        </p:style>
+      </p:cxnSp>
+      <p:sp>
+        <p:nvSpPr>
+          <p:cNvPr id="1044" name="Rectangle 1043">
+            <a:extLst>
+              <a:ext uri="{FF2B5EF4-FFF2-40B4-BE49-F238E27FC236}">
+                <a16:creationId xmlns:a16="http://schemas.microsoft.com/office/drawing/2014/main" id="{08299810-C03B-4556-2F80-E5FA67534F79}"/>
+              </a:ext>
+            </a:extLst>
+          </p:cNvPr>
+          <p:cNvSpPr/>
+          <p:nvPr/>
+        </p:nvSpPr>
+        <p:spPr>
+          <a:xfrm>
+            <a:off x="3134617" y="4024298"/>
+            <a:ext cx="2258610" cy="682385"/>
+          </a:xfrm>
+          <a:prstGeom prst="rect">
+            <a:avLst/>
+          </a:prstGeom>
+          <a:solidFill>
+            <a:srgbClr val="FF4F4F"/>
+          </a:solidFill>
+        </p:spPr>
+        <p:style>
+          <a:lnRef idx="2">
+            <a:schemeClr val="accent2">
+              <a:shade val="15000"/>
+            </a:schemeClr>
+          </a:lnRef>
+          <a:fillRef idx="1">
+            <a:schemeClr val="accent2"/>
+          </a:fillRef>
+          <a:effectRef idx="0">
+            <a:schemeClr val="accent2"/>
+          </a:effectRef>
+          <a:fontRef idx="minor">
+            <a:schemeClr val="lt1"/>
+          </a:fontRef>
+        </p:style>
+        <p:txBody>
+          <a:bodyPr wrap="square" lIns="91440" tIns="45720" rIns="91440" rtlCol="0" anchor="ctr">
+            <a:noAutofit/>
+          </a:bodyPr>
+          <a:lstStyle/>
+          <a:p>
+            <a:pPr algn="ctr"/>
+            <a:r>
+              <a:rPr lang="en-US" sz="1900" dirty="0">
+                <a:solidFill>
+                  <a:schemeClr val="tx1"/>
+                </a:solidFill>
+                <a:latin typeface="Arial" panose="020B0604020202020204" pitchFamily="34" charset="0"/>
+                <a:cs typeface="Arial" panose="020B0604020202020204" pitchFamily="34" charset="0"/>
+              </a:rPr>
+              <a:t>2015 generator parameters &amp; sites</a:t>
+            </a:r>
+          </a:p>
+        </p:txBody>
+      </p:sp>
+      <p:sp>
+        <p:nvSpPr>
+          <p:cNvPr id="1056" name="Rectangle 1055">
+            <a:extLst>
+              <a:ext uri="{FF2B5EF4-FFF2-40B4-BE49-F238E27FC236}">
+                <a16:creationId xmlns:a16="http://schemas.microsoft.com/office/drawing/2014/main" id="{9ED0D0B2-8208-6134-28A8-BC7EACCFA50F}"/>
+              </a:ext>
+            </a:extLst>
+          </p:cNvPr>
+          <p:cNvSpPr/>
+          <p:nvPr/>
+        </p:nvSpPr>
+        <p:spPr>
+          <a:xfrm>
+            <a:off x="1891918" y="4091531"/>
+            <a:ext cx="946430" cy="546244"/>
+          </a:xfrm>
+          <a:prstGeom prst="rect">
+            <a:avLst/>
+          </a:prstGeom>
+          <a:solidFill>
+            <a:srgbClr val="FF4F4F"/>
+          </a:solidFill>
+        </p:spPr>
+        <p:style>
+          <a:lnRef idx="2">
+            <a:schemeClr val="accent2">
+              <a:shade val="15000"/>
+            </a:schemeClr>
+          </a:lnRef>
+          <a:fillRef idx="1">
+            <a:schemeClr val="accent2"/>
+          </a:fillRef>
+          <a:effectRef idx="0">
+            <a:schemeClr val="accent2"/>
+          </a:effectRef>
+          <a:fontRef idx="minor">
+            <a:schemeClr val="lt1"/>
+          </a:fontRef>
+        </p:style>
+        <p:txBody>
+          <a:bodyPr rtlCol="0" anchor="ctr"/>
+          <a:lstStyle/>
+          <a:p>
+            <a:pPr algn="ctr"/>
+            <a:r>
+              <a:rPr lang="en-US" sz="1908" dirty="0">
+                <a:solidFill>
+                  <a:schemeClr val="tx1"/>
+                </a:solidFill>
+                <a:latin typeface="Arial" panose="020B0604020202020204" pitchFamily="34" charset="0"/>
+                <a:cs typeface="Arial" panose="020B0604020202020204" pitchFamily="34" charset="0"/>
+              </a:rPr>
+              <a:t>CERF</a:t>
+            </a:r>
+          </a:p>
+        </p:txBody>
+      </p:sp>
+      <p:cxnSp>
+        <p:nvCxnSpPr>
+          <p:cNvPr id="1063" name="Straight Arrow Connector 1062">
+            <a:extLst>
+              <a:ext uri="{FF2B5EF4-FFF2-40B4-BE49-F238E27FC236}">
+                <a16:creationId xmlns:a16="http://schemas.microsoft.com/office/drawing/2014/main" id="{83C51250-2235-05FA-2579-BD614154C841}"/>
+              </a:ext>
+            </a:extLst>
+          </p:cNvPr>
+          <p:cNvCxnSpPr>
+            <a:cxnSpLocks/>
+            <a:stCxn id="1056" idx="3"/>
+            <a:endCxn id="1044" idx="1"/>
+          </p:cNvCxnSpPr>
+          <p:nvPr/>
+        </p:nvCxnSpPr>
+        <p:spPr>
+          <a:xfrm>
+            <a:off x="2838348" y="4364653"/>
+            <a:ext cx="296269" cy="838"/>
+          </a:xfrm>
+          <a:prstGeom prst="straightConnector1">
+            <a:avLst/>
+          </a:prstGeom>
+          <a:ln w="28575">
+            <a:tailEnd type="triangle"/>
+          </a:ln>
+        </p:spPr>
+        <p:style>
+          <a:lnRef idx="1">
+            <a:schemeClr val="dk1"/>
+          </a:lnRef>
+          <a:fillRef idx="0">
+            <a:schemeClr val="dk1"/>
+          </a:fillRef>
+          <a:effectRef idx="0">
+            <a:schemeClr val="dk1"/>
+          </a:effectRef>
+          <a:fontRef idx="minor">
+            <a:schemeClr val="tx1"/>
+          </a:fontRef>
+        </p:style>
+      </p:cxnSp>
+      <p:cxnSp>
+        <p:nvCxnSpPr>
+          <p:cNvPr id="1064" name="Connector: Elbow 1063">
+            <a:extLst>
+              <a:ext uri="{FF2B5EF4-FFF2-40B4-BE49-F238E27FC236}">
+                <a16:creationId xmlns:a16="http://schemas.microsoft.com/office/drawing/2014/main" id="{962F7D4D-8361-3D68-17D2-A281AE841858}"/>
+              </a:ext>
+            </a:extLst>
+          </p:cNvPr>
+          <p:cNvCxnSpPr>
+            <a:cxnSpLocks/>
+          </p:cNvCxnSpPr>
+          <p:nvPr/>
+        </p:nvCxnSpPr>
+        <p:spPr>
+          <a:xfrm>
+            <a:off x="5393227" y="4365287"/>
+            <a:ext cx="1059239" cy="829111"/>
+          </a:xfrm>
+          <a:prstGeom prst="bentConnector3">
+            <a:avLst>
+              <a:gd name="adj1" fmla="val 99008"/>
+            </a:avLst>
+          </a:prstGeom>
+          <a:ln w="28575"/>
+        </p:spPr>
+        <p:style>
+          <a:lnRef idx="1">
+            <a:schemeClr val="dk1"/>
+          </a:lnRef>
+          <a:fillRef idx="0">
+            <a:schemeClr val="dk1"/>
+          </a:fillRef>
+          <a:effectRef idx="0">
+            <a:schemeClr val="dk1"/>
+          </a:effectRef>
+          <a:fontRef idx="minor">
+            <a:schemeClr val="tx1"/>
+          </a:fontRef>
+        </p:style>
+      </p:cxnSp>
+      <p:cxnSp>
+        <p:nvCxnSpPr>
+          <p:cNvPr id="1065" name="Connector: Elbow 1064">
+            <a:extLst>
+              <a:ext uri="{FF2B5EF4-FFF2-40B4-BE49-F238E27FC236}">
+                <a16:creationId xmlns:a16="http://schemas.microsoft.com/office/drawing/2014/main" id="{ED02BFBD-0D27-E597-051C-D242BFC90243}"/>
+              </a:ext>
+            </a:extLst>
+          </p:cNvPr>
+          <p:cNvCxnSpPr>
+            <a:stCxn id="1044" idx="2"/>
+          </p:cNvCxnSpPr>
+          <p:nvPr/>
+        </p:nvCxnSpPr>
+        <p:spPr>
+          <a:xfrm rot="5400000">
+            <a:off x="3196085" y="3869262"/>
+            <a:ext cx="230416" cy="1905259"/>
+          </a:xfrm>
+          <a:prstGeom prst="bentConnector3">
+            <a:avLst>
+              <a:gd name="adj1" fmla="val 50000"/>
+            </a:avLst>
+          </a:prstGeom>
+          <a:ln w="28575">
+            <a:tailEnd type="triangle"/>
+          </a:ln>
         </p:spPr>
         <p:style>
           <a:lnRef idx="1">

</xml_diff>